<commit_message>
completed documentation and bug fixed
</commit_message>
<xml_diff>
--- a/Documents/Trivial_Aurelia.pptx
+++ b/Documents/Trivial_Aurelia.pptx
@@ -28,6 +28,12 @@
     <p:sldId id="279" r:id="rId22"/>
     <p:sldId id="274" r:id="rId23"/>
     <p:sldId id="275" r:id="rId24"/>
+    <p:sldId id="280" r:id="rId25"/>
+    <p:sldId id="282" r:id="rId26"/>
+    <p:sldId id="281" r:id="rId27"/>
+    <p:sldId id="283" r:id="rId28"/>
+    <p:sldId id="284" r:id="rId29"/>
+    <p:sldId id="285" r:id="rId30"/>
   </p:sldIdLst>
   <p:sldSz cx="12192000" cy="6858000"/>
   <p:notesSz cx="6858000" cy="9144000"/>
@@ -1225,6 +1231,420 @@
       <dsp:cNvGrpSpPr/>
     </dsp:nvGrpSpPr>
     <dsp:grpSpPr/>
+    <dsp:sp modelId="{E1916609-09A4-454D-972B-42C4B913C078}">
+      <dsp:nvSpPr>
+        <dsp:cNvPr id="0" name=""/>
+        <dsp:cNvSpPr/>
+      </dsp:nvSpPr>
+      <dsp:spPr>
+        <a:xfrm>
+          <a:off x="0" y="1444833"/>
+          <a:ext cx="10687073" cy="630000"/>
+        </a:xfrm>
+        <a:prstGeom prst="rect">
+          <a:avLst/>
+        </a:prstGeom>
+        <a:solidFill>
+          <a:schemeClr val="lt1">
+            <a:alpha val="90000"/>
+            <a:hueOff val="0"/>
+            <a:satOff val="0"/>
+            <a:lumOff val="0"/>
+            <a:alphaOff val="0"/>
+          </a:schemeClr>
+        </a:solidFill>
+        <a:ln w="15875" cap="flat" cmpd="sng" algn="ctr">
+          <a:solidFill>
+            <a:schemeClr val="accent1">
+              <a:hueOff val="0"/>
+              <a:satOff val="0"/>
+              <a:lumOff val="0"/>
+              <a:alphaOff val="0"/>
+            </a:schemeClr>
+          </a:solidFill>
+          <a:prstDash val="solid"/>
+        </a:ln>
+        <a:effectLst/>
+      </dsp:spPr>
+      <dsp:style>
+        <a:lnRef idx="2">
+          <a:scrgbClr r="0" g="0" b="0"/>
+        </a:lnRef>
+        <a:fillRef idx="1">
+          <a:scrgbClr r="0" g="0" b="0"/>
+        </a:fillRef>
+        <a:effectRef idx="0">
+          <a:scrgbClr r="0" g="0" b="0"/>
+        </a:effectRef>
+        <a:fontRef idx="minor"/>
+      </dsp:style>
+    </dsp:sp>
+    <dsp:sp modelId="{15D25FA9-9F23-484A-AD36-01895651C082}">
+      <dsp:nvSpPr>
+        <dsp:cNvPr id="0" name=""/>
+        <dsp:cNvSpPr/>
+      </dsp:nvSpPr>
+      <dsp:spPr>
+        <a:xfrm>
+          <a:off x="508783" y="1085826"/>
+          <a:ext cx="10175669" cy="738000"/>
+        </a:xfrm>
+        <a:prstGeom prst="roundRect">
+          <a:avLst/>
+        </a:prstGeom>
+        <a:solidFill>
+          <a:schemeClr val="accent1">
+            <a:hueOff val="0"/>
+            <a:satOff val="0"/>
+            <a:lumOff val="0"/>
+            <a:alphaOff val="0"/>
+          </a:schemeClr>
+        </a:solidFill>
+        <a:ln w="15875" cap="flat" cmpd="sng" algn="ctr">
+          <a:solidFill>
+            <a:schemeClr val="lt1">
+              <a:hueOff val="0"/>
+              <a:satOff val="0"/>
+              <a:lumOff val="0"/>
+              <a:alphaOff val="0"/>
+            </a:schemeClr>
+          </a:solidFill>
+          <a:prstDash val="solid"/>
+        </a:ln>
+        <a:effectLst/>
+      </dsp:spPr>
+      <dsp:style>
+        <a:lnRef idx="2">
+          <a:scrgbClr r="0" g="0" b="0"/>
+        </a:lnRef>
+        <a:fillRef idx="1">
+          <a:scrgbClr r="0" g="0" b="0"/>
+        </a:fillRef>
+        <a:effectRef idx="0">
+          <a:scrgbClr r="0" g="0" b="0"/>
+        </a:effectRef>
+        <a:fontRef idx="minor">
+          <a:schemeClr val="lt1"/>
+        </a:fontRef>
+      </dsp:style>
+      <dsp:txBody>
+        <a:bodyPr spcFirstLastPara="0" vert="horz" wrap="square" lIns="282762" tIns="0" rIns="282762" bIns="0" numCol="1" spcCol="1270" anchor="ctr" anchorCtr="0">
+          <a:noAutofit/>
+        </a:bodyPr>
+        <a:lstStyle/>
+        <a:p>
+          <a:pPr lvl="0" algn="l" defTabSz="1066800">
+            <a:lnSpc>
+              <a:spcPct val="90000"/>
+            </a:lnSpc>
+            <a:spcBef>
+              <a:spcPct val="0"/>
+            </a:spcBef>
+            <a:spcAft>
+              <a:spcPct val="35000"/>
+            </a:spcAft>
+          </a:pPr>
+          <a:endParaRPr lang="es-ES" sz="2400" b="1" kern="1200" dirty="0" smtClean="0">
+            <a:solidFill>
+              <a:schemeClr val="bg1"/>
+            </a:solidFill>
+          </a:endParaRPr>
+        </a:p>
+        <a:p>
+          <a:pPr lvl="0" algn="l" defTabSz="1066800">
+            <a:lnSpc>
+              <a:spcPct val="90000"/>
+            </a:lnSpc>
+            <a:spcBef>
+              <a:spcPct val="0"/>
+            </a:spcBef>
+            <a:spcAft>
+              <a:spcPct val="35000"/>
+            </a:spcAft>
+          </a:pPr>
+          <a:r>
+            <a:rPr lang="es-ES" sz="2400" b="1" kern="1200" dirty="0" smtClean="0">
+              <a:solidFill>
+                <a:schemeClr val="bg1"/>
+              </a:solidFill>
+            </a:rPr>
+            <a:t>http://aurelia.io/docs/build-systems/aurelia-cli#running-your-aurelia-app</a:t>
+          </a:r>
+        </a:p>
+        <a:p>
+          <a:pPr lvl="0" algn="l" defTabSz="1066800">
+            <a:lnSpc>
+              <a:spcPct val="90000"/>
+            </a:lnSpc>
+            <a:spcBef>
+              <a:spcPct val="0"/>
+            </a:spcBef>
+            <a:spcAft>
+              <a:spcPct val="35000"/>
+            </a:spcAft>
+          </a:pPr>
+          <a:endParaRPr lang="es-ES" sz="2400" b="1" kern="1200" dirty="0">
+            <a:solidFill>
+              <a:schemeClr val="bg1"/>
+            </a:solidFill>
+          </a:endParaRPr>
+        </a:p>
+      </dsp:txBody>
+      <dsp:txXfrm>
+        <a:off x="544809" y="1121852"/>
+        <a:ext cx="10103617" cy="665948"/>
+      </dsp:txXfrm>
+    </dsp:sp>
+    <dsp:sp modelId="{D094A7AD-F43A-4D6E-917A-3A2132425A51}">
+      <dsp:nvSpPr>
+        <dsp:cNvPr id="0" name=""/>
+        <dsp:cNvSpPr/>
+      </dsp:nvSpPr>
+      <dsp:spPr>
+        <a:xfrm>
+          <a:off x="0" y="2578833"/>
+          <a:ext cx="10687073" cy="630000"/>
+        </a:xfrm>
+        <a:prstGeom prst="rect">
+          <a:avLst/>
+        </a:prstGeom>
+        <a:solidFill>
+          <a:schemeClr val="lt1">
+            <a:alpha val="90000"/>
+            <a:hueOff val="0"/>
+            <a:satOff val="0"/>
+            <a:lumOff val="0"/>
+            <a:alphaOff val="0"/>
+          </a:schemeClr>
+        </a:solidFill>
+        <a:ln w="15875" cap="flat" cmpd="sng" algn="ctr">
+          <a:solidFill>
+            <a:schemeClr val="accent1">
+              <a:hueOff val="0"/>
+              <a:satOff val="0"/>
+              <a:lumOff val="0"/>
+              <a:alphaOff val="0"/>
+            </a:schemeClr>
+          </a:solidFill>
+          <a:prstDash val="solid"/>
+        </a:ln>
+        <a:effectLst/>
+      </dsp:spPr>
+      <dsp:style>
+        <a:lnRef idx="2">
+          <a:scrgbClr r="0" g="0" b="0"/>
+        </a:lnRef>
+        <a:fillRef idx="1">
+          <a:scrgbClr r="0" g="0" b="0"/>
+        </a:fillRef>
+        <a:effectRef idx="0">
+          <a:scrgbClr r="0" g="0" b="0"/>
+        </a:effectRef>
+        <a:fontRef idx="minor"/>
+      </dsp:style>
+    </dsp:sp>
+    <dsp:sp modelId="{EA5BAA43-1229-49A6-B91B-8A34676699D5}">
+      <dsp:nvSpPr>
+        <dsp:cNvPr id="0" name=""/>
+        <dsp:cNvSpPr/>
+      </dsp:nvSpPr>
+      <dsp:spPr>
+        <a:xfrm>
+          <a:off x="534353" y="2209833"/>
+          <a:ext cx="10122848" cy="738000"/>
+        </a:xfrm>
+        <a:prstGeom prst="roundRect">
+          <a:avLst/>
+        </a:prstGeom>
+        <a:solidFill>
+          <a:schemeClr val="accent1">
+            <a:hueOff val="0"/>
+            <a:satOff val="0"/>
+            <a:lumOff val="0"/>
+            <a:alphaOff val="0"/>
+          </a:schemeClr>
+        </a:solidFill>
+        <a:ln w="15875" cap="flat" cmpd="sng" algn="ctr">
+          <a:solidFill>
+            <a:schemeClr val="lt1">
+              <a:hueOff val="0"/>
+              <a:satOff val="0"/>
+              <a:lumOff val="0"/>
+              <a:alphaOff val="0"/>
+            </a:schemeClr>
+          </a:solidFill>
+          <a:prstDash val="solid"/>
+        </a:ln>
+        <a:effectLst/>
+      </dsp:spPr>
+      <dsp:style>
+        <a:lnRef idx="2">
+          <a:scrgbClr r="0" g="0" b="0"/>
+        </a:lnRef>
+        <a:fillRef idx="1">
+          <a:scrgbClr r="0" g="0" b="0"/>
+        </a:fillRef>
+        <a:effectRef idx="0">
+          <a:scrgbClr r="0" g="0" b="0"/>
+        </a:effectRef>
+        <a:fontRef idx="minor">
+          <a:schemeClr val="lt1"/>
+        </a:fontRef>
+      </dsp:style>
+      <dsp:txBody>
+        <a:bodyPr spcFirstLastPara="0" vert="horz" wrap="square" lIns="282762" tIns="0" rIns="282762" bIns="0" numCol="1" spcCol="1270" anchor="ctr" anchorCtr="0">
+          <a:noAutofit/>
+        </a:bodyPr>
+        <a:lstStyle/>
+        <a:p>
+          <a:pPr lvl="0" algn="l" defTabSz="1111250">
+            <a:lnSpc>
+              <a:spcPct val="90000"/>
+            </a:lnSpc>
+            <a:spcBef>
+              <a:spcPct val="0"/>
+            </a:spcBef>
+            <a:spcAft>
+              <a:spcPct val="35000"/>
+            </a:spcAft>
+          </a:pPr>
+          <a:r>
+            <a:rPr lang="es-ES" sz="2500" b="1" kern="1200" dirty="0" smtClean="0"/>
+            <a:t>https://auth0.com/blog/creating-your-first-aurelia-app-from-authentication-to-calling-an-api/</a:t>
+          </a:r>
+          <a:endParaRPr lang="es-ES" sz="2500" b="1" kern="1200" dirty="0"/>
+        </a:p>
+      </dsp:txBody>
+      <dsp:txXfrm>
+        <a:off x="570379" y="2245859"/>
+        <a:ext cx="10050796" cy="665948"/>
+      </dsp:txXfrm>
+    </dsp:sp>
+    <dsp:sp modelId="{37C02652-0F13-459C-B9D0-247580E681AB}">
+      <dsp:nvSpPr>
+        <dsp:cNvPr id="0" name=""/>
+        <dsp:cNvSpPr/>
+      </dsp:nvSpPr>
+      <dsp:spPr>
+        <a:xfrm>
+          <a:off x="0" y="3712833"/>
+          <a:ext cx="10687073" cy="630000"/>
+        </a:xfrm>
+        <a:prstGeom prst="rect">
+          <a:avLst/>
+        </a:prstGeom>
+        <a:solidFill>
+          <a:schemeClr val="lt1">
+            <a:alpha val="90000"/>
+            <a:hueOff val="0"/>
+            <a:satOff val="0"/>
+            <a:lumOff val="0"/>
+            <a:alphaOff val="0"/>
+          </a:schemeClr>
+        </a:solidFill>
+        <a:ln w="15875" cap="flat" cmpd="sng" algn="ctr">
+          <a:solidFill>
+            <a:schemeClr val="accent1">
+              <a:hueOff val="0"/>
+              <a:satOff val="0"/>
+              <a:lumOff val="0"/>
+              <a:alphaOff val="0"/>
+            </a:schemeClr>
+          </a:solidFill>
+          <a:prstDash val="solid"/>
+        </a:ln>
+        <a:effectLst/>
+      </dsp:spPr>
+      <dsp:style>
+        <a:lnRef idx="2">
+          <a:scrgbClr r="0" g="0" b="0"/>
+        </a:lnRef>
+        <a:fillRef idx="1">
+          <a:scrgbClr r="0" g="0" b="0"/>
+        </a:fillRef>
+        <a:effectRef idx="0">
+          <a:scrgbClr r="0" g="0" b="0"/>
+        </a:effectRef>
+        <a:fontRef idx="minor"/>
+      </dsp:style>
+    </dsp:sp>
+    <dsp:sp modelId="{C8AAF37D-DE77-49AD-94BA-D22C0BE47A96}">
+      <dsp:nvSpPr>
+        <dsp:cNvPr id="0" name=""/>
+        <dsp:cNvSpPr/>
+      </dsp:nvSpPr>
+      <dsp:spPr>
+        <a:xfrm>
+          <a:off x="508783" y="3343833"/>
+          <a:ext cx="10172749" cy="738000"/>
+        </a:xfrm>
+        <a:prstGeom prst="roundRect">
+          <a:avLst/>
+        </a:prstGeom>
+        <a:solidFill>
+          <a:schemeClr val="accent1">
+            <a:hueOff val="0"/>
+            <a:satOff val="0"/>
+            <a:lumOff val="0"/>
+            <a:alphaOff val="0"/>
+          </a:schemeClr>
+        </a:solidFill>
+        <a:ln w="15875" cap="flat" cmpd="sng" algn="ctr">
+          <a:solidFill>
+            <a:schemeClr val="lt1">
+              <a:hueOff val="0"/>
+              <a:satOff val="0"/>
+              <a:lumOff val="0"/>
+              <a:alphaOff val="0"/>
+            </a:schemeClr>
+          </a:solidFill>
+          <a:prstDash val="solid"/>
+        </a:ln>
+        <a:effectLst/>
+      </dsp:spPr>
+      <dsp:style>
+        <a:lnRef idx="2">
+          <a:scrgbClr r="0" g="0" b="0"/>
+        </a:lnRef>
+        <a:fillRef idx="1">
+          <a:scrgbClr r="0" g="0" b="0"/>
+        </a:fillRef>
+        <a:effectRef idx="0">
+          <a:scrgbClr r="0" g="0" b="0"/>
+        </a:effectRef>
+        <a:fontRef idx="minor">
+          <a:schemeClr val="lt1"/>
+        </a:fontRef>
+      </dsp:style>
+      <dsp:txBody>
+        <a:bodyPr spcFirstLastPara="0" vert="horz" wrap="square" lIns="282762" tIns="0" rIns="282762" bIns="0" numCol="1" spcCol="1270" anchor="ctr" anchorCtr="0">
+          <a:noAutofit/>
+        </a:bodyPr>
+        <a:lstStyle/>
+        <a:p>
+          <a:pPr lvl="0" algn="l" defTabSz="1111250">
+            <a:lnSpc>
+              <a:spcPct val="90000"/>
+            </a:lnSpc>
+            <a:spcBef>
+              <a:spcPct val="0"/>
+            </a:spcBef>
+            <a:spcAft>
+              <a:spcPct val="35000"/>
+            </a:spcAft>
+          </a:pPr>
+          <a:r>
+            <a:rPr lang="es-ES" sz="2500" b="1" kern="1200" dirty="0" smtClean="0"/>
+            <a:t>https://www.tutorialspoint.com/aurelia</a:t>
+          </a:r>
+          <a:endParaRPr lang="es-ES" sz="2500" b="1" kern="1200" dirty="0"/>
+        </a:p>
+      </dsp:txBody>
+      <dsp:txXfrm>
+        <a:off x="544809" y="3379859"/>
+        <a:ext cx="10100697" cy="665948"/>
+      </dsp:txXfrm>
+    </dsp:sp>
   </dsp:spTree>
 </dsp:drawing>
 </file>
@@ -11281,7 +11701,7 @@
           <a:p>
             <a:fld id="{5AF17004-BA72-482E-B0B8-4E04C09BC19D}" type="datetimeFigureOut">
               <a:rPr lang="es-ES" smtClean="0"/>
-              <a:t>28.feb.2018</a:t>
+              <a:t>01.mar.2018</a:t>
             </a:fld>
             <a:endParaRPr lang="es-ES"/>
           </a:p>
@@ -11488,7 +11908,7 @@
           <a:p>
             <a:fld id="{5AF17004-BA72-482E-B0B8-4E04C09BC19D}" type="datetimeFigureOut">
               <a:rPr lang="es-ES" smtClean="0"/>
-              <a:t>28.feb.2018</a:t>
+              <a:t>01.mar.2018</a:t>
             </a:fld>
             <a:endParaRPr lang="es-ES"/>
           </a:p>
@@ -11668,7 +12088,7 @@
           <a:p>
             <a:fld id="{5AF17004-BA72-482E-B0B8-4E04C09BC19D}" type="datetimeFigureOut">
               <a:rPr lang="es-ES" smtClean="0"/>
-              <a:t>28.feb.2018</a:t>
+              <a:t>01.mar.2018</a:t>
             </a:fld>
             <a:endParaRPr lang="es-ES"/>
           </a:p>
@@ -11873,7 +12293,7 @@
           <a:p>
             <a:fld id="{5AF17004-BA72-482E-B0B8-4E04C09BC19D}" type="datetimeFigureOut">
               <a:rPr lang="es-ES" smtClean="0"/>
-              <a:t>28.feb.2018</a:t>
+              <a:t>01.mar.2018</a:t>
             </a:fld>
             <a:endParaRPr lang="es-ES"/>
           </a:p>
@@ -20771,7 +21191,7 @@
           <a:p>
             <a:fld id="{5AF17004-BA72-482E-B0B8-4E04C09BC19D}" type="datetimeFigureOut">
               <a:rPr lang="es-ES" smtClean="0"/>
-              <a:t>28.feb.2018</a:t>
+              <a:t>01.mar.2018</a:t>
             </a:fld>
             <a:endParaRPr lang="es-ES"/>
           </a:p>
@@ -21045,7 +21465,7 @@
           <a:p>
             <a:fld id="{5AF17004-BA72-482E-B0B8-4E04C09BC19D}" type="datetimeFigureOut">
               <a:rPr lang="es-ES" smtClean="0"/>
-              <a:t>28.feb.2018</a:t>
+              <a:t>01.mar.2018</a:t>
             </a:fld>
             <a:endParaRPr lang="es-ES"/>
           </a:p>
@@ -21443,7 +21863,7 @@
           <a:p>
             <a:fld id="{5AF17004-BA72-482E-B0B8-4E04C09BC19D}" type="datetimeFigureOut">
               <a:rPr lang="es-ES" smtClean="0"/>
-              <a:t>28.feb.2018</a:t>
+              <a:t>01.mar.2018</a:t>
             </a:fld>
             <a:endParaRPr lang="es-ES"/>
           </a:p>
@@ -21561,7 +21981,7 @@
           <a:p>
             <a:fld id="{5AF17004-BA72-482E-B0B8-4E04C09BC19D}" type="datetimeFigureOut">
               <a:rPr lang="es-ES" smtClean="0"/>
-              <a:t>28.feb.2018</a:t>
+              <a:t>01.mar.2018</a:t>
             </a:fld>
             <a:endParaRPr lang="es-ES"/>
           </a:p>
@@ -21656,7 +22076,7 @@
           <a:p>
             <a:fld id="{5AF17004-BA72-482E-B0B8-4E04C09BC19D}" type="datetimeFigureOut">
               <a:rPr lang="es-ES" smtClean="0"/>
-              <a:t>28.feb.2018</a:t>
+              <a:t>01.mar.2018</a:t>
             </a:fld>
             <a:endParaRPr lang="es-ES"/>
           </a:p>
@@ -21946,7 +22366,7 @@
           <a:p>
             <a:fld id="{5AF17004-BA72-482E-B0B8-4E04C09BC19D}" type="datetimeFigureOut">
               <a:rPr lang="es-ES" smtClean="0"/>
-              <a:t>28.feb.2018</a:t>
+              <a:t>01.mar.2018</a:t>
             </a:fld>
             <a:endParaRPr lang="es-ES"/>
           </a:p>
@@ -22226,7 +22646,7 @@
           <a:p>
             <a:fld id="{5AF17004-BA72-482E-B0B8-4E04C09BC19D}" type="datetimeFigureOut">
               <a:rPr lang="es-ES" smtClean="0"/>
-              <a:t>28.feb.2018</a:t>
+              <a:t>01.mar.2018</a:t>
             </a:fld>
             <a:endParaRPr lang="es-ES"/>
           </a:p>
@@ -22479,7 +22899,7 @@
           <a:p>
             <a:fld id="{5AF17004-BA72-482E-B0B8-4E04C09BC19D}" type="datetimeFigureOut">
               <a:rPr lang="es-ES" smtClean="0"/>
-              <a:t>28.feb.2018</a:t>
+              <a:t>01.mar.2018</a:t>
             </a:fld>
             <a:endParaRPr lang="es-ES"/>
           </a:p>
@@ -25577,10 +25997,6 @@
           <a:bodyPr/>
           <a:lstStyle/>
           <a:p>
-            <a:r>
-              <a:rPr lang="es-ES" dirty="0" err="1" smtClean="0"/>
-              <a:t>jspm</a:t>
-            </a:r>
             <a:endParaRPr lang="es-ES" dirty="0"/>
           </a:p>
         </p:txBody>
@@ -25615,6 +26031,231 @@
           <a:chExt cx="0" cy="0"/>
         </a:xfrm>
       </p:grpSpPr>
+      <p:grpSp>
+        <p:nvGrpSpPr>
+          <p:cNvPr id="10" name="Group 9"/>
+          <p:cNvGrpSpPr/>
+          <p:nvPr/>
+        </p:nvGrpSpPr>
+        <p:grpSpPr>
+          <a:xfrm>
+            <a:off x="119854" y="200540"/>
+            <a:ext cx="2378964" cy="1621250"/>
+            <a:chOff x="119854" y="200540"/>
+            <a:chExt cx="2378964" cy="1621250"/>
+          </a:xfrm>
+        </p:grpSpPr>
+        <p:sp>
+          <p:nvSpPr>
+            <p:cNvPr id="4" name="Cloud 3"/>
+            <p:cNvSpPr/>
+            <p:nvPr/>
+          </p:nvSpPr>
+          <p:spPr>
+            <a:xfrm>
+              <a:off x="119854" y="200540"/>
+              <a:ext cx="2378964" cy="1621250"/>
+            </a:xfrm>
+            <a:prstGeom prst="cloud">
+              <a:avLst/>
+            </a:prstGeom>
+          </p:spPr>
+          <p:style>
+            <a:lnRef idx="2">
+              <a:schemeClr val="accent1">
+                <a:shade val="50000"/>
+              </a:schemeClr>
+            </a:lnRef>
+            <a:fillRef idx="1">
+              <a:schemeClr val="accent1"/>
+            </a:fillRef>
+            <a:effectRef idx="0">
+              <a:schemeClr val="accent1"/>
+            </a:effectRef>
+            <a:fontRef idx="minor">
+              <a:schemeClr val="lt1"/>
+            </a:fontRef>
+          </p:style>
+          <p:txBody>
+            <a:bodyPr rtlCol="0" anchor="ctr"/>
+            <a:lstStyle/>
+            <a:p>
+              <a:pPr algn="ctr"/>
+              <a:endParaRPr lang="es-ES"/>
+            </a:p>
+          </p:txBody>
+        </p:sp>
+        <p:sp>
+          <p:nvSpPr>
+            <p:cNvPr id="5" name="TextBox 4"/>
+            <p:cNvSpPr txBox="1"/>
+            <p:nvPr/>
+          </p:nvSpPr>
+          <p:spPr>
+            <a:xfrm>
+              <a:off x="547160" y="463236"/>
+              <a:ext cx="1524351" cy="923330"/>
+            </a:xfrm>
+            <a:prstGeom prst="rect">
+              <a:avLst/>
+            </a:prstGeom>
+            <a:noFill/>
+          </p:spPr>
+          <p:txBody>
+            <a:bodyPr wrap="square" rtlCol="0">
+              <a:spAutoFit/>
+            </a:bodyPr>
+            <a:lstStyle/>
+            <a:p>
+              <a:pPr algn="ctr"/>
+              <a:r>
+                <a:rPr lang="es-ES" dirty="0" smtClean="0">
+                  <a:solidFill>
+                    <a:schemeClr val="bg1">
+                      <a:lumMod val="95000"/>
+                    </a:schemeClr>
+                  </a:solidFill>
+                </a:rPr>
+                <a:t>Pasamos las preguntas a un archivo </a:t>
+              </a:r>
+              <a:r>
+                <a:rPr lang="es-ES" dirty="0" err="1" smtClean="0">
+                  <a:solidFill>
+                    <a:schemeClr val="bg1">
+                      <a:lumMod val="95000"/>
+                    </a:schemeClr>
+                  </a:solidFill>
+                </a:rPr>
+                <a:t>json</a:t>
+              </a:r>
+              <a:endParaRPr lang="es-ES" dirty="0">
+                <a:solidFill>
+                  <a:schemeClr val="bg1">
+                    <a:lumMod val="95000"/>
+                  </a:schemeClr>
+                </a:solidFill>
+              </a:endParaRPr>
+            </a:p>
+          </p:txBody>
+        </p:sp>
+      </p:grpSp>
+      <p:pic>
+        <p:nvPicPr>
+          <p:cNvPr id="6" name="Picture 5"/>
+          <p:cNvPicPr>
+            <a:picLocks noChangeAspect="1"/>
+          </p:cNvPicPr>
+          <p:nvPr/>
+        </p:nvPicPr>
+        <p:blipFill>
+          <a:blip r:embed="rId2"/>
+          <a:stretch>
+            <a:fillRect/>
+          </a:stretch>
+        </p:blipFill>
+        <p:spPr>
+          <a:xfrm>
+            <a:off x="685182" y="2540853"/>
+            <a:ext cx="3762375" cy="2190750"/>
+          </a:xfrm>
+          <a:prstGeom prst="rect">
+            <a:avLst/>
+          </a:prstGeom>
+        </p:spPr>
+      </p:pic>
+      <p:grpSp>
+        <p:nvGrpSpPr>
+          <p:cNvPr id="9" name="Group 8"/>
+          <p:cNvGrpSpPr/>
+          <p:nvPr/>
+        </p:nvGrpSpPr>
+        <p:grpSpPr>
+          <a:xfrm>
+            <a:off x="5533483" y="653017"/>
+            <a:ext cx="6396848" cy="5932072"/>
+            <a:chOff x="5214307" y="744252"/>
+            <a:chExt cx="6396848" cy="5932072"/>
+          </a:xfrm>
+        </p:grpSpPr>
+        <p:pic>
+          <p:nvPicPr>
+            <p:cNvPr id="7" name="Picture 6"/>
+            <p:cNvPicPr>
+              <a:picLocks noChangeAspect="1"/>
+            </p:cNvPicPr>
+            <p:nvPr/>
+          </p:nvPicPr>
+          <p:blipFill>
+            <a:blip r:embed="rId3"/>
+            <a:stretch>
+              <a:fillRect/>
+            </a:stretch>
+          </p:blipFill>
+          <p:spPr>
+            <a:xfrm>
+              <a:off x="5214307" y="744252"/>
+              <a:ext cx="5879532" cy="2983211"/>
+            </a:xfrm>
+            <a:prstGeom prst="rect">
+              <a:avLst/>
+            </a:prstGeom>
+          </p:spPr>
+        </p:pic>
+        <p:pic>
+          <p:nvPicPr>
+            <p:cNvPr id="8" name="Picture 7"/>
+            <p:cNvPicPr>
+              <a:picLocks noChangeAspect="1"/>
+            </p:cNvPicPr>
+            <p:nvPr/>
+          </p:nvPicPr>
+          <p:blipFill>
+            <a:blip r:embed="rId4"/>
+            <a:stretch>
+              <a:fillRect/>
+            </a:stretch>
+          </p:blipFill>
+          <p:spPr>
+            <a:xfrm>
+              <a:off x="5214307" y="3727463"/>
+              <a:ext cx="6396848" cy="2948861"/>
+            </a:xfrm>
+            <a:prstGeom prst="rect">
+              <a:avLst/>
+            </a:prstGeom>
+          </p:spPr>
+        </p:pic>
+      </p:grpSp>
+    </p:spTree>
+    <p:extLst>
+      <p:ext uri="{BB962C8B-B14F-4D97-AF65-F5344CB8AC3E}">
+        <p14:creationId xmlns:p14="http://schemas.microsoft.com/office/powerpoint/2010/main" val="3371972319"/>
+      </p:ext>
+    </p:extLst>
+  </p:cSld>
+  <p:clrMapOvr>
+    <a:masterClrMapping/>
+  </p:clrMapOvr>
+</p:sld>
+</file>
+
+<file path=ppt/slides/slide24.xml><?xml version="1.0" encoding="utf-8"?>
+<p:sld xmlns:a="http://schemas.openxmlformats.org/drawingml/2006/main" xmlns:r="http://schemas.openxmlformats.org/officeDocument/2006/relationships" xmlns:p="http://schemas.openxmlformats.org/presentationml/2006/main">
+  <p:cSld>
+    <p:spTree>
+      <p:nvGrpSpPr>
+        <p:cNvPr id="1" name=""/>
+        <p:cNvGrpSpPr/>
+        <p:nvPr/>
+      </p:nvGrpSpPr>
+      <p:grpSpPr>
+        <a:xfrm>
+          <a:off x="0" y="0"/>
+          <a:ext cx="0" cy="0"/>
+          <a:chOff x="0" y="0"/>
+          <a:chExt cx="0" cy="0"/>
+        </a:xfrm>
+      </p:grpSpPr>
       <p:pic>
         <p:nvPicPr>
           <p:cNvPr id="2" name="Picture 1"/>
@@ -25631,8 +26272,8 @@
         </p:blipFill>
         <p:spPr>
           <a:xfrm>
-            <a:off x="965619" y="981344"/>
-            <a:ext cx="6534150" cy="409575"/>
+            <a:off x="2703665" y="200540"/>
+            <a:ext cx="3238123" cy="1979313"/>
           </a:xfrm>
           <a:prstGeom prst="rect">
             <a:avLst/>
@@ -25655,8 +26296,322 @@
         </p:blipFill>
         <p:spPr>
           <a:xfrm>
-            <a:off x="905234" y="1730404"/>
-            <a:ext cx="10868025" cy="3000375"/>
+            <a:off x="547160" y="4442626"/>
+            <a:ext cx="3374546" cy="1650433"/>
+          </a:xfrm>
+          <a:prstGeom prst="rect">
+            <a:avLst/>
+          </a:prstGeom>
+        </p:spPr>
+      </p:pic>
+      <p:pic>
+        <p:nvPicPr>
+          <p:cNvPr id="5" name="Picture 4"/>
+          <p:cNvPicPr>
+            <a:picLocks noChangeAspect="1"/>
+          </p:cNvPicPr>
+          <p:nvPr/>
+        </p:nvPicPr>
+        <p:blipFill>
+          <a:blip r:embed="rId4"/>
+          <a:stretch>
+            <a:fillRect/>
+          </a:stretch>
+        </p:blipFill>
+        <p:spPr>
+          <a:xfrm>
+            <a:off x="6800492" y="675713"/>
+            <a:ext cx="4272506" cy="3320810"/>
+          </a:xfrm>
+          <a:prstGeom prst="rect">
+            <a:avLst/>
+          </a:prstGeom>
+        </p:spPr>
+      </p:pic>
+      <p:grpSp>
+        <p:nvGrpSpPr>
+          <p:cNvPr id="7" name="Group 6"/>
+          <p:cNvGrpSpPr/>
+          <p:nvPr/>
+        </p:nvGrpSpPr>
+        <p:grpSpPr>
+          <a:xfrm>
+            <a:off x="119854" y="200540"/>
+            <a:ext cx="2378964" cy="1621250"/>
+            <a:chOff x="119854" y="200540"/>
+            <a:chExt cx="2378964" cy="1621250"/>
+          </a:xfrm>
+        </p:grpSpPr>
+        <p:sp>
+          <p:nvSpPr>
+            <p:cNvPr id="8" name="Cloud 7"/>
+            <p:cNvSpPr/>
+            <p:nvPr/>
+          </p:nvSpPr>
+          <p:spPr>
+            <a:xfrm>
+              <a:off x="119854" y="200540"/>
+              <a:ext cx="2378964" cy="1621250"/>
+            </a:xfrm>
+            <a:prstGeom prst="cloud">
+              <a:avLst/>
+            </a:prstGeom>
+          </p:spPr>
+          <p:style>
+            <a:lnRef idx="2">
+              <a:schemeClr val="accent1">
+                <a:shade val="50000"/>
+              </a:schemeClr>
+            </a:lnRef>
+            <a:fillRef idx="1">
+              <a:schemeClr val="accent1"/>
+            </a:fillRef>
+            <a:effectRef idx="0">
+              <a:schemeClr val="accent1"/>
+            </a:effectRef>
+            <a:fontRef idx="minor">
+              <a:schemeClr val="lt1"/>
+            </a:fontRef>
+          </p:style>
+          <p:txBody>
+            <a:bodyPr rtlCol="0" anchor="ctr"/>
+            <a:lstStyle/>
+            <a:p>
+              <a:pPr algn="ctr"/>
+              <a:endParaRPr lang="es-ES"/>
+            </a:p>
+          </p:txBody>
+        </p:sp>
+        <p:sp>
+          <p:nvSpPr>
+            <p:cNvPr id="9" name="TextBox 8"/>
+            <p:cNvSpPr txBox="1"/>
+            <p:nvPr/>
+          </p:nvSpPr>
+          <p:spPr>
+            <a:xfrm>
+              <a:off x="547160" y="687999"/>
+              <a:ext cx="1524351" cy="646331"/>
+            </a:xfrm>
+            <a:prstGeom prst="rect">
+              <a:avLst/>
+            </a:prstGeom>
+            <a:noFill/>
+          </p:spPr>
+          <p:txBody>
+            <a:bodyPr wrap="square" rtlCol="0">
+              <a:spAutoFit/>
+            </a:bodyPr>
+            <a:lstStyle/>
+            <a:p>
+              <a:pPr algn="ctr"/>
+              <a:r>
+                <a:rPr lang="es-ES" dirty="0" smtClean="0">
+                  <a:solidFill>
+                    <a:schemeClr val="bg1">
+                      <a:lumMod val="95000"/>
+                    </a:schemeClr>
+                  </a:solidFill>
+                </a:rPr>
+                <a:t>Modifico el </a:t>
+              </a:r>
+              <a:r>
+                <a:rPr lang="es-ES" dirty="0" err="1">
+                  <a:solidFill>
+                    <a:schemeClr val="bg1">
+                      <a:lumMod val="95000"/>
+                    </a:schemeClr>
+                  </a:solidFill>
+                </a:rPr>
+                <a:t>a</a:t>
+              </a:r>
+              <a:r>
+                <a:rPr lang="es-ES" dirty="0" err="1" smtClean="0">
+                  <a:solidFill>
+                    <a:schemeClr val="bg1">
+                      <a:lumMod val="95000"/>
+                    </a:schemeClr>
+                  </a:solidFill>
+                </a:rPr>
+                <a:t>urelia.json</a:t>
+              </a:r>
+              <a:endParaRPr lang="es-ES" dirty="0">
+                <a:solidFill>
+                  <a:schemeClr val="bg1">
+                    <a:lumMod val="95000"/>
+                  </a:schemeClr>
+                </a:solidFill>
+              </a:endParaRPr>
+            </a:p>
+          </p:txBody>
+        </p:sp>
+      </p:grpSp>
+      <p:sp>
+        <p:nvSpPr>
+          <p:cNvPr id="10" name="TextBox 9"/>
+          <p:cNvSpPr txBox="1"/>
+          <p:nvPr/>
+        </p:nvSpPr>
+        <p:spPr>
+          <a:xfrm>
+            <a:off x="547160" y="3724333"/>
+            <a:ext cx="4620692" cy="369332"/>
+          </a:xfrm>
+          <a:prstGeom prst="rect">
+            <a:avLst/>
+          </a:prstGeom>
+          <a:solidFill>
+            <a:schemeClr val="accent1">
+              <a:lumMod val="40000"/>
+              <a:lumOff val="60000"/>
+            </a:schemeClr>
+          </a:solidFill>
+        </p:spPr>
+        <p:txBody>
+          <a:bodyPr wrap="square" rtlCol="0">
+            <a:spAutoFit/>
+          </a:bodyPr>
+          <a:lstStyle/>
+          <a:p>
+            <a:r>
+              <a:rPr lang="es-ES" dirty="0" smtClean="0"/>
+              <a:t>Añadir el formato </a:t>
+            </a:r>
+            <a:r>
+              <a:rPr lang="es-ES" dirty="0" err="1" smtClean="0"/>
+              <a:t>json</a:t>
+            </a:r>
+            <a:r>
+              <a:rPr lang="es-ES" dirty="0" smtClean="0"/>
+              <a:t> al </a:t>
+            </a:r>
+            <a:r>
+              <a:rPr lang="es-ES" dirty="0" err="1" smtClean="0"/>
+              <a:t>bundle</a:t>
+            </a:r>
+            <a:r>
+              <a:rPr lang="es-ES" dirty="0" smtClean="0"/>
+              <a:t> </a:t>
+            </a:r>
+            <a:endParaRPr lang="es-ES" dirty="0"/>
+          </a:p>
+        </p:txBody>
+      </p:sp>
+      <p:sp>
+        <p:nvSpPr>
+          <p:cNvPr id="11" name="TextBox 10"/>
+          <p:cNvSpPr txBox="1"/>
+          <p:nvPr/>
+        </p:nvSpPr>
+        <p:spPr>
+          <a:xfrm>
+            <a:off x="6800492" y="4084563"/>
+            <a:ext cx="4551870" cy="738664"/>
+          </a:xfrm>
+          <a:prstGeom prst="rect">
+            <a:avLst/>
+          </a:prstGeom>
+          <a:solidFill>
+            <a:schemeClr val="accent1">
+              <a:lumMod val="40000"/>
+              <a:lumOff val="60000"/>
+            </a:schemeClr>
+          </a:solidFill>
+        </p:spPr>
+        <p:txBody>
+          <a:bodyPr wrap="square" rtlCol="0">
+            <a:spAutoFit/>
+          </a:bodyPr>
+          <a:lstStyle/>
+          <a:p>
+            <a:r>
+              <a:rPr lang="es-ES" dirty="0"/>
+              <a:t>Añadir </a:t>
+            </a:r>
+            <a:r>
+              <a:rPr lang="es-ES" dirty="0" smtClean="0"/>
+              <a:t>la ruta del data a las </a:t>
+            </a:r>
+            <a:r>
+              <a:rPr lang="es-ES" dirty="0" err="1" smtClean="0"/>
+              <a:t>paths</a:t>
+            </a:r>
+            <a:endParaRPr lang="es-ES" dirty="0"/>
+          </a:p>
+          <a:p>
+            <a:endParaRPr lang="es-ES" sz="2400" dirty="0"/>
+          </a:p>
+        </p:txBody>
+      </p:sp>
+      <p:sp>
+        <p:nvSpPr>
+          <p:cNvPr id="12" name="TextBox 11"/>
+          <p:cNvSpPr txBox="1"/>
+          <p:nvPr/>
+        </p:nvSpPr>
+        <p:spPr>
+          <a:xfrm>
+            <a:off x="6800492" y="126010"/>
+            <a:ext cx="4206814" cy="369332"/>
+          </a:xfrm>
+          <a:prstGeom prst="rect">
+            <a:avLst/>
+          </a:prstGeom>
+          <a:solidFill>
+            <a:schemeClr val="accent1">
+              <a:lumMod val="40000"/>
+              <a:lumOff val="60000"/>
+            </a:schemeClr>
+          </a:solidFill>
+        </p:spPr>
+        <p:txBody>
+          <a:bodyPr wrap="square" rtlCol="0">
+            <a:spAutoFit/>
+          </a:bodyPr>
+          <a:lstStyle/>
+          <a:p>
+            <a:r>
+              <a:rPr lang="es-ES" dirty="0"/>
+              <a:t>Añadir el formato </a:t>
+            </a:r>
+            <a:r>
+              <a:rPr lang="es-ES" dirty="0" err="1"/>
+              <a:t>json</a:t>
+            </a:r>
+            <a:r>
+              <a:rPr lang="es-ES" dirty="0"/>
+              <a:t> </a:t>
+            </a:r>
+            <a:r>
+              <a:rPr lang="es-ES" dirty="0" smtClean="0"/>
+              <a:t>al </a:t>
+            </a:r>
+            <a:r>
+              <a:rPr lang="es-ES" dirty="0" err="1" smtClean="0"/>
+              <a:t>plugin</a:t>
+            </a:r>
+            <a:endParaRPr lang="es-ES" dirty="0"/>
+          </a:p>
+        </p:txBody>
+      </p:sp>
+      <p:pic>
+        <p:nvPicPr>
+          <p:cNvPr id="6" name="Picture 5"/>
+          <p:cNvPicPr>
+            <a:picLocks noChangeAspect="1"/>
+          </p:cNvPicPr>
+          <p:nvPr/>
+        </p:nvPicPr>
+        <p:blipFill>
+          <a:blip r:embed="rId5"/>
+          <a:stretch>
+            <a:fillRect/>
+          </a:stretch>
+        </p:blipFill>
+        <p:spPr>
+          <a:xfrm>
+            <a:off x="6728975" y="4722304"/>
+            <a:ext cx="5152915" cy="1959454"/>
           </a:xfrm>
           <a:prstGeom prst="rect">
             <a:avLst/>
@@ -25666,7 +26621,1630 @@
     </p:spTree>
     <p:extLst>
       <p:ext uri="{BB962C8B-B14F-4D97-AF65-F5344CB8AC3E}">
-        <p14:creationId xmlns:p14="http://schemas.microsoft.com/office/powerpoint/2010/main" val="3371972319"/>
+        <p14:creationId xmlns:p14="http://schemas.microsoft.com/office/powerpoint/2010/main" val="1698266948"/>
+      </p:ext>
+    </p:extLst>
+  </p:cSld>
+  <p:clrMapOvr>
+    <a:masterClrMapping/>
+  </p:clrMapOvr>
+</p:sld>
+</file>
+
+<file path=ppt/slides/slide25.xml><?xml version="1.0" encoding="utf-8"?>
+<p:sld xmlns:a="http://schemas.openxmlformats.org/drawingml/2006/main" xmlns:r="http://schemas.openxmlformats.org/officeDocument/2006/relationships" xmlns:p="http://schemas.openxmlformats.org/presentationml/2006/main">
+  <p:cSld>
+    <p:spTree>
+      <p:nvGrpSpPr>
+        <p:cNvPr id="1" name=""/>
+        <p:cNvGrpSpPr/>
+        <p:nvPr/>
+      </p:nvGrpSpPr>
+      <p:grpSpPr>
+        <a:xfrm>
+          <a:off x="0" y="0"/>
+          <a:ext cx="0" cy="0"/>
+          <a:chOff x="0" y="0"/>
+          <a:chExt cx="0" cy="0"/>
+        </a:xfrm>
+      </p:grpSpPr>
+      <p:grpSp>
+        <p:nvGrpSpPr>
+          <p:cNvPr id="2" name="Group 1"/>
+          <p:cNvGrpSpPr/>
+          <p:nvPr/>
+        </p:nvGrpSpPr>
+        <p:grpSpPr>
+          <a:xfrm>
+            <a:off x="370543" y="302670"/>
+            <a:ext cx="2378964" cy="1621250"/>
+            <a:chOff x="119854" y="200540"/>
+            <a:chExt cx="2378964" cy="1621250"/>
+          </a:xfrm>
+        </p:grpSpPr>
+        <p:sp>
+          <p:nvSpPr>
+            <p:cNvPr id="3" name="Cloud 2"/>
+            <p:cNvSpPr/>
+            <p:nvPr/>
+          </p:nvSpPr>
+          <p:spPr>
+            <a:xfrm>
+              <a:off x="119854" y="200540"/>
+              <a:ext cx="2378964" cy="1621250"/>
+            </a:xfrm>
+            <a:prstGeom prst="cloud">
+              <a:avLst/>
+            </a:prstGeom>
+          </p:spPr>
+          <p:style>
+            <a:lnRef idx="2">
+              <a:schemeClr val="accent1">
+                <a:shade val="50000"/>
+              </a:schemeClr>
+            </a:lnRef>
+            <a:fillRef idx="1">
+              <a:schemeClr val="accent1"/>
+            </a:fillRef>
+            <a:effectRef idx="0">
+              <a:schemeClr val="accent1"/>
+            </a:effectRef>
+            <a:fontRef idx="minor">
+              <a:schemeClr val="lt1"/>
+            </a:fontRef>
+          </p:style>
+          <p:txBody>
+            <a:bodyPr rtlCol="0" anchor="ctr"/>
+            <a:lstStyle/>
+            <a:p>
+              <a:pPr algn="ctr"/>
+              <a:endParaRPr lang="es-ES"/>
+            </a:p>
+          </p:txBody>
+        </p:sp>
+        <p:sp>
+          <p:nvSpPr>
+            <p:cNvPr id="4" name="TextBox 3"/>
+            <p:cNvSpPr txBox="1"/>
+            <p:nvPr/>
+          </p:nvSpPr>
+          <p:spPr>
+            <a:xfrm>
+              <a:off x="547160" y="442269"/>
+              <a:ext cx="1524351" cy="923330"/>
+            </a:xfrm>
+            <a:prstGeom prst="rect">
+              <a:avLst/>
+            </a:prstGeom>
+            <a:noFill/>
+          </p:spPr>
+          <p:txBody>
+            <a:bodyPr wrap="square" rtlCol="0">
+              <a:spAutoFit/>
+            </a:bodyPr>
+            <a:lstStyle/>
+            <a:p>
+              <a:pPr algn="ctr"/>
+              <a:r>
+                <a:rPr lang="es-ES" dirty="0" smtClean="0">
+                  <a:solidFill>
+                    <a:schemeClr val="bg1">
+                      <a:lumMod val="95000"/>
+                    </a:schemeClr>
+                  </a:solidFill>
+                </a:rPr>
+                <a:t>Creo el modelo </a:t>
+              </a:r>
+              <a:r>
+                <a:rPr lang="es-ES" dirty="0" err="1" smtClean="0">
+                  <a:solidFill>
+                    <a:schemeClr val="bg1">
+                      <a:lumMod val="95000"/>
+                    </a:schemeClr>
+                  </a:solidFill>
+                </a:rPr>
+                <a:t>Answer</a:t>
+              </a:r>
+              <a:endParaRPr lang="es-ES" dirty="0">
+                <a:solidFill>
+                  <a:schemeClr val="bg1">
+                    <a:lumMod val="95000"/>
+                  </a:schemeClr>
+                </a:solidFill>
+              </a:endParaRPr>
+            </a:p>
+          </p:txBody>
+        </p:sp>
+      </p:grpSp>
+      <p:pic>
+        <p:nvPicPr>
+          <p:cNvPr id="6" name="Picture 5"/>
+          <p:cNvPicPr>
+            <a:picLocks noChangeAspect="1"/>
+          </p:cNvPicPr>
+          <p:nvPr/>
+        </p:nvPicPr>
+        <p:blipFill>
+          <a:blip r:embed="rId2"/>
+          <a:stretch>
+            <a:fillRect/>
+          </a:stretch>
+        </p:blipFill>
+        <p:spPr>
+          <a:xfrm>
+            <a:off x="4242039" y="386939"/>
+            <a:ext cx="3276600" cy="1238250"/>
+          </a:xfrm>
+          <a:prstGeom prst="rect">
+            <a:avLst/>
+          </a:prstGeom>
+        </p:spPr>
+      </p:pic>
+      <p:pic>
+        <p:nvPicPr>
+          <p:cNvPr id="7" name="Picture 6"/>
+          <p:cNvPicPr>
+            <a:picLocks noChangeAspect="1"/>
+          </p:cNvPicPr>
+          <p:nvPr/>
+        </p:nvPicPr>
+        <p:blipFill>
+          <a:blip r:embed="rId3"/>
+          <a:stretch>
+            <a:fillRect/>
+          </a:stretch>
+        </p:blipFill>
+        <p:spPr>
+          <a:xfrm>
+            <a:off x="1208326" y="2833867"/>
+            <a:ext cx="6067425" cy="2466975"/>
+          </a:xfrm>
+          <a:prstGeom prst="rect">
+            <a:avLst/>
+          </a:prstGeom>
+        </p:spPr>
+      </p:pic>
+      <p:sp>
+        <p:nvSpPr>
+          <p:cNvPr id="8" name="TextBox 7"/>
+          <p:cNvSpPr txBox="1"/>
+          <p:nvPr/>
+        </p:nvSpPr>
+        <p:spPr>
+          <a:xfrm>
+            <a:off x="3511772" y="3119888"/>
+            <a:ext cx="2414575" cy="369332"/>
+          </a:xfrm>
+          <a:prstGeom prst="rect">
+            <a:avLst/>
+          </a:prstGeom>
+          <a:solidFill>
+            <a:schemeClr val="accent1">
+              <a:lumMod val="40000"/>
+              <a:lumOff val="60000"/>
+            </a:schemeClr>
+          </a:solidFill>
+        </p:spPr>
+        <p:txBody>
+          <a:bodyPr wrap="square" rtlCol="0">
+            <a:spAutoFit/>
+          </a:bodyPr>
+          <a:lstStyle/>
+          <a:p>
+            <a:r>
+              <a:rPr lang="es-ES" dirty="0" smtClean="0"/>
+              <a:t>Creo las propiedades</a:t>
+            </a:r>
+            <a:endParaRPr lang="es-ES" dirty="0"/>
+          </a:p>
+        </p:txBody>
+      </p:sp>
+      <p:sp>
+        <p:nvSpPr>
+          <p:cNvPr id="9" name="TextBox 8"/>
+          <p:cNvSpPr txBox="1"/>
+          <p:nvPr/>
+        </p:nvSpPr>
+        <p:spPr>
+          <a:xfrm>
+            <a:off x="4552693" y="4399167"/>
+            <a:ext cx="2414575" cy="369332"/>
+          </a:xfrm>
+          <a:prstGeom prst="rect">
+            <a:avLst/>
+          </a:prstGeom>
+          <a:solidFill>
+            <a:schemeClr val="accent1">
+              <a:lumMod val="40000"/>
+              <a:lumOff val="60000"/>
+            </a:schemeClr>
+          </a:solidFill>
+        </p:spPr>
+        <p:txBody>
+          <a:bodyPr wrap="square" rtlCol="0">
+            <a:spAutoFit/>
+          </a:bodyPr>
+          <a:lstStyle/>
+          <a:p>
+            <a:r>
+              <a:rPr lang="es-ES" dirty="0" smtClean="0"/>
+              <a:t>Creo el constructor</a:t>
+            </a:r>
+            <a:endParaRPr lang="es-ES" dirty="0"/>
+          </a:p>
+        </p:txBody>
+      </p:sp>
+    </p:spTree>
+    <p:extLst>
+      <p:ext uri="{BB962C8B-B14F-4D97-AF65-F5344CB8AC3E}">
+        <p14:creationId xmlns:p14="http://schemas.microsoft.com/office/powerpoint/2010/main" val="1446023615"/>
+      </p:ext>
+    </p:extLst>
+  </p:cSld>
+  <p:clrMapOvr>
+    <a:masterClrMapping/>
+  </p:clrMapOvr>
+</p:sld>
+</file>
+
+<file path=ppt/slides/slide26.xml><?xml version="1.0" encoding="utf-8"?>
+<p:sld xmlns:a="http://schemas.openxmlformats.org/drawingml/2006/main" xmlns:r="http://schemas.openxmlformats.org/officeDocument/2006/relationships" xmlns:p="http://schemas.openxmlformats.org/presentationml/2006/main">
+  <p:cSld>
+    <p:spTree>
+      <p:nvGrpSpPr>
+        <p:cNvPr id="1" name=""/>
+        <p:cNvGrpSpPr/>
+        <p:nvPr/>
+      </p:nvGrpSpPr>
+      <p:grpSpPr>
+        <a:xfrm>
+          <a:off x="0" y="0"/>
+          <a:ext cx="0" cy="0"/>
+          <a:chOff x="0" y="0"/>
+          <a:chExt cx="0" cy="0"/>
+        </a:xfrm>
+      </p:grpSpPr>
+      <p:pic>
+        <p:nvPicPr>
+          <p:cNvPr id="2" name="Picture 1"/>
+          <p:cNvPicPr>
+            <a:picLocks noChangeAspect="1"/>
+          </p:cNvPicPr>
+          <p:nvPr/>
+        </p:nvPicPr>
+        <p:blipFill>
+          <a:blip r:embed="rId2"/>
+          <a:stretch>
+            <a:fillRect/>
+          </a:stretch>
+        </p:blipFill>
+        <p:spPr>
+          <a:xfrm>
+            <a:off x="5285938" y="372652"/>
+            <a:ext cx="3419475" cy="1266825"/>
+          </a:xfrm>
+          <a:prstGeom prst="rect">
+            <a:avLst/>
+          </a:prstGeom>
+        </p:spPr>
+      </p:pic>
+      <p:pic>
+        <p:nvPicPr>
+          <p:cNvPr id="3" name="Picture 2"/>
+          <p:cNvPicPr>
+            <a:picLocks noChangeAspect="1"/>
+          </p:cNvPicPr>
+          <p:nvPr/>
+        </p:nvPicPr>
+        <p:blipFill>
+          <a:blip r:embed="rId3"/>
+          <a:stretch>
+            <a:fillRect/>
+          </a:stretch>
+        </p:blipFill>
+        <p:spPr>
+          <a:xfrm>
+            <a:off x="370543" y="2208363"/>
+            <a:ext cx="9485195" cy="4494362"/>
+          </a:xfrm>
+          <a:prstGeom prst="rect">
+            <a:avLst/>
+          </a:prstGeom>
+        </p:spPr>
+      </p:pic>
+      <p:sp>
+        <p:nvSpPr>
+          <p:cNvPr id="4" name="TextBox 3"/>
+          <p:cNvSpPr txBox="1"/>
+          <p:nvPr/>
+        </p:nvSpPr>
+        <p:spPr>
+          <a:xfrm>
+            <a:off x="4066738" y="2087594"/>
+            <a:ext cx="4464787" cy="369332"/>
+          </a:xfrm>
+          <a:prstGeom prst="rect">
+            <a:avLst/>
+          </a:prstGeom>
+          <a:solidFill>
+            <a:schemeClr val="accent1">
+              <a:lumMod val="40000"/>
+              <a:lumOff val="60000"/>
+            </a:schemeClr>
+          </a:solidFill>
+        </p:spPr>
+        <p:txBody>
+          <a:bodyPr wrap="square" rtlCol="0">
+            <a:spAutoFit/>
+          </a:bodyPr>
+          <a:lstStyle/>
+          <a:p>
+            <a:r>
+              <a:rPr lang="es-ES" dirty="0" smtClean="0"/>
+              <a:t>Importo el modelo de </a:t>
+            </a:r>
+            <a:r>
+              <a:rPr lang="es-ES" dirty="0" err="1" smtClean="0"/>
+              <a:t>Answers</a:t>
+            </a:r>
+            <a:endParaRPr lang="es-ES" dirty="0"/>
+          </a:p>
+        </p:txBody>
+      </p:sp>
+      <p:sp>
+        <p:nvSpPr>
+          <p:cNvPr id="5" name="TextBox 4"/>
+          <p:cNvSpPr txBox="1"/>
+          <p:nvPr/>
+        </p:nvSpPr>
+        <p:spPr>
+          <a:xfrm>
+            <a:off x="3511772" y="3119888"/>
+            <a:ext cx="2414575" cy="369332"/>
+          </a:xfrm>
+          <a:prstGeom prst="rect">
+            <a:avLst/>
+          </a:prstGeom>
+          <a:solidFill>
+            <a:schemeClr val="accent1">
+              <a:lumMod val="40000"/>
+              <a:lumOff val="60000"/>
+            </a:schemeClr>
+          </a:solidFill>
+        </p:spPr>
+        <p:txBody>
+          <a:bodyPr wrap="square" rtlCol="0">
+            <a:spAutoFit/>
+          </a:bodyPr>
+          <a:lstStyle/>
+          <a:p>
+            <a:r>
+              <a:rPr lang="es-ES" dirty="0" smtClean="0"/>
+              <a:t>Creo las propiedades</a:t>
+            </a:r>
+            <a:endParaRPr lang="es-ES" dirty="0"/>
+          </a:p>
+        </p:txBody>
+      </p:sp>
+      <p:sp>
+        <p:nvSpPr>
+          <p:cNvPr id="6" name="TextBox 5"/>
+          <p:cNvSpPr txBox="1"/>
+          <p:nvPr/>
+        </p:nvSpPr>
+        <p:spPr>
+          <a:xfrm>
+            <a:off x="5285938" y="5161473"/>
+            <a:ext cx="2414575" cy="369332"/>
+          </a:xfrm>
+          <a:prstGeom prst="rect">
+            <a:avLst/>
+          </a:prstGeom>
+          <a:solidFill>
+            <a:schemeClr val="accent1">
+              <a:lumMod val="40000"/>
+              <a:lumOff val="60000"/>
+            </a:schemeClr>
+          </a:solidFill>
+        </p:spPr>
+        <p:txBody>
+          <a:bodyPr wrap="square" rtlCol="0">
+            <a:spAutoFit/>
+          </a:bodyPr>
+          <a:lstStyle/>
+          <a:p>
+            <a:r>
+              <a:rPr lang="es-ES" dirty="0" smtClean="0"/>
+              <a:t>Creo el constructor</a:t>
+            </a:r>
+            <a:endParaRPr lang="es-ES" dirty="0"/>
+          </a:p>
+        </p:txBody>
+      </p:sp>
+      <p:grpSp>
+        <p:nvGrpSpPr>
+          <p:cNvPr id="7" name="Group 6"/>
+          <p:cNvGrpSpPr/>
+          <p:nvPr/>
+        </p:nvGrpSpPr>
+        <p:grpSpPr>
+          <a:xfrm>
+            <a:off x="370543" y="302670"/>
+            <a:ext cx="2378964" cy="1621250"/>
+            <a:chOff x="119854" y="200540"/>
+            <a:chExt cx="2378964" cy="1621250"/>
+          </a:xfrm>
+        </p:grpSpPr>
+        <p:sp>
+          <p:nvSpPr>
+            <p:cNvPr id="8" name="Cloud 7"/>
+            <p:cNvSpPr/>
+            <p:nvPr/>
+          </p:nvSpPr>
+          <p:spPr>
+            <a:xfrm>
+              <a:off x="119854" y="200540"/>
+              <a:ext cx="2378964" cy="1621250"/>
+            </a:xfrm>
+            <a:prstGeom prst="cloud">
+              <a:avLst/>
+            </a:prstGeom>
+          </p:spPr>
+          <p:style>
+            <a:lnRef idx="2">
+              <a:schemeClr val="accent1">
+                <a:shade val="50000"/>
+              </a:schemeClr>
+            </a:lnRef>
+            <a:fillRef idx="1">
+              <a:schemeClr val="accent1"/>
+            </a:fillRef>
+            <a:effectRef idx="0">
+              <a:schemeClr val="accent1"/>
+            </a:effectRef>
+            <a:fontRef idx="minor">
+              <a:schemeClr val="lt1"/>
+            </a:fontRef>
+          </p:style>
+          <p:txBody>
+            <a:bodyPr rtlCol="0" anchor="ctr"/>
+            <a:lstStyle/>
+            <a:p>
+              <a:pPr algn="ctr"/>
+              <a:endParaRPr lang="es-ES"/>
+            </a:p>
+          </p:txBody>
+        </p:sp>
+        <p:sp>
+          <p:nvSpPr>
+            <p:cNvPr id="9" name="TextBox 8"/>
+            <p:cNvSpPr txBox="1"/>
+            <p:nvPr/>
+          </p:nvSpPr>
+          <p:spPr>
+            <a:xfrm>
+              <a:off x="547160" y="442269"/>
+              <a:ext cx="1524351" cy="923330"/>
+            </a:xfrm>
+            <a:prstGeom prst="rect">
+              <a:avLst/>
+            </a:prstGeom>
+            <a:noFill/>
+          </p:spPr>
+          <p:txBody>
+            <a:bodyPr wrap="square" rtlCol="0">
+              <a:spAutoFit/>
+            </a:bodyPr>
+            <a:lstStyle/>
+            <a:p>
+              <a:pPr algn="ctr"/>
+              <a:r>
+                <a:rPr lang="es-ES" dirty="0" smtClean="0">
+                  <a:solidFill>
+                    <a:schemeClr val="bg1">
+                      <a:lumMod val="95000"/>
+                    </a:schemeClr>
+                  </a:solidFill>
+                </a:rPr>
+                <a:t>Creo el modelo </a:t>
+              </a:r>
+              <a:r>
+                <a:rPr lang="es-ES" dirty="0" err="1" smtClean="0">
+                  <a:solidFill>
+                    <a:schemeClr val="bg1">
+                      <a:lumMod val="95000"/>
+                    </a:schemeClr>
+                  </a:solidFill>
+                </a:rPr>
+                <a:t>Question</a:t>
+              </a:r>
+              <a:endParaRPr lang="es-ES" dirty="0">
+                <a:solidFill>
+                  <a:schemeClr val="bg1">
+                    <a:lumMod val="95000"/>
+                  </a:schemeClr>
+                </a:solidFill>
+              </a:endParaRPr>
+            </a:p>
+          </p:txBody>
+        </p:sp>
+      </p:grpSp>
+    </p:spTree>
+    <p:extLst>
+      <p:ext uri="{BB962C8B-B14F-4D97-AF65-F5344CB8AC3E}">
+        <p14:creationId xmlns:p14="http://schemas.microsoft.com/office/powerpoint/2010/main" val="467245082"/>
+      </p:ext>
+    </p:extLst>
+  </p:cSld>
+  <p:clrMapOvr>
+    <a:masterClrMapping/>
+  </p:clrMapOvr>
+</p:sld>
+</file>
+
+<file path=ppt/slides/slide27.xml><?xml version="1.0" encoding="utf-8"?>
+<p:sld xmlns:a="http://schemas.openxmlformats.org/drawingml/2006/main" xmlns:r="http://schemas.openxmlformats.org/officeDocument/2006/relationships" xmlns:p="http://schemas.openxmlformats.org/presentationml/2006/main">
+  <p:cSld>
+    <p:spTree>
+      <p:nvGrpSpPr>
+        <p:cNvPr id="1" name=""/>
+        <p:cNvGrpSpPr/>
+        <p:nvPr/>
+      </p:nvGrpSpPr>
+      <p:grpSpPr>
+        <a:xfrm>
+          <a:off x="0" y="0"/>
+          <a:ext cx="0" cy="0"/>
+          <a:chOff x="0" y="0"/>
+          <a:chExt cx="0" cy="0"/>
+        </a:xfrm>
+      </p:grpSpPr>
+      <p:pic>
+        <p:nvPicPr>
+          <p:cNvPr id="2" name="Picture 1"/>
+          <p:cNvPicPr>
+            <a:picLocks noChangeAspect="1"/>
+          </p:cNvPicPr>
+          <p:nvPr/>
+        </p:nvPicPr>
+        <p:blipFill>
+          <a:blip r:embed="rId2"/>
+          <a:stretch>
+            <a:fillRect/>
+          </a:stretch>
+        </p:blipFill>
+        <p:spPr>
+          <a:xfrm>
+            <a:off x="3792658" y="371345"/>
+            <a:ext cx="3019425" cy="1552575"/>
+          </a:xfrm>
+          <a:prstGeom prst="rect">
+            <a:avLst/>
+          </a:prstGeom>
+        </p:spPr>
+      </p:pic>
+      <p:grpSp>
+        <p:nvGrpSpPr>
+          <p:cNvPr id="3" name="Group 2"/>
+          <p:cNvGrpSpPr/>
+          <p:nvPr/>
+        </p:nvGrpSpPr>
+        <p:grpSpPr>
+          <a:xfrm>
+            <a:off x="370543" y="302670"/>
+            <a:ext cx="2378964" cy="1621250"/>
+            <a:chOff x="119854" y="200540"/>
+            <a:chExt cx="2378964" cy="1621250"/>
+          </a:xfrm>
+        </p:grpSpPr>
+        <p:sp>
+          <p:nvSpPr>
+            <p:cNvPr id="4" name="Cloud 3"/>
+            <p:cNvSpPr/>
+            <p:nvPr/>
+          </p:nvSpPr>
+          <p:spPr>
+            <a:xfrm>
+              <a:off x="119854" y="200540"/>
+              <a:ext cx="2378964" cy="1621250"/>
+            </a:xfrm>
+            <a:prstGeom prst="cloud">
+              <a:avLst/>
+            </a:prstGeom>
+          </p:spPr>
+          <p:style>
+            <a:lnRef idx="2">
+              <a:schemeClr val="accent1">
+                <a:shade val="50000"/>
+              </a:schemeClr>
+            </a:lnRef>
+            <a:fillRef idx="1">
+              <a:schemeClr val="accent1"/>
+            </a:fillRef>
+            <a:effectRef idx="0">
+              <a:schemeClr val="accent1"/>
+            </a:effectRef>
+            <a:fontRef idx="minor">
+              <a:schemeClr val="lt1"/>
+            </a:fontRef>
+          </p:style>
+          <p:txBody>
+            <a:bodyPr rtlCol="0" anchor="ctr"/>
+            <a:lstStyle/>
+            <a:p>
+              <a:pPr algn="ctr"/>
+              <a:endParaRPr lang="es-ES"/>
+            </a:p>
+          </p:txBody>
+        </p:sp>
+        <p:sp>
+          <p:nvSpPr>
+            <p:cNvPr id="5" name="TextBox 4"/>
+            <p:cNvSpPr txBox="1"/>
+            <p:nvPr/>
+          </p:nvSpPr>
+          <p:spPr>
+            <a:xfrm>
+              <a:off x="478149" y="623227"/>
+              <a:ext cx="1524351" cy="646331"/>
+            </a:xfrm>
+            <a:prstGeom prst="rect">
+              <a:avLst/>
+            </a:prstGeom>
+            <a:noFill/>
+          </p:spPr>
+          <p:txBody>
+            <a:bodyPr wrap="square" rtlCol="0">
+              <a:spAutoFit/>
+            </a:bodyPr>
+            <a:lstStyle/>
+            <a:p>
+              <a:pPr algn="ctr"/>
+              <a:r>
+                <a:rPr lang="es-ES" dirty="0" smtClean="0">
+                  <a:solidFill>
+                    <a:schemeClr val="bg1">
+                      <a:lumMod val="95000"/>
+                    </a:schemeClr>
+                  </a:solidFill>
+                </a:rPr>
+                <a:t>Creo el </a:t>
+              </a:r>
+              <a:r>
+                <a:rPr lang="es-ES" dirty="0" err="1" smtClean="0">
+                  <a:solidFill>
+                    <a:schemeClr val="bg1">
+                      <a:lumMod val="95000"/>
+                    </a:schemeClr>
+                  </a:solidFill>
+                </a:rPr>
+                <a:t>service</a:t>
+              </a:r>
+              <a:endParaRPr lang="es-ES" dirty="0">
+                <a:solidFill>
+                  <a:schemeClr val="bg1">
+                    <a:lumMod val="95000"/>
+                  </a:schemeClr>
+                </a:solidFill>
+              </a:endParaRPr>
+            </a:p>
+          </p:txBody>
+        </p:sp>
+      </p:grpSp>
+      <p:pic>
+        <p:nvPicPr>
+          <p:cNvPr id="6" name="Picture 5"/>
+          <p:cNvPicPr>
+            <a:picLocks noChangeAspect="1"/>
+          </p:cNvPicPr>
+          <p:nvPr/>
+        </p:nvPicPr>
+        <p:blipFill>
+          <a:blip r:embed="rId3"/>
+          <a:stretch>
+            <a:fillRect/>
+          </a:stretch>
+        </p:blipFill>
+        <p:spPr>
+          <a:xfrm>
+            <a:off x="728838" y="2286000"/>
+            <a:ext cx="6257644" cy="4405671"/>
+          </a:xfrm>
+          <a:prstGeom prst="rect">
+            <a:avLst/>
+          </a:prstGeom>
+        </p:spPr>
+      </p:pic>
+      <p:sp>
+        <p:nvSpPr>
+          <p:cNvPr id="7" name="TextBox 6"/>
+          <p:cNvSpPr txBox="1"/>
+          <p:nvPr/>
+        </p:nvSpPr>
+        <p:spPr>
+          <a:xfrm>
+            <a:off x="5688504" y="2144471"/>
+            <a:ext cx="5163526" cy="646331"/>
+          </a:xfrm>
+          <a:prstGeom prst="rect">
+            <a:avLst/>
+          </a:prstGeom>
+          <a:solidFill>
+            <a:schemeClr val="accent1">
+              <a:lumMod val="40000"/>
+              <a:lumOff val="60000"/>
+            </a:schemeClr>
+          </a:solidFill>
+        </p:spPr>
+        <p:txBody>
+          <a:bodyPr wrap="square" rtlCol="0">
+            <a:spAutoFit/>
+          </a:bodyPr>
+          <a:lstStyle/>
+          <a:p>
+            <a:r>
+              <a:rPr lang="es-ES" dirty="0" smtClean="0"/>
+              <a:t>Importo el modelo de </a:t>
+            </a:r>
+            <a:r>
+              <a:rPr lang="es-ES" dirty="0" err="1" smtClean="0"/>
+              <a:t>Question</a:t>
+            </a:r>
+            <a:r>
+              <a:rPr lang="es-ES" dirty="0" smtClean="0"/>
+              <a:t>, el </a:t>
+            </a:r>
+            <a:r>
+              <a:rPr lang="es-ES" dirty="0" err="1" smtClean="0"/>
+              <a:t>Inject</a:t>
+            </a:r>
+            <a:r>
+              <a:rPr lang="es-ES" dirty="0" smtClean="0"/>
+              <a:t> y </a:t>
+            </a:r>
+            <a:r>
+              <a:rPr lang="es-ES" dirty="0" err="1" smtClean="0"/>
+              <a:t>NewInstance</a:t>
+            </a:r>
+            <a:endParaRPr lang="es-ES" dirty="0"/>
+          </a:p>
+        </p:txBody>
+      </p:sp>
+      <p:sp>
+        <p:nvSpPr>
+          <p:cNvPr id="8" name="TextBox 7"/>
+          <p:cNvSpPr txBox="1"/>
+          <p:nvPr/>
+        </p:nvSpPr>
+        <p:spPr>
+          <a:xfrm>
+            <a:off x="7252030" y="4488835"/>
+            <a:ext cx="3539615" cy="923330"/>
+          </a:xfrm>
+          <a:prstGeom prst="rect">
+            <a:avLst/>
+          </a:prstGeom>
+          <a:solidFill>
+            <a:schemeClr val="accent1">
+              <a:lumMod val="40000"/>
+              <a:lumOff val="60000"/>
+            </a:schemeClr>
+          </a:solidFill>
+        </p:spPr>
+        <p:txBody>
+          <a:bodyPr wrap="square" rtlCol="0">
+            <a:spAutoFit/>
+          </a:bodyPr>
+          <a:lstStyle/>
+          <a:p>
+            <a:r>
+              <a:rPr lang="es-ES" dirty="0" smtClean="0"/>
+              <a:t>Configuro la ruta y tipo de archivo del cual leer y </a:t>
+            </a:r>
+            <a:r>
+              <a:rPr lang="es-ES" dirty="0" err="1" smtClean="0"/>
+              <a:t>parseo</a:t>
+            </a:r>
+            <a:r>
+              <a:rPr lang="es-ES" dirty="0" smtClean="0"/>
+              <a:t> el JSON  al objeto </a:t>
+            </a:r>
+            <a:r>
+              <a:rPr lang="es-ES" dirty="0" err="1" smtClean="0"/>
+              <a:t>Question</a:t>
+            </a:r>
+            <a:r>
+              <a:rPr lang="es-ES" dirty="0" smtClean="0"/>
+              <a:t>.</a:t>
+            </a:r>
+            <a:endParaRPr lang="es-ES" dirty="0"/>
+          </a:p>
+        </p:txBody>
+      </p:sp>
+      <p:sp>
+        <p:nvSpPr>
+          <p:cNvPr id="9" name="TextBox 8"/>
+          <p:cNvSpPr txBox="1"/>
+          <p:nvPr/>
+        </p:nvSpPr>
+        <p:spPr>
+          <a:xfrm>
+            <a:off x="3661191" y="2825305"/>
+            <a:ext cx="2027313" cy="369332"/>
+          </a:xfrm>
+          <a:prstGeom prst="rect">
+            <a:avLst/>
+          </a:prstGeom>
+          <a:solidFill>
+            <a:schemeClr val="accent1">
+              <a:lumMod val="40000"/>
+              <a:lumOff val="60000"/>
+            </a:schemeClr>
+          </a:solidFill>
+        </p:spPr>
+        <p:txBody>
+          <a:bodyPr wrap="square" rtlCol="0">
+            <a:spAutoFit/>
+          </a:bodyPr>
+          <a:lstStyle/>
+          <a:p>
+            <a:r>
+              <a:rPr lang="es-ES" dirty="0" smtClean="0"/>
+              <a:t>Inyecto la </a:t>
+            </a:r>
+            <a:r>
+              <a:rPr lang="es-ES" dirty="0" err="1" smtClean="0"/>
+              <a:t>Question</a:t>
+            </a:r>
+            <a:endParaRPr lang="es-ES" dirty="0"/>
+          </a:p>
+        </p:txBody>
+      </p:sp>
+    </p:spTree>
+    <p:extLst>
+      <p:ext uri="{BB962C8B-B14F-4D97-AF65-F5344CB8AC3E}">
+        <p14:creationId xmlns:p14="http://schemas.microsoft.com/office/powerpoint/2010/main" val="768701156"/>
+      </p:ext>
+    </p:extLst>
+  </p:cSld>
+  <p:clrMapOvr>
+    <a:masterClrMapping/>
+  </p:clrMapOvr>
+</p:sld>
+</file>
+
+<file path=ppt/slides/slide28.xml><?xml version="1.0" encoding="utf-8"?>
+<p:sld xmlns:a="http://schemas.openxmlformats.org/drawingml/2006/main" xmlns:r="http://schemas.openxmlformats.org/officeDocument/2006/relationships" xmlns:p="http://schemas.openxmlformats.org/presentationml/2006/main">
+  <p:cSld>
+    <p:spTree>
+      <p:nvGrpSpPr>
+        <p:cNvPr id="1" name=""/>
+        <p:cNvGrpSpPr/>
+        <p:nvPr/>
+      </p:nvGrpSpPr>
+      <p:grpSpPr>
+        <a:xfrm>
+          <a:off x="0" y="0"/>
+          <a:ext cx="0" cy="0"/>
+          <a:chOff x="0" y="0"/>
+          <a:chExt cx="0" cy="0"/>
+        </a:xfrm>
+      </p:grpSpPr>
+      <p:pic>
+        <p:nvPicPr>
+          <p:cNvPr id="2" name="Picture 1"/>
+          <p:cNvPicPr>
+            <a:picLocks noChangeAspect="1"/>
+          </p:cNvPicPr>
+          <p:nvPr/>
+        </p:nvPicPr>
+        <p:blipFill>
+          <a:blip r:embed="rId2"/>
+          <a:stretch>
+            <a:fillRect/>
+          </a:stretch>
+        </p:blipFill>
+        <p:spPr>
+          <a:xfrm>
+            <a:off x="2840428" y="923026"/>
+            <a:ext cx="9089291" cy="5755346"/>
+          </a:xfrm>
+          <a:prstGeom prst="rect">
+            <a:avLst/>
+          </a:prstGeom>
+        </p:spPr>
+      </p:pic>
+      <p:grpSp>
+        <p:nvGrpSpPr>
+          <p:cNvPr id="3" name="Group 2"/>
+          <p:cNvGrpSpPr/>
+          <p:nvPr/>
+        </p:nvGrpSpPr>
+        <p:grpSpPr>
+          <a:xfrm>
+            <a:off x="370543" y="302670"/>
+            <a:ext cx="2378964" cy="1621250"/>
+            <a:chOff x="119854" y="200540"/>
+            <a:chExt cx="2378964" cy="1621250"/>
+          </a:xfrm>
+        </p:grpSpPr>
+        <p:sp>
+          <p:nvSpPr>
+            <p:cNvPr id="4" name="Cloud 3"/>
+            <p:cNvSpPr/>
+            <p:nvPr/>
+          </p:nvSpPr>
+          <p:spPr>
+            <a:xfrm>
+              <a:off x="119854" y="200540"/>
+              <a:ext cx="2378964" cy="1621250"/>
+            </a:xfrm>
+            <a:prstGeom prst="cloud">
+              <a:avLst/>
+            </a:prstGeom>
+          </p:spPr>
+          <p:style>
+            <a:lnRef idx="2">
+              <a:schemeClr val="accent1">
+                <a:shade val="50000"/>
+              </a:schemeClr>
+            </a:lnRef>
+            <a:fillRef idx="1">
+              <a:schemeClr val="accent1"/>
+            </a:fillRef>
+            <a:effectRef idx="0">
+              <a:schemeClr val="accent1"/>
+            </a:effectRef>
+            <a:fontRef idx="minor">
+              <a:schemeClr val="lt1"/>
+            </a:fontRef>
+          </p:style>
+          <p:txBody>
+            <a:bodyPr rtlCol="0" anchor="ctr"/>
+            <a:lstStyle/>
+            <a:p>
+              <a:pPr algn="ctr"/>
+              <a:endParaRPr lang="es-ES"/>
+            </a:p>
+          </p:txBody>
+        </p:sp>
+        <p:sp>
+          <p:nvSpPr>
+            <p:cNvPr id="5" name="TextBox 4"/>
+            <p:cNvSpPr txBox="1"/>
+            <p:nvPr/>
+          </p:nvSpPr>
+          <p:spPr>
+            <a:xfrm>
+              <a:off x="478149" y="623227"/>
+              <a:ext cx="1524351" cy="646331"/>
+            </a:xfrm>
+            <a:prstGeom prst="rect">
+              <a:avLst/>
+            </a:prstGeom>
+            <a:noFill/>
+          </p:spPr>
+          <p:txBody>
+            <a:bodyPr wrap="square" rtlCol="0">
+              <a:spAutoFit/>
+            </a:bodyPr>
+            <a:lstStyle/>
+            <a:p>
+              <a:pPr algn="ctr"/>
+              <a:r>
+                <a:rPr lang="es-ES" dirty="0" smtClean="0">
+                  <a:solidFill>
+                    <a:schemeClr val="bg1">
+                      <a:lumMod val="95000"/>
+                    </a:schemeClr>
+                  </a:solidFill>
+                </a:rPr>
+                <a:t>Modifico el </a:t>
+              </a:r>
+              <a:r>
+                <a:rPr lang="es-ES" dirty="0" err="1" smtClean="0">
+                  <a:solidFill>
+                    <a:schemeClr val="bg1">
+                      <a:lumMod val="95000"/>
+                    </a:schemeClr>
+                  </a:solidFill>
+                </a:rPr>
+                <a:t>app.ts</a:t>
+              </a:r>
+              <a:endParaRPr lang="es-ES" dirty="0">
+                <a:solidFill>
+                  <a:schemeClr val="bg1">
+                    <a:lumMod val="95000"/>
+                  </a:schemeClr>
+                </a:solidFill>
+              </a:endParaRPr>
+            </a:p>
+          </p:txBody>
+        </p:sp>
+      </p:grpSp>
+      <p:sp>
+        <p:nvSpPr>
+          <p:cNvPr id="6" name="TextBox 5"/>
+          <p:cNvSpPr txBox="1"/>
+          <p:nvPr/>
+        </p:nvSpPr>
+        <p:spPr>
+          <a:xfrm>
+            <a:off x="9561764" y="923026"/>
+            <a:ext cx="2367955" cy="923330"/>
+          </a:xfrm>
+          <a:prstGeom prst="rect">
+            <a:avLst/>
+          </a:prstGeom>
+          <a:solidFill>
+            <a:schemeClr val="accent1">
+              <a:lumMod val="40000"/>
+              <a:lumOff val="60000"/>
+            </a:schemeClr>
+          </a:solidFill>
+        </p:spPr>
+        <p:txBody>
+          <a:bodyPr wrap="square" rtlCol="0">
+            <a:spAutoFit/>
+          </a:bodyPr>
+          <a:lstStyle/>
+          <a:p>
+            <a:r>
+              <a:rPr lang="es-ES" dirty="0" smtClean="0"/>
+              <a:t>Importo el modelo de </a:t>
+            </a:r>
+            <a:r>
+              <a:rPr lang="es-ES" dirty="0" err="1" smtClean="0"/>
+              <a:t>Question</a:t>
+            </a:r>
+            <a:r>
+              <a:rPr lang="es-ES" dirty="0" smtClean="0"/>
+              <a:t>, el </a:t>
+            </a:r>
+            <a:r>
+              <a:rPr lang="es-ES" dirty="0" err="1" smtClean="0"/>
+              <a:t>Inject</a:t>
+            </a:r>
+            <a:r>
+              <a:rPr lang="es-ES" dirty="0" smtClean="0"/>
+              <a:t> y el </a:t>
+            </a:r>
+            <a:r>
+              <a:rPr lang="es-ES" dirty="0" err="1" smtClean="0"/>
+              <a:t>Service</a:t>
+            </a:r>
+            <a:endParaRPr lang="es-ES" dirty="0"/>
+          </a:p>
+        </p:txBody>
+      </p:sp>
+      <p:sp>
+        <p:nvSpPr>
+          <p:cNvPr id="7" name="TextBox 6"/>
+          <p:cNvSpPr txBox="1"/>
+          <p:nvPr/>
+        </p:nvSpPr>
+        <p:spPr>
+          <a:xfrm>
+            <a:off x="6847214" y="3269736"/>
+            <a:ext cx="2367955" cy="646331"/>
+          </a:xfrm>
+          <a:prstGeom prst="rect">
+            <a:avLst/>
+          </a:prstGeom>
+          <a:solidFill>
+            <a:schemeClr val="accent1">
+              <a:lumMod val="40000"/>
+              <a:lumOff val="60000"/>
+            </a:schemeClr>
+          </a:solidFill>
+        </p:spPr>
+        <p:txBody>
+          <a:bodyPr wrap="square" rtlCol="0">
+            <a:spAutoFit/>
+          </a:bodyPr>
+          <a:lstStyle/>
+          <a:p>
+            <a:r>
+              <a:rPr lang="es-ES" dirty="0" smtClean="0"/>
+              <a:t>Modifico las propiedades</a:t>
+            </a:r>
+            <a:endParaRPr lang="es-ES" dirty="0"/>
+          </a:p>
+        </p:txBody>
+      </p:sp>
+      <p:sp>
+        <p:nvSpPr>
+          <p:cNvPr id="8" name="Rectangle 7"/>
+          <p:cNvSpPr/>
+          <p:nvPr/>
+        </p:nvSpPr>
+        <p:spPr>
+          <a:xfrm>
+            <a:off x="2976113" y="3450566"/>
+            <a:ext cx="3372929" cy="284672"/>
+          </a:xfrm>
+          <a:prstGeom prst="rect">
+            <a:avLst/>
+          </a:prstGeom>
+          <a:noFill/>
+        </p:spPr>
+        <p:style>
+          <a:lnRef idx="2">
+            <a:schemeClr val="accent1">
+              <a:shade val="50000"/>
+            </a:schemeClr>
+          </a:lnRef>
+          <a:fillRef idx="1">
+            <a:schemeClr val="accent1"/>
+          </a:fillRef>
+          <a:effectRef idx="0">
+            <a:schemeClr val="accent1"/>
+          </a:effectRef>
+          <a:fontRef idx="minor">
+            <a:schemeClr val="lt1"/>
+          </a:fontRef>
+        </p:style>
+        <p:txBody>
+          <a:bodyPr rtlCol="0" anchor="ctr"/>
+          <a:lstStyle/>
+          <a:p>
+            <a:pPr algn="ctr"/>
+            <a:endParaRPr lang="es-ES"/>
+          </a:p>
+        </p:txBody>
+      </p:sp>
+      <p:sp>
+        <p:nvSpPr>
+          <p:cNvPr id="9" name="Rectangle 8"/>
+          <p:cNvSpPr/>
+          <p:nvPr/>
+        </p:nvSpPr>
+        <p:spPr>
+          <a:xfrm>
+            <a:off x="2976113" y="4500113"/>
+            <a:ext cx="3623095" cy="284672"/>
+          </a:xfrm>
+          <a:prstGeom prst="rect">
+            <a:avLst/>
+          </a:prstGeom>
+          <a:noFill/>
+        </p:spPr>
+        <p:style>
+          <a:lnRef idx="2">
+            <a:schemeClr val="accent1">
+              <a:shade val="50000"/>
+            </a:schemeClr>
+          </a:lnRef>
+          <a:fillRef idx="1">
+            <a:schemeClr val="accent1"/>
+          </a:fillRef>
+          <a:effectRef idx="0">
+            <a:schemeClr val="accent1"/>
+          </a:effectRef>
+          <a:fontRef idx="minor">
+            <a:schemeClr val="lt1"/>
+          </a:fontRef>
+        </p:style>
+        <p:txBody>
+          <a:bodyPr rtlCol="0" anchor="ctr"/>
+          <a:lstStyle/>
+          <a:p>
+            <a:pPr algn="ctr"/>
+            <a:endParaRPr lang="es-ES"/>
+          </a:p>
+        </p:txBody>
+      </p:sp>
+      <p:sp>
+        <p:nvSpPr>
+          <p:cNvPr id="10" name="Rectangle 9"/>
+          <p:cNvSpPr/>
+          <p:nvPr/>
+        </p:nvSpPr>
+        <p:spPr>
+          <a:xfrm>
+            <a:off x="3226279" y="5264988"/>
+            <a:ext cx="4804913" cy="284672"/>
+          </a:xfrm>
+          <a:prstGeom prst="rect">
+            <a:avLst/>
+          </a:prstGeom>
+          <a:noFill/>
+        </p:spPr>
+        <p:style>
+          <a:lnRef idx="2">
+            <a:schemeClr val="accent1">
+              <a:shade val="50000"/>
+            </a:schemeClr>
+          </a:lnRef>
+          <a:fillRef idx="1">
+            <a:schemeClr val="accent1"/>
+          </a:fillRef>
+          <a:effectRef idx="0">
+            <a:schemeClr val="accent1"/>
+          </a:effectRef>
+          <a:fontRef idx="minor">
+            <a:schemeClr val="lt1"/>
+          </a:fontRef>
+        </p:style>
+        <p:txBody>
+          <a:bodyPr rtlCol="0" anchor="ctr"/>
+          <a:lstStyle/>
+          <a:p>
+            <a:pPr algn="ctr"/>
+            <a:endParaRPr lang="es-ES"/>
+          </a:p>
+        </p:txBody>
+      </p:sp>
+      <p:sp>
+        <p:nvSpPr>
+          <p:cNvPr id="12" name="Rectangle 11"/>
+          <p:cNvSpPr/>
+          <p:nvPr/>
+        </p:nvSpPr>
+        <p:spPr>
+          <a:xfrm>
+            <a:off x="2840428" y="1923920"/>
+            <a:ext cx="3372929" cy="284672"/>
+          </a:xfrm>
+          <a:prstGeom prst="rect">
+            <a:avLst/>
+          </a:prstGeom>
+          <a:noFill/>
+        </p:spPr>
+        <p:style>
+          <a:lnRef idx="2">
+            <a:schemeClr val="accent1">
+              <a:shade val="50000"/>
+            </a:schemeClr>
+          </a:lnRef>
+          <a:fillRef idx="1">
+            <a:schemeClr val="accent1"/>
+          </a:fillRef>
+          <a:effectRef idx="0">
+            <a:schemeClr val="accent1"/>
+          </a:effectRef>
+          <a:fontRef idx="minor">
+            <a:schemeClr val="lt1"/>
+          </a:fontRef>
+        </p:style>
+        <p:txBody>
+          <a:bodyPr rtlCol="0" anchor="ctr"/>
+          <a:lstStyle/>
+          <a:p>
+            <a:pPr algn="ctr"/>
+            <a:endParaRPr lang="es-ES"/>
+          </a:p>
+        </p:txBody>
+      </p:sp>
+      <p:sp>
+        <p:nvSpPr>
+          <p:cNvPr id="13" name="TextBox 12"/>
+          <p:cNvSpPr txBox="1"/>
+          <p:nvPr/>
+        </p:nvSpPr>
+        <p:spPr>
+          <a:xfrm>
+            <a:off x="6507908" y="1807722"/>
+            <a:ext cx="1825209" cy="369332"/>
+          </a:xfrm>
+          <a:prstGeom prst="rect">
+            <a:avLst/>
+          </a:prstGeom>
+          <a:solidFill>
+            <a:schemeClr val="accent1">
+              <a:lumMod val="40000"/>
+              <a:lumOff val="60000"/>
+            </a:schemeClr>
+          </a:solidFill>
+        </p:spPr>
+        <p:txBody>
+          <a:bodyPr wrap="square" rtlCol="0">
+            <a:spAutoFit/>
+          </a:bodyPr>
+          <a:lstStyle/>
+          <a:p>
+            <a:r>
+              <a:rPr lang="es-ES" dirty="0" smtClean="0"/>
+              <a:t>Inyecto el </a:t>
+            </a:r>
+            <a:r>
+              <a:rPr lang="es-ES" dirty="0" err="1"/>
+              <a:t>S</a:t>
+            </a:r>
+            <a:r>
+              <a:rPr lang="es-ES" dirty="0" err="1" smtClean="0"/>
+              <a:t>ervice</a:t>
+            </a:r>
+            <a:endParaRPr lang="es-ES" dirty="0"/>
+          </a:p>
+        </p:txBody>
+      </p:sp>
+      <p:sp>
+        <p:nvSpPr>
+          <p:cNvPr id="14" name="TextBox 13"/>
+          <p:cNvSpPr txBox="1"/>
+          <p:nvPr/>
+        </p:nvSpPr>
+        <p:spPr>
+          <a:xfrm>
+            <a:off x="8796478" y="5147419"/>
+            <a:ext cx="2367955" cy="369332"/>
+          </a:xfrm>
+          <a:prstGeom prst="rect">
+            <a:avLst/>
+          </a:prstGeom>
+          <a:solidFill>
+            <a:schemeClr val="accent1">
+              <a:lumMod val="40000"/>
+              <a:lumOff val="60000"/>
+            </a:schemeClr>
+          </a:solidFill>
+        </p:spPr>
+        <p:txBody>
+          <a:bodyPr wrap="square" rtlCol="0">
+            <a:spAutoFit/>
+          </a:bodyPr>
+          <a:lstStyle/>
+          <a:p>
+            <a:r>
+              <a:rPr lang="es-ES" dirty="0" smtClean="0"/>
+              <a:t>Inicializo el servicio</a:t>
+            </a:r>
+            <a:endParaRPr lang="es-ES" dirty="0"/>
+          </a:p>
+        </p:txBody>
+      </p:sp>
+    </p:spTree>
+    <p:extLst>
+      <p:ext uri="{BB962C8B-B14F-4D97-AF65-F5344CB8AC3E}">
+        <p14:creationId xmlns:p14="http://schemas.microsoft.com/office/powerpoint/2010/main" val="1194010355"/>
+      </p:ext>
+    </p:extLst>
+  </p:cSld>
+  <p:clrMapOvr>
+    <a:masterClrMapping/>
+  </p:clrMapOvr>
+</p:sld>
+</file>
+
+<file path=ppt/slides/slide29.xml><?xml version="1.0" encoding="utf-8"?>
+<p:sld xmlns:a="http://schemas.openxmlformats.org/drawingml/2006/main" xmlns:r="http://schemas.openxmlformats.org/officeDocument/2006/relationships" xmlns:p="http://schemas.openxmlformats.org/presentationml/2006/main">
+  <p:cSld>
+    <p:spTree>
+      <p:nvGrpSpPr>
+        <p:cNvPr id="1" name=""/>
+        <p:cNvGrpSpPr/>
+        <p:nvPr/>
+      </p:nvGrpSpPr>
+      <p:grpSpPr>
+        <a:xfrm>
+          <a:off x="0" y="0"/>
+          <a:ext cx="0" cy="0"/>
+          <a:chOff x="0" y="0"/>
+          <a:chExt cx="0" cy="0"/>
+        </a:xfrm>
+      </p:grpSpPr>
+      <p:pic>
+        <p:nvPicPr>
+          <p:cNvPr id="2" name="Picture 1"/>
+          <p:cNvPicPr>
+            <a:picLocks noChangeAspect="1"/>
+          </p:cNvPicPr>
+          <p:nvPr/>
+        </p:nvPicPr>
+        <p:blipFill>
+          <a:blip r:embed="rId2"/>
+          <a:stretch>
+            <a:fillRect/>
+          </a:stretch>
+        </p:blipFill>
+        <p:spPr>
+          <a:xfrm>
+            <a:off x="562155" y="687776"/>
+            <a:ext cx="7772400" cy="3981450"/>
+          </a:xfrm>
+          <a:prstGeom prst="rect">
+            <a:avLst/>
+          </a:prstGeom>
+        </p:spPr>
+      </p:pic>
+      <p:sp>
+        <p:nvSpPr>
+          <p:cNvPr id="3" name="TextBox 2"/>
+          <p:cNvSpPr txBox="1"/>
+          <p:nvPr/>
+        </p:nvSpPr>
+        <p:spPr>
+          <a:xfrm>
+            <a:off x="8158429" y="768076"/>
+            <a:ext cx="2367955" cy="923330"/>
+          </a:xfrm>
+          <a:prstGeom prst="rect">
+            <a:avLst/>
+          </a:prstGeom>
+          <a:solidFill>
+            <a:schemeClr val="accent1">
+              <a:lumMod val="40000"/>
+              <a:lumOff val="60000"/>
+            </a:schemeClr>
+          </a:solidFill>
+        </p:spPr>
+        <p:txBody>
+          <a:bodyPr wrap="square" rtlCol="0">
+            <a:spAutoFit/>
+          </a:bodyPr>
+          <a:lstStyle/>
+          <a:p>
+            <a:r>
+              <a:rPr lang="es-ES" dirty="0" smtClean="0"/>
+              <a:t>Llamo al método de obtener las preguntas del servicio</a:t>
+            </a:r>
+            <a:endParaRPr lang="es-ES" dirty="0"/>
+          </a:p>
+        </p:txBody>
+      </p:sp>
+      <p:sp>
+        <p:nvSpPr>
+          <p:cNvPr id="4" name="TextBox 3"/>
+          <p:cNvSpPr txBox="1"/>
+          <p:nvPr/>
+        </p:nvSpPr>
+        <p:spPr>
+          <a:xfrm>
+            <a:off x="8158428" y="2792408"/>
+            <a:ext cx="2367955" cy="646331"/>
+          </a:xfrm>
+          <a:prstGeom prst="rect">
+            <a:avLst/>
+          </a:prstGeom>
+          <a:solidFill>
+            <a:schemeClr val="accent1">
+              <a:lumMod val="40000"/>
+              <a:lumOff val="60000"/>
+            </a:schemeClr>
+          </a:solidFill>
+        </p:spPr>
+        <p:txBody>
+          <a:bodyPr wrap="square" rtlCol="0">
+            <a:spAutoFit/>
+          </a:bodyPr>
+          <a:lstStyle/>
+          <a:p>
+            <a:r>
+              <a:rPr lang="es-ES" dirty="0" smtClean="0"/>
+              <a:t>Asigno las preguntas a la variable</a:t>
+            </a:r>
+            <a:endParaRPr lang="es-ES" dirty="0"/>
+          </a:p>
+        </p:txBody>
+      </p:sp>
+      <p:sp>
+        <p:nvSpPr>
+          <p:cNvPr id="5" name="Rectangle 4"/>
+          <p:cNvSpPr/>
+          <p:nvPr/>
+        </p:nvSpPr>
+        <p:spPr>
+          <a:xfrm>
+            <a:off x="978736" y="2678501"/>
+            <a:ext cx="4818215" cy="288985"/>
+          </a:xfrm>
+          <a:prstGeom prst="rect">
+            <a:avLst/>
+          </a:prstGeom>
+          <a:noFill/>
+        </p:spPr>
+        <p:style>
+          <a:lnRef idx="2">
+            <a:schemeClr val="accent1">
+              <a:shade val="50000"/>
+            </a:schemeClr>
+          </a:lnRef>
+          <a:fillRef idx="1">
+            <a:schemeClr val="accent1"/>
+          </a:fillRef>
+          <a:effectRef idx="0">
+            <a:schemeClr val="accent1"/>
+          </a:effectRef>
+          <a:fontRef idx="minor">
+            <a:schemeClr val="lt1"/>
+          </a:fontRef>
+        </p:style>
+        <p:txBody>
+          <a:bodyPr rtlCol="0" anchor="ctr"/>
+          <a:lstStyle/>
+          <a:p>
+            <a:pPr algn="ctr"/>
+            <a:endParaRPr lang="es-ES"/>
+          </a:p>
+        </p:txBody>
+      </p:sp>
+      <p:sp>
+        <p:nvSpPr>
+          <p:cNvPr id="6" name="Rectangle 5"/>
+          <p:cNvSpPr/>
+          <p:nvPr/>
+        </p:nvSpPr>
+        <p:spPr>
+          <a:xfrm>
+            <a:off x="804594" y="768075"/>
+            <a:ext cx="7131708" cy="1457539"/>
+          </a:xfrm>
+          <a:prstGeom prst="rect">
+            <a:avLst/>
+          </a:prstGeom>
+          <a:noFill/>
+        </p:spPr>
+        <p:style>
+          <a:lnRef idx="2">
+            <a:schemeClr val="accent1">
+              <a:shade val="50000"/>
+            </a:schemeClr>
+          </a:lnRef>
+          <a:fillRef idx="1">
+            <a:schemeClr val="accent1"/>
+          </a:fillRef>
+          <a:effectRef idx="0">
+            <a:schemeClr val="accent1"/>
+          </a:effectRef>
+          <a:fontRef idx="minor">
+            <a:schemeClr val="lt1"/>
+          </a:fontRef>
+        </p:style>
+        <p:txBody>
+          <a:bodyPr rtlCol="0" anchor="ctr"/>
+          <a:lstStyle/>
+          <a:p>
+            <a:pPr algn="ctr"/>
+            <a:endParaRPr lang="es-ES"/>
+          </a:p>
+        </p:txBody>
+      </p:sp>
+      <p:sp>
+        <p:nvSpPr>
+          <p:cNvPr id="7" name="Rectangle 6"/>
+          <p:cNvSpPr/>
+          <p:nvPr/>
+        </p:nvSpPr>
+        <p:spPr>
+          <a:xfrm>
+            <a:off x="804594" y="2343833"/>
+            <a:ext cx="2551081" cy="334668"/>
+          </a:xfrm>
+          <a:prstGeom prst="rect">
+            <a:avLst/>
+          </a:prstGeom>
+          <a:noFill/>
+        </p:spPr>
+        <p:style>
+          <a:lnRef idx="2">
+            <a:schemeClr val="accent1">
+              <a:shade val="50000"/>
+            </a:schemeClr>
+          </a:lnRef>
+          <a:fillRef idx="1">
+            <a:schemeClr val="accent1"/>
+          </a:fillRef>
+          <a:effectRef idx="0">
+            <a:schemeClr val="accent1"/>
+          </a:effectRef>
+          <a:fontRef idx="minor">
+            <a:schemeClr val="lt1"/>
+          </a:fontRef>
+        </p:style>
+        <p:txBody>
+          <a:bodyPr rtlCol="0" anchor="ctr"/>
+          <a:lstStyle/>
+          <a:p>
+            <a:pPr algn="ctr"/>
+            <a:endParaRPr lang="es-ES"/>
+          </a:p>
+        </p:txBody>
+      </p:sp>
+    </p:spTree>
+    <p:extLst>
+      <p:ext uri="{BB962C8B-B14F-4D97-AF65-F5344CB8AC3E}">
+        <p14:creationId xmlns:p14="http://schemas.microsoft.com/office/powerpoint/2010/main" val="1549740110"/>
       </p:ext>
     </p:extLst>
   </p:cSld>

</xml_diff>

<commit_message>
Added improvements suggested by Sergio
</commit_message>
<xml_diff>
--- a/Documents/Trivial_Aurelia.pptx
+++ b/Documents/Trivial_Aurelia.pptx
@@ -50,6 +50,10 @@
     <p:sldId id="293" r:id="rId44"/>
     <p:sldId id="294" r:id="rId45"/>
     <p:sldId id="295" r:id="rId46"/>
+    <p:sldId id="304" r:id="rId47"/>
+    <p:sldId id="305" r:id="rId48"/>
+    <p:sldId id="306" r:id="rId49"/>
+    <p:sldId id="308" r:id="rId50"/>
   </p:sldIdLst>
   <p:sldSz cx="12192000" cy="6858000"/>
   <p:notesSz cx="6858000" cy="9144000"/>
@@ -924,7 +928,7 @@
         <a:bodyPr/>
         <a:lstStyle/>
         <a:p>
-          <a:endParaRPr lang="es-ES" sz="2400" b="1" dirty="0" smtClean="0">
+          <a:endParaRPr lang="es-ES" sz="2400" b="1" dirty="0">
             <a:solidFill>
               <a:schemeClr val="bg1"/>
             </a:solidFill>
@@ -932,7 +936,7 @@
         </a:p>
         <a:p>
           <a:r>
-            <a:rPr lang="es-ES" sz="2400" b="1" dirty="0" smtClean="0">
+            <a:rPr lang="es-ES" sz="2400" b="1" dirty="0">
               <a:solidFill>
                 <a:schemeClr val="bg1"/>
               </a:solidFill>
@@ -979,10 +983,9 @@
         <a:lstStyle/>
         <a:p>
           <a:r>
-            <a:rPr lang="es-ES" b="1" dirty="0" smtClean="0"/>
+            <a:rPr lang="es-ES" b="1" dirty="0"/>
             <a:t>https://auth0.com/blog/creating-your-first-aurelia-app-from-authentication-to-calling-an-api/</a:t>
           </a:r>
-          <a:endParaRPr lang="es-ES" b="1" dirty="0"/>
         </a:p>
       </dgm:t>
     </dgm:pt>
@@ -1016,10 +1019,9 @@
         <a:lstStyle/>
         <a:p>
           <a:r>
-            <a:rPr lang="es-ES" b="1" dirty="0" smtClean="0"/>
+            <a:rPr lang="es-ES" b="1" dirty="0"/>
             <a:t>https://www.tutorialspoint.com/aurelia</a:t>
           </a:r>
-          <a:endParaRPr lang="es-ES" b="1" dirty="0"/>
         </a:p>
       </dgm:t>
     </dgm:pt>
@@ -1054,13 +1056,6 @@
         </dgm:presLayoutVars>
       </dgm:prSet>
       <dgm:spPr/>
-      <dgm:t>
-        <a:bodyPr/>
-        <a:lstStyle/>
-        <a:p>
-          <a:endParaRPr lang="es-ES"/>
-        </a:p>
-      </dgm:t>
     </dgm:pt>
     <dgm:pt modelId="{0EA0962A-BD26-4091-8295-A775C89CDA8C}" type="pres">
       <dgm:prSet presAssocID="{524FAD36-6427-420F-A088-B30E3CEEF33F}" presName="parentLin" presStyleCnt="0"/>
@@ -1069,13 +1064,6 @@
     <dgm:pt modelId="{3E9F1D4B-92B3-4E9D-8272-8C13C5823F3D}" type="pres">
       <dgm:prSet presAssocID="{524FAD36-6427-420F-A088-B30E3CEEF33F}" presName="parentLeftMargin" presStyleLbl="node1" presStyleIdx="0" presStyleCnt="3"/>
       <dgm:spPr/>
-      <dgm:t>
-        <a:bodyPr/>
-        <a:lstStyle/>
-        <a:p>
-          <a:endParaRPr lang="es-ES"/>
-        </a:p>
-      </dgm:t>
     </dgm:pt>
     <dgm:pt modelId="{15D25FA9-9F23-484A-AD36-01895651C082}" type="pres">
       <dgm:prSet presAssocID="{524FAD36-6427-420F-A088-B30E3CEEF33F}" presName="parentText" presStyleLbl="node1" presStyleIdx="0" presStyleCnt="3" custScaleX="142857" custLinFactNeighborY="1354">
@@ -1085,13 +1073,6 @@
         </dgm:presLayoutVars>
       </dgm:prSet>
       <dgm:spPr/>
-      <dgm:t>
-        <a:bodyPr/>
-        <a:lstStyle/>
-        <a:p>
-          <a:endParaRPr lang="es-ES"/>
-        </a:p>
-      </dgm:t>
     </dgm:pt>
     <dgm:pt modelId="{E471D4B3-8390-4978-A713-64CC6A8E42E4}" type="pres">
       <dgm:prSet presAssocID="{524FAD36-6427-420F-A088-B30E3CEEF33F}" presName="negativeSpace" presStyleCnt="0"/>
@@ -1116,13 +1097,6 @@
     <dgm:pt modelId="{2CA51563-A068-48CF-96A1-6A09517C4A93}" type="pres">
       <dgm:prSet presAssocID="{653B0388-BBA6-489D-A5AF-C69599486601}" presName="parentLeftMargin" presStyleLbl="node1" presStyleIdx="0" presStyleCnt="3"/>
       <dgm:spPr/>
-      <dgm:t>
-        <a:bodyPr/>
-        <a:lstStyle/>
-        <a:p>
-          <a:endParaRPr lang="es-ES"/>
-        </a:p>
-      </dgm:t>
     </dgm:pt>
     <dgm:pt modelId="{EA5BAA43-1229-49A6-B91B-8A34676699D5}" type="pres">
       <dgm:prSet presAssocID="{653B0388-BBA6-489D-A5AF-C69599486601}" presName="parentText" presStyleLbl="node1" presStyleIdx="1" presStyleCnt="3" custScaleX="135315">
@@ -1132,13 +1106,6 @@
         </dgm:presLayoutVars>
       </dgm:prSet>
       <dgm:spPr/>
-      <dgm:t>
-        <a:bodyPr/>
-        <a:lstStyle/>
-        <a:p>
-          <a:endParaRPr lang="es-ES"/>
-        </a:p>
-      </dgm:t>
     </dgm:pt>
     <dgm:pt modelId="{1AA2C79C-1525-4E02-9A7F-9995DA9C3040}" type="pres">
       <dgm:prSet presAssocID="{653B0388-BBA6-489D-A5AF-C69599486601}" presName="negativeSpace" presStyleCnt="0"/>
@@ -1163,13 +1130,6 @@
     <dgm:pt modelId="{2B17653E-8892-4C66-A6D6-7A3899BB4605}" type="pres">
       <dgm:prSet presAssocID="{02967419-1AAA-45B4-9310-F983B14A7464}" presName="parentLeftMargin" presStyleLbl="node1" presStyleIdx="1" presStyleCnt="3"/>
       <dgm:spPr/>
-      <dgm:t>
-        <a:bodyPr/>
-        <a:lstStyle/>
-        <a:p>
-          <a:endParaRPr lang="es-ES"/>
-        </a:p>
-      </dgm:t>
     </dgm:pt>
     <dgm:pt modelId="{C8AAF37D-DE77-49AD-94BA-D22C0BE47A96}" type="pres">
       <dgm:prSet presAssocID="{02967419-1AAA-45B4-9310-F983B14A7464}" presName="parentText" presStyleLbl="node1" presStyleIdx="2" presStyleCnt="3" custScaleX="142816">
@@ -1179,13 +1139,6 @@
         </dgm:presLayoutVars>
       </dgm:prSet>
       <dgm:spPr/>
-      <dgm:t>
-        <a:bodyPr/>
-        <a:lstStyle/>
-        <a:p>
-          <a:endParaRPr lang="es-ES"/>
-        </a:p>
-      </dgm:t>
     </dgm:pt>
     <dgm:pt modelId="{BBA7C93D-09A4-4FBE-BC0A-7110B233D5D3}" type="pres">
       <dgm:prSet presAssocID="{02967419-1AAA-45B4-9310-F983B14A7464}" presName="negativeSpace" presStyleCnt="0"/>
@@ -1201,16 +1154,16 @@
     </dgm:pt>
   </dgm:ptLst>
   <dgm:cxnLst>
+    <dgm:cxn modelId="{07512042-9AD8-4BE8-9FDA-F5E5D9AC227C}" srcId="{66BD7887-96FE-4612-BBA5-BE773799EFCB}" destId="{02967419-1AAA-45B4-9310-F983B14A7464}" srcOrd="2" destOrd="0" parTransId="{40474EB1-F66A-47D3-926F-B6FCDE6FAA9E}" sibTransId="{38C40B34-A78C-44AD-AB4B-709A6B1889FC}"/>
+    <dgm:cxn modelId="{4FD7DF63-4154-4EF3-B816-A14D72CC452D}" type="presOf" srcId="{524FAD36-6427-420F-A088-B30E3CEEF33F}" destId="{15D25FA9-9F23-484A-AD36-01895651C082}" srcOrd="1" destOrd="0" presId="urn:microsoft.com/office/officeart/2005/8/layout/list1"/>
+    <dgm:cxn modelId="{5526314C-8A6F-4DA4-8949-F546466959F0}" type="presOf" srcId="{653B0388-BBA6-489D-A5AF-C69599486601}" destId="{2CA51563-A068-48CF-96A1-6A09517C4A93}" srcOrd="0" destOrd="0" presId="urn:microsoft.com/office/officeart/2005/8/layout/list1"/>
+    <dgm:cxn modelId="{297BA5A3-9319-4C4A-AC73-AEC03C86662C}" type="presOf" srcId="{02967419-1AAA-45B4-9310-F983B14A7464}" destId="{2B17653E-8892-4C66-A6D6-7A3899BB4605}" srcOrd="0" destOrd="0" presId="urn:microsoft.com/office/officeart/2005/8/layout/list1"/>
+    <dgm:cxn modelId="{8253F0A3-B7A9-4CAD-AFE6-5CA754106FAD}" srcId="{66BD7887-96FE-4612-BBA5-BE773799EFCB}" destId="{524FAD36-6427-420F-A088-B30E3CEEF33F}" srcOrd="0" destOrd="0" parTransId="{3BA6D9C4-E088-459D-96A5-31B62E8CA855}" sibTransId="{EA3D7F17-5612-4478-9BA3-B058C8C09960}"/>
     <dgm:cxn modelId="{4B6CBCA4-87EB-45E5-B8FB-DFB85C251EE3}" type="presOf" srcId="{524FAD36-6427-420F-A088-B30E3CEEF33F}" destId="{3E9F1D4B-92B3-4E9D-8272-8C13C5823F3D}" srcOrd="0" destOrd="0" presId="urn:microsoft.com/office/officeart/2005/8/layout/list1"/>
-    <dgm:cxn modelId="{8253F0A3-B7A9-4CAD-AFE6-5CA754106FAD}" srcId="{66BD7887-96FE-4612-BBA5-BE773799EFCB}" destId="{524FAD36-6427-420F-A088-B30E3CEEF33F}" srcOrd="0" destOrd="0" parTransId="{3BA6D9C4-E088-459D-96A5-31B62E8CA855}" sibTransId="{EA3D7F17-5612-4478-9BA3-B058C8C09960}"/>
-    <dgm:cxn modelId="{5526314C-8A6F-4DA4-8949-F546466959F0}" type="presOf" srcId="{653B0388-BBA6-489D-A5AF-C69599486601}" destId="{2CA51563-A068-48CF-96A1-6A09517C4A93}" srcOrd="0" destOrd="0" presId="urn:microsoft.com/office/officeart/2005/8/layout/list1"/>
-    <dgm:cxn modelId="{4FD7DF63-4154-4EF3-B816-A14D72CC452D}" type="presOf" srcId="{524FAD36-6427-420F-A088-B30E3CEEF33F}" destId="{15D25FA9-9F23-484A-AD36-01895651C082}" srcOrd="1" destOrd="0" presId="urn:microsoft.com/office/officeart/2005/8/layout/list1"/>
-    <dgm:cxn modelId="{07512042-9AD8-4BE8-9FDA-F5E5D9AC227C}" srcId="{66BD7887-96FE-4612-BBA5-BE773799EFCB}" destId="{02967419-1AAA-45B4-9310-F983B14A7464}" srcOrd="2" destOrd="0" parTransId="{40474EB1-F66A-47D3-926F-B6FCDE6FAA9E}" sibTransId="{38C40B34-A78C-44AD-AB4B-709A6B1889FC}"/>
+    <dgm:cxn modelId="{68B013E7-0D15-4A1B-A53A-135AB202337E}" srcId="{66BD7887-96FE-4612-BBA5-BE773799EFCB}" destId="{653B0388-BBA6-489D-A5AF-C69599486601}" srcOrd="1" destOrd="0" parTransId="{02200897-2B34-4008-A0E9-35308B73EC85}" sibTransId="{651E8358-6391-45FF-96CE-0C4AA9080180}"/>
     <dgm:cxn modelId="{9DDAC5E9-C471-490E-AA05-B324D63C0886}" type="presOf" srcId="{02967419-1AAA-45B4-9310-F983B14A7464}" destId="{C8AAF37D-DE77-49AD-94BA-D22C0BE47A96}" srcOrd="1" destOrd="0" presId="urn:microsoft.com/office/officeart/2005/8/layout/list1"/>
-    <dgm:cxn modelId="{68B013E7-0D15-4A1B-A53A-135AB202337E}" srcId="{66BD7887-96FE-4612-BBA5-BE773799EFCB}" destId="{653B0388-BBA6-489D-A5AF-C69599486601}" srcOrd="1" destOrd="0" parTransId="{02200897-2B34-4008-A0E9-35308B73EC85}" sibTransId="{651E8358-6391-45FF-96CE-0C4AA9080180}"/>
+    <dgm:cxn modelId="{EFB6D9E9-5702-4E65-A2E4-7F3A323F4CE3}" type="presOf" srcId="{653B0388-BBA6-489D-A5AF-C69599486601}" destId="{EA5BAA43-1229-49A6-B91B-8A34676699D5}" srcOrd="1" destOrd="0" presId="urn:microsoft.com/office/officeart/2005/8/layout/list1"/>
     <dgm:cxn modelId="{A1721FF0-2786-40A8-A09A-B2CFC11C880D}" type="presOf" srcId="{66BD7887-96FE-4612-BBA5-BE773799EFCB}" destId="{EDAA86A7-6F37-4C99-A990-2FDEFC5DEA7C}" srcOrd="0" destOrd="0" presId="urn:microsoft.com/office/officeart/2005/8/layout/list1"/>
-    <dgm:cxn modelId="{EFB6D9E9-5702-4E65-A2E4-7F3A323F4CE3}" type="presOf" srcId="{653B0388-BBA6-489D-A5AF-C69599486601}" destId="{EA5BAA43-1229-49A6-B91B-8A34676699D5}" srcOrd="1" destOrd="0" presId="urn:microsoft.com/office/officeart/2005/8/layout/list1"/>
-    <dgm:cxn modelId="{297BA5A3-9319-4C4A-AC73-AEC03C86662C}" type="presOf" srcId="{02967419-1AAA-45B4-9310-F983B14A7464}" destId="{2B17653E-8892-4C66-A6D6-7A3899BB4605}" srcOrd="0" destOrd="0" presId="urn:microsoft.com/office/officeart/2005/8/layout/list1"/>
     <dgm:cxn modelId="{BF3DD0F6-663D-4B57-8E23-002005099D98}" type="presParOf" srcId="{EDAA86A7-6F37-4C99-A990-2FDEFC5DEA7C}" destId="{0EA0962A-BD26-4091-8295-A775C89CDA8C}" srcOrd="0" destOrd="0" presId="urn:microsoft.com/office/officeart/2005/8/layout/list1"/>
     <dgm:cxn modelId="{A037519E-813A-4F19-8F59-9A81ABB9AA08}" type="presParOf" srcId="{0EA0962A-BD26-4091-8295-A775C89CDA8C}" destId="{3E9F1D4B-92B3-4E9D-8272-8C13C5823F3D}" srcOrd="0" destOrd="0" presId="urn:microsoft.com/office/officeart/2005/8/layout/list1"/>
     <dgm:cxn modelId="{490547AC-83EE-4BD1-BA3A-27620D7DF99B}" type="presParOf" srcId="{0EA0962A-BD26-4091-8295-A775C89CDA8C}" destId="{15D25FA9-9F23-484A-AD36-01895651C082}" srcOrd="1" destOrd="0" presId="urn:microsoft.com/office/officeart/2005/8/layout/list1"/>
@@ -1349,7 +1302,7 @@
         </a:bodyPr>
         <a:lstStyle/>
         <a:p>
-          <a:pPr lvl="0" algn="l" defTabSz="1066800">
+          <a:pPr marL="0" lvl="0" indent="0" algn="l" defTabSz="1066800">
             <a:lnSpc>
               <a:spcPct val="90000"/>
             </a:lnSpc>
@@ -1359,15 +1312,16 @@
             <a:spcAft>
               <a:spcPct val="35000"/>
             </a:spcAft>
+            <a:buNone/>
           </a:pPr>
-          <a:endParaRPr lang="es-ES" sz="2400" b="1" kern="1200" dirty="0" smtClean="0">
+          <a:endParaRPr lang="es-ES" sz="2400" b="1" kern="1200" dirty="0">
             <a:solidFill>
               <a:schemeClr val="bg1"/>
             </a:solidFill>
           </a:endParaRPr>
         </a:p>
         <a:p>
-          <a:pPr lvl="0" algn="l" defTabSz="1066800">
+          <a:pPr marL="0" lvl="0" indent="0" algn="l" defTabSz="1066800">
             <a:lnSpc>
               <a:spcPct val="90000"/>
             </a:lnSpc>
@@ -1377,9 +1331,10 @@
             <a:spcAft>
               <a:spcPct val="35000"/>
             </a:spcAft>
+            <a:buNone/>
           </a:pPr>
           <a:r>
-            <a:rPr lang="es-ES" sz="2400" b="1" kern="1200" dirty="0" smtClean="0">
+            <a:rPr lang="es-ES" sz="2400" b="1" kern="1200" dirty="0">
               <a:solidFill>
                 <a:schemeClr val="bg1"/>
               </a:solidFill>
@@ -1388,7 +1343,7 @@
           </a:r>
         </a:p>
         <a:p>
-          <a:pPr lvl="0" algn="l" defTabSz="1066800">
+          <a:pPr marL="0" lvl="0" indent="0" algn="l" defTabSz="1066800">
             <a:lnSpc>
               <a:spcPct val="90000"/>
             </a:lnSpc>
@@ -1398,6 +1353,7 @@
             <a:spcAft>
               <a:spcPct val="35000"/>
             </a:spcAft>
+            <a:buNone/>
           </a:pPr>
           <a:endParaRPr lang="es-ES" sz="2400" b="1" kern="1200" dirty="0">
             <a:solidFill>
@@ -1513,7 +1469,7 @@
         </a:bodyPr>
         <a:lstStyle/>
         <a:p>
-          <a:pPr lvl="0" algn="l" defTabSz="1111250">
+          <a:pPr marL="0" lvl="0" indent="0" algn="l" defTabSz="1111250">
             <a:lnSpc>
               <a:spcPct val="90000"/>
             </a:lnSpc>
@@ -1523,12 +1479,12 @@
             <a:spcAft>
               <a:spcPct val="35000"/>
             </a:spcAft>
+            <a:buNone/>
           </a:pPr>
           <a:r>
-            <a:rPr lang="es-ES" sz="2500" b="1" kern="1200" dirty="0" smtClean="0"/>
+            <a:rPr lang="es-ES" sz="2500" b="1" kern="1200" dirty="0"/>
             <a:t>https://auth0.com/blog/creating-your-first-aurelia-app-from-authentication-to-calling-an-api/</a:t>
           </a:r>
-          <a:endParaRPr lang="es-ES" sz="2500" b="1" kern="1200" dirty="0"/>
         </a:p>
       </dsp:txBody>
       <dsp:txXfrm>
@@ -1638,7 +1594,7 @@
         </a:bodyPr>
         <a:lstStyle/>
         <a:p>
-          <a:pPr lvl="0" algn="l" defTabSz="1111250">
+          <a:pPr marL="0" lvl="0" indent="0" algn="l" defTabSz="1111250">
             <a:lnSpc>
               <a:spcPct val="90000"/>
             </a:lnSpc>
@@ -1648,12 +1604,12 @@
             <a:spcAft>
               <a:spcPct val="35000"/>
             </a:spcAft>
+            <a:buNone/>
           </a:pPr>
           <a:r>
-            <a:rPr lang="es-ES" sz="2500" b="1" kern="1200" dirty="0" smtClean="0"/>
+            <a:rPr lang="es-ES" sz="2500" b="1" kern="1200" dirty="0"/>
             <a:t>https://www.tutorialspoint.com/aurelia</a:t>
           </a:r>
-          <a:endParaRPr lang="es-ES" sz="2500" b="1" kern="1200" dirty="0"/>
         </a:p>
       </dsp:txBody>
       <dsp:txXfrm>
@@ -11609,7 +11565,7 @@
           </a:lstStyle>
           <a:p>
             <a:r>
-              <a:rPr lang="en-US" smtClean="0"/>
+              <a:rPr lang="en-US"/>
               <a:t>Click to edit Master title style</a:t>
             </a:r>
             <a:endParaRPr lang="en-US" dirty="0"/>
@@ -11689,7 +11645,7 @@
           </a:lstStyle>
           <a:p>
             <a:r>
-              <a:rPr lang="en-US" smtClean="0"/>
+              <a:rPr lang="en-US"/>
               <a:t>Click to edit Master subtitle style</a:t>
             </a:r>
             <a:endParaRPr lang="en-US" dirty="0"/>
@@ -11717,7 +11673,7 @@
           <a:p>
             <a:fld id="{5AF17004-BA72-482E-B0B8-4E04C09BC19D}" type="datetimeFigureOut">
               <a:rPr lang="es-ES" smtClean="0"/>
-              <a:t>04.mar.2018</a:t>
+              <a:t>17/05/2018</a:t>
             </a:fld>
             <a:endParaRPr lang="es-ES"/>
           </a:p>
@@ -11759,7 +11715,7 @@
           <a:p>
             <a:fld id="{2510A040-14AA-4893-8DE2-2533720F2351}" type="slidenum">
               <a:rPr lang="es-ES" smtClean="0"/>
-              <a:t>‹#›</a:t>
+              <a:t>‹Nº›</a:t>
             </a:fld>
             <a:endParaRPr lang="es-ES"/>
           </a:p>
@@ -11848,7 +11804,7 @@
           <a:lstStyle/>
           <a:p>
             <a:r>
-              <a:rPr lang="en-US" smtClean="0"/>
+              <a:rPr lang="en-US"/>
               <a:t>Click to edit Master title style</a:t>
             </a:r>
             <a:endParaRPr lang="en-US" dirty="0"/>
@@ -11872,35 +11828,35 @@
           <a:p>
             <a:pPr lvl="0"/>
             <a:r>
-              <a:rPr lang="en-US" smtClean="0"/>
+              <a:rPr lang="en-US"/>
               <a:t>Click to edit Master text styles</a:t>
             </a:r>
           </a:p>
           <a:p>
             <a:pPr lvl="1"/>
             <a:r>
-              <a:rPr lang="en-US" smtClean="0"/>
+              <a:rPr lang="en-US"/>
               <a:t>Second level</a:t>
             </a:r>
           </a:p>
           <a:p>
             <a:pPr lvl="2"/>
             <a:r>
-              <a:rPr lang="en-US" smtClean="0"/>
+              <a:rPr lang="en-US"/>
               <a:t>Third level</a:t>
             </a:r>
           </a:p>
           <a:p>
             <a:pPr lvl="3"/>
             <a:r>
-              <a:rPr lang="en-US" smtClean="0"/>
+              <a:rPr lang="en-US"/>
               <a:t>Fourth level</a:t>
             </a:r>
           </a:p>
           <a:p>
             <a:pPr lvl="4"/>
             <a:r>
-              <a:rPr lang="en-US" smtClean="0"/>
+              <a:rPr lang="en-US"/>
               <a:t>Fifth level</a:t>
             </a:r>
             <a:endParaRPr lang="en-US" dirty="0"/>
@@ -11924,7 +11880,7 @@
           <a:p>
             <a:fld id="{5AF17004-BA72-482E-B0B8-4E04C09BC19D}" type="datetimeFigureOut">
               <a:rPr lang="es-ES" smtClean="0"/>
-              <a:t>04.mar.2018</a:t>
+              <a:t>17/05/2018</a:t>
             </a:fld>
             <a:endParaRPr lang="es-ES"/>
           </a:p>
@@ -11966,7 +11922,7 @@
           <a:p>
             <a:fld id="{2510A040-14AA-4893-8DE2-2533720F2351}" type="slidenum">
               <a:rPr lang="es-ES" smtClean="0"/>
-              <a:t>‹#›</a:t>
+              <a:t>‹Nº›</a:t>
             </a:fld>
             <a:endParaRPr lang="es-ES"/>
           </a:p>
@@ -12023,7 +11979,7 @@
           <a:lstStyle/>
           <a:p>
             <a:r>
-              <a:rPr lang="en-US" smtClean="0"/>
+              <a:rPr lang="en-US"/>
               <a:t>Click to edit Master title style</a:t>
             </a:r>
             <a:endParaRPr lang="en-US" dirty="0"/>
@@ -12052,35 +12008,35 @@
           <a:p>
             <a:pPr lvl="0"/>
             <a:r>
-              <a:rPr lang="en-US" smtClean="0"/>
+              <a:rPr lang="en-US"/>
               <a:t>Click to edit Master text styles</a:t>
             </a:r>
           </a:p>
           <a:p>
             <a:pPr lvl="1"/>
             <a:r>
-              <a:rPr lang="en-US" smtClean="0"/>
+              <a:rPr lang="en-US"/>
               <a:t>Second level</a:t>
             </a:r>
           </a:p>
           <a:p>
             <a:pPr lvl="2"/>
             <a:r>
-              <a:rPr lang="en-US" smtClean="0"/>
+              <a:rPr lang="en-US"/>
               <a:t>Third level</a:t>
             </a:r>
           </a:p>
           <a:p>
             <a:pPr lvl="3"/>
             <a:r>
-              <a:rPr lang="en-US" smtClean="0"/>
+              <a:rPr lang="en-US"/>
               <a:t>Fourth level</a:t>
             </a:r>
           </a:p>
           <a:p>
             <a:pPr lvl="4"/>
             <a:r>
-              <a:rPr lang="en-US" smtClean="0"/>
+              <a:rPr lang="en-US"/>
               <a:t>Fifth level</a:t>
             </a:r>
             <a:endParaRPr lang="en-US" dirty="0"/>
@@ -12104,7 +12060,7 @@
           <a:p>
             <a:fld id="{5AF17004-BA72-482E-B0B8-4E04C09BC19D}" type="datetimeFigureOut">
               <a:rPr lang="es-ES" smtClean="0"/>
-              <a:t>04.mar.2018</a:t>
+              <a:t>17/05/2018</a:t>
             </a:fld>
             <a:endParaRPr lang="es-ES"/>
           </a:p>
@@ -12146,7 +12102,7 @@
           <a:p>
             <a:fld id="{2510A040-14AA-4893-8DE2-2533720F2351}" type="slidenum">
               <a:rPr lang="es-ES" smtClean="0"/>
-              <a:t>‹#›</a:t>
+              <a:t>‹Nº›</a:t>
             </a:fld>
             <a:endParaRPr lang="es-ES"/>
           </a:p>
@@ -12233,7 +12189,7 @@
           <a:lstStyle/>
           <a:p>
             <a:r>
-              <a:rPr lang="en-US" smtClean="0"/>
+              <a:rPr lang="en-US"/>
               <a:t>Click to edit Master title style</a:t>
             </a:r>
             <a:endParaRPr lang="en-US" dirty="0"/>
@@ -12257,35 +12213,35 @@
           <a:p>
             <a:pPr lvl="0"/>
             <a:r>
-              <a:rPr lang="en-US" smtClean="0"/>
+              <a:rPr lang="en-US"/>
               <a:t>Click to edit Master text styles</a:t>
             </a:r>
           </a:p>
           <a:p>
             <a:pPr lvl="1"/>
             <a:r>
-              <a:rPr lang="en-US" smtClean="0"/>
+              <a:rPr lang="en-US"/>
               <a:t>Second level</a:t>
             </a:r>
           </a:p>
           <a:p>
             <a:pPr lvl="2"/>
             <a:r>
-              <a:rPr lang="en-US" smtClean="0"/>
+              <a:rPr lang="en-US"/>
               <a:t>Third level</a:t>
             </a:r>
           </a:p>
           <a:p>
             <a:pPr lvl="3"/>
             <a:r>
-              <a:rPr lang="en-US" smtClean="0"/>
+              <a:rPr lang="en-US"/>
               <a:t>Fourth level</a:t>
             </a:r>
           </a:p>
           <a:p>
             <a:pPr lvl="4"/>
             <a:r>
-              <a:rPr lang="en-US" smtClean="0"/>
+              <a:rPr lang="en-US"/>
               <a:t>Fifth level</a:t>
             </a:r>
             <a:endParaRPr lang="en-US" dirty="0"/>
@@ -12309,7 +12265,7 @@
           <a:p>
             <a:fld id="{5AF17004-BA72-482E-B0B8-4E04C09BC19D}" type="datetimeFigureOut">
               <a:rPr lang="es-ES" smtClean="0"/>
-              <a:t>04.mar.2018</a:t>
+              <a:t>17/05/2018</a:t>
             </a:fld>
             <a:endParaRPr lang="es-ES"/>
           </a:p>
@@ -12351,7 +12307,7 @@
           <a:p>
             <a:fld id="{2510A040-14AA-4893-8DE2-2533720F2351}" type="slidenum">
               <a:rPr lang="es-ES" smtClean="0"/>
-              <a:t>‹#›</a:t>
+              <a:t>‹Nº›</a:t>
             </a:fld>
             <a:endParaRPr lang="es-ES"/>
           </a:p>
@@ -21055,7 +21011,7 @@
           </a:lstStyle>
           <a:p>
             <a:r>
-              <a:rPr lang="en-US" smtClean="0"/>
+              <a:rPr lang="en-US"/>
               <a:t>Click to edit Master title style</a:t>
             </a:r>
             <a:endParaRPr lang="en-US" dirty="0"/>
@@ -21184,7 +21140,7 @@
           <a:p>
             <a:pPr lvl="0"/>
             <a:r>
-              <a:rPr lang="en-US" smtClean="0"/>
+              <a:rPr lang="en-US"/>
               <a:t>Click to edit Master text styles</a:t>
             </a:r>
           </a:p>
@@ -21207,7 +21163,7 @@
           <a:p>
             <a:fld id="{5AF17004-BA72-482E-B0B8-4E04C09BC19D}" type="datetimeFigureOut">
               <a:rPr lang="es-ES" smtClean="0"/>
-              <a:t>04.mar.2018</a:t>
+              <a:t>17/05/2018</a:t>
             </a:fld>
             <a:endParaRPr lang="es-ES"/>
           </a:p>
@@ -21249,7 +21205,7 @@
           <a:p>
             <a:fld id="{2510A040-14AA-4893-8DE2-2533720F2351}" type="slidenum">
               <a:rPr lang="es-ES" smtClean="0"/>
-              <a:t>‹#›</a:t>
+              <a:t>‹Nº›</a:t>
             </a:fld>
             <a:endParaRPr lang="es-ES"/>
           </a:p>
@@ -21343,7 +21299,7 @@
           <a:lstStyle/>
           <a:p>
             <a:r>
-              <a:rPr lang="en-US" smtClean="0"/>
+              <a:rPr lang="en-US"/>
               <a:t>Click to edit Master title style</a:t>
             </a:r>
             <a:endParaRPr lang="en-US" dirty="0"/>
@@ -21372,35 +21328,35 @@
           <a:p>
             <a:pPr lvl="0"/>
             <a:r>
-              <a:rPr lang="en-US" smtClean="0"/>
+              <a:rPr lang="en-US"/>
               <a:t>Click to edit Master text styles</a:t>
             </a:r>
           </a:p>
           <a:p>
             <a:pPr lvl="1"/>
             <a:r>
-              <a:rPr lang="en-US" smtClean="0"/>
+              <a:rPr lang="en-US"/>
               <a:t>Second level</a:t>
             </a:r>
           </a:p>
           <a:p>
             <a:pPr lvl="2"/>
             <a:r>
-              <a:rPr lang="en-US" smtClean="0"/>
+              <a:rPr lang="en-US"/>
               <a:t>Third level</a:t>
             </a:r>
           </a:p>
           <a:p>
             <a:pPr lvl="3"/>
             <a:r>
-              <a:rPr lang="en-US" smtClean="0"/>
+              <a:rPr lang="en-US"/>
               <a:t>Fourth level</a:t>
             </a:r>
           </a:p>
           <a:p>
             <a:pPr lvl="4"/>
             <a:r>
-              <a:rPr lang="en-US" smtClean="0"/>
+              <a:rPr lang="en-US"/>
               <a:t>Fifth level</a:t>
             </a:r>
             <a:endParaRPr lang="en-US" dirty="0"/>
@@ -21429,35 +21385,35 @@
           <a:p>
             <a:pPr lvl="0"/>
             <a:r>
-              <a:rPr lang="en-US" smtClean="0"/>
+              <a:rPr lang="en-US"/>
               <a:t>Click to edit Master text styles</a:t>
             </a:r>
           </a:p>
           <a:p>
             <a:pPr lvl="1"/>
             <a:r>
-              <a:rPr lang="en-US" smtClean="0"/>
+              <a:rPr lang="en-US"/>
               <a:t>Second level</a:t>
             </a:r>
           </a:p>
           <a:p>
             <a:pPr lvl="2"/>
             <a:r>
-              <a:rPr lang="en-US" smtClean="0"/>
+              <a:rPr lang="en-US"/>
               <a:t>Third level</a:t>
             </a:r>
           </a:p>
           <a:p>
             <a:pPr lvl="3"/>
             <a:r>
-              <a:rPr lang="en-US" smtClean="0"/>
+              <a:rPr lang="en-US"/>
               <a:t>Fourth level</a:t>
             </a:r>
           </a:p>
           <a:p>
             <a:pPr lvl="4"/>
             <a:r>
-              <a:rPr lang="en-US" smtClean="0"/>
+              <a:rPr lang="en-US"/>
               <a:t>Fifth level</a:t>
             </a:r>
             <a:endParaRPr lang="en-US" dirty="0"/>
@@ -21481,7 +21437,7 @@
           <a:p>
             <a:fld id="{5AF17004-BA72-482E-B0B8-4E04C09BC19D}" type="datetimeFigureOut">
               <a:rPr lang="es-ES" smtClean="0"/>
-              <a:t>04.mar.2018</a:t>
+              <a:t>17/05/2018</a:t>
             </a:fld>
             <a:endParaRPr lang="es-ES"/>
           </a:p>
@@ -21523,7 +21479,7 @@
           <a:p>
             <a:fld id="{2510A040-14AA-4893-8DE2-2533720F2351}" type="slidenum">
               <a:rPr lang="es-ES" smtClean="0"/>
-              <a:t>‹#›</a:t>
+              <a:t>‹Nº›</a:t>
             </a:fld>
             <a:endParaRPr lang="es-ES"/>
           </a:p>
@@ -21575,7 +21531,7 @@
           <a:lstStyle/>
           <a:p>
             <a:r>
-              <a:rPr lang="en-US" smtClean="0"/>
+              <a:rPr lang="en-US"/>
               <a:t>Click to edit Master title style</a:t>
             </a:r>
             <a:endParaRPr lang="en-US" dirty="0"/>
@@ -21654,7 +21610,7 @@
           <a:p>
             <a:pPr lvl="0"/>
             <a:r>
-              <a:rPr lang="en-US" smtClean="0"/>
+              <a:rPr lang="en-US"/>
               <a:t>Click to edit Master text styles</a:t>
             </a:r>
           </a:p>
@@ -21682,35 +21638,35 @@
           <a:p>
             <a:pPr lvl="0"/>
             <a:r>
-              <a:rPr lang="en-US" smtClean="0"/>
+              <a:rPr lang="en-US"/>
               <a:t>Click to edit Master text styles</a:t>
             </a:r>
           </a:p>
           <a:p>
             <a:pPr lvl="1"/>
             <a:r>
-              <a:rPr lang="en-US" smtClean="0"/>
+              <a:rPr lang="en-US"/>
               <a:t>Second level</a:t>
             </a:r>
           </a:p>
           <a:p>
             <a:pPr lvl="2"/>
             <a:r>
-              <a:rPr lang="en-US" smtClean="0"/>
+              <a:rPr lang="en-US"/>
               <a:t>Third level</a:t>
             </a:r>
           </a:p>
           <a:p>
             <a:pPr lvl="3"/>
             <a:r>
-              <a:rPr lang="en-US" smtClean="0"/>
+              <a:rPr lang="en-US"/>
               <a:t>Fourth level</a:t>
             </a:r>
           </a:p>
           <a:p>
             <a:pPr lvl="4"/>
             <a:r>
-              <a:rPr lang="en-US" smtClean="0"/>
+              <a:rPr lang="en-US"/>
               <a:t>Fifth level</a:t>
             </a:r>
             <a:endParaRPr lang="en-US" dirty="0"/>
@@ -21799,7 +21755,7 @@
               <a:buNone/>
             </a:pPr>
             <a:r>
-              <a:rPr lang="en-US" smtClean="0"/>
+              <a:rPr lang="en-US"/>
               <a:t>Click to edit Master text styles</a:t>
             </a:r>
           </a:p>
@@ -21827,35 +21783,35 @@
           <a:p>
             <a:pPr lvl="0"/>
             <a:r>
-              <a:rPr lang="en-US" smtClean="0"/>
+              <a:rPr lang="en-US"/>
               <a:t>Click to edit Master text styles</a:t>
             </a:r>
           </a:p>
           <a:p>
             <a:pPr lvl="1"/>
             <a:r>
-              <a:rPr lang="en-US" smtClean="0"/>
+              <a:rPr lang="en-US"/>
               <a:t>Second level</a:t>
             </a:r>
           </a:p>
           <a:p>
             <a:pPr lvl="2"/>
             <a:r>
-              <a:rPr lang="en-US" smtClean="0"/>
+              <a:rPr lang="en-US"/>
               <a:t>Third level</a:t>
             </a:r>
           </a:p>
           <a:p>
             <a:pPr lvl="3"/>
             <a:r>
-              <a:rPr lang="en-US" smtClean="0"/>
+              <a:rPr lang="en-US"/>
               <a:t>Fourth level</a:t>
             </a:r>
           </a:p>
           <a:p>
             <a:pPr lvl="4"/>
             <a:r>
-              <a:rPr lang="en-US" smtClean="0"/>
+              <a:rPr lang="en-US"/>
               <a:t>Fifth level</a:t>
             </a:r>
             <a:endParaRPr lang="en-US" dirty="0"/>
@@ -21879,7 +21835,7 @@
           <a:p>
             <a:fld id="{5AF17004-BA72-482E-B0B8-4E04C09BC19D}" type="datetimeFigureOut">
               <a:rPr lang="es-ES" smtClean="0"/>
-              <a:t>04.mar.2018</a:t>
+              <a:t>17/05/2018</a:t>
             </a:fld>
             <a:endParaRPr lang="es-ES"/>
           </a:p>
@@ -21921,7 +21877,7 @@
           <a:p>
             <a:fld id="{2510A040-14AA-4893-8DE2-2533720F2351}" type="slidenum">
               <a:rPr lang="es-ES" smtClean="0"/>
-              <a:t>‹#›</a:t>
+              <a:t>‹Nº›</a:t>
             </a:fld>
             <a:endParaRPr lang="es-ES"/>
           </a:p>
@@ -21973,7 +21929,7 @@
           <a:lstStyle/>
           <a:p>
             <a:r>
-              <a:rPr lang="en-US" smtClean="0"/>
+              <a:rPr lang="en-US"/>
               <a:t>Click to edit Master title style</a:t>
             </a:r>
             <a:endParaRPr lang="en-US" dirty="0"/>
@@ -21997,7 +21953,7 @@
           <a:p>
             <a:fld id="{5AF17004-BA72-482E-B0B8-4E04C09BC19D}" type="datetimeFigureOut">
               <a:rPr lang="es-ES" smtClean="0"/>
-              <a:t>04.mar.2018</a:t>
+              <a:t>17/05/2018</a:t>
             </a:fld>
             <a:endParaRPr lang="es-ES"/>
           </a:p>
@@ -22039,7 +21995,7 @@
           <a:p>
             <a:fld id="{2510A040-14AA-4893-8DE2-2533720F2351}" type="slidenum">
               <a:rPr lang="es-ES" smtClean="0"/>
-              <a:t>‹#›</a:t>
+              <a:t>‹Nº›</a:t>
             </a:fld>
             <a:endParaRPr lang="es-ES"/>
           </a:p>
@@ -22092,7 +22048,7 @@
           <a:p>
             <a:fld id="{5AF17004-BA72-482E-B0B8-4E04C09BC19D}" type="datetimeFigureOut">
               <a:rPr lang="es-ES" smtClean="0"/>
-              <a:t>04.mar.2018</a:t>
+              <a:t>17/05/2018</a:t>
             </a:fld>
             <a:endParaRPr lang="es-ES"/>
           </a:p>
@@ -22134,7 +22090,7 @@
           <a:p>
             <a:fld id="{2510A040-14AA-4893-8DE2-2533720F2351}" type="slidenum">
               <a:rPr lang="es-ES" smtClean="0"/>
-              <a:t>‹#›</a:t>
+              <a:t>‹Nº›</a:t>
             </a:fld>
             <a:endParaRPr lang="es-ES"/>
           </a:p>
@@ -22200,7 +22156,7 @@
           </a:lstStyle>
           <a:p>
             <a:r>
-              <a:rPr lang="en-US" smtClean="0"/>
+              <a:rPr lang="en-US"/>
               <a:t>Click to edit Master title style</a:t>
             </a:r>
             <a:endParaRPr lang="en-US" dirty="0"/>
@@ -22257,35 +22213,35 @@
           <a:p>
             <a:pPr lvl="0"/>
             <a:r>
-              <a:rPr lang="en-US" smtClean="0"/>
+              <a:rPr lang="en-US"/>
               <a:t>Click to edit Master text styles</a:t>
             </a:r>
           </a:p>
           <a:p>
             <a:pPr lvl="1"/>
             <a:r>
-              <a:rPr lang="en-US" smtClean="0"/>
+              <a:rPr lang="en-US"/>
               <a:t>Second level</a:t>
             </a:r>
           </a:p>
           <a:p>
             <a:pPr lvl="2"/>
             <a:r>
-              <a:rPr lang="en-US" smtClean="0"/>
+              <a:rPr lang="en-US"/>
               <a:t>Third level</a:t>
             </a:r>
           </a:p>
           <a:p>
             <a:pPr lvl="3"/>
             <a:r>
-              <a:rPr lang="en-US" smtClean="0"/>
+              <a:rPr lang="en-US"/>
               <a:t>Fourth level</a:t>
             </a:r>
           </a:p>
           <a:p>
             <a:pPr lvl="4"/>
             <a:r>
-              <a:rPr lang="en-US" smtClean="0"/>
+              <a:rPr lang="en-US"/>
               <a:t>Fifth level</a:t>
             </a:r>
             <a:endParaRPr lang="en-US" dirty="0"/>
@@ -22359,7 +22315,7 @@
           <a:p>
             <a:pPr lvl="0"/>
             <a:r>
-              <a:rPr lang="en-US" smtClean="0"/>
+              <a:rPr lang="en-US"/>
               <a:t>Click to edit Master text styles</a:t>
             </a:r>
           </a:p>
@@ -22382,7 +22338,7 @@
           <a:p>
             <a:fld id="{5AF17004-BA72-482E-B0B8-4E04C09BC19D}" type="datetimeFigureOut">
               <a:rPr lang="es-ES" smtClean="0"/>
-              <a:t>04.mar.2018</a:t>
+              <a:t>17/05/2018</a:t>
             </a:fld>
             <a:endParaRPr lang="es-ES"/>
           </a:p>
@@ -22424,7 +22380,7 @@
           <a:p>
             <a:fld id="{2510A040-14AA-4893-8DE2-2533720F2351}" type="slidenum">
               <a:rPr lang="es-ES" smtClean="0"/>
-              <a:t>‹#›</a:t>
+              <a:t>‹Nº›</a:t>
             </a:fld>
             <a:endParaRPr lang="es-ES"/>
           </a:p>
@@ -22487,7 +22443,7 @@
           </a:lstStyle>
           <a:p>
             <a:r>
-              <a:rPr lang="en-US" smtClean="0"/>
+              <a:rPr lang="en-US"/>
               <a:t>Click to edit Master title style</a:t>
             </a:r>
             <a:endParaRPr lang="en-US" dirty="0"/>
@@ -22558,7 +22514,7 @@
           </a:lstStyle>
           <a:p>
             <a:r>
-              <a:rPr lang="en-US" smtClean="0"/>
+              <a:rPr lang="en-US"/>
               <a:t>Click icon to add picture</a:t>
             </a:r>
             <a:endParaRPr lang="en-US" dirty="0"/>
@@ -22639,7 +22595,7 @@
           <a:p>
             <a:pPr lvl="0"/>
             <a:r>
-              <a:rPr lang="en-US" smtClean="0"/>
+              <a:rPr lang="en-US"/>
               <a:t>Click to edit Master text styles</a:t>
             </a:r>
           </a:p>
@@ -22662,7 +22618,7 @@
           <a:p>
             <a:fld id="{5AF17004-BA72-482E-B0B8-4E04C09BC19D}" type="datetimeFigureOut">
               <a:rPr lang="es-ES" smtClean="0"/>
-              <a:t>04.mar.2018</a:t>
+              <a:t>17/05/2018</a:t>
             </a:fld>
             <a:endParaRPr lang="es-ES"/>
           </a:p>
@@ -22704,7 +22660,7 @@
           <a:p>
             <a:fld id="{2510A040-14AA-4893-8DE2-2533720F2351}" type="slidenum">
               <a:rPr lang="es-ES" smtClean="0"/>
-              <a:t>‹#›</a:t>
+              <a:t>‹Nº›</a:t>
             </a:fld>
             <a:endParaRPr lang="es-ES"/>
           </a:p>
@@ -22809,7 +22765,7 @@
           <a:lstStyle/>
           <a:p>
             <a:r>
-              <a:rPr lang="en-US" smtClean="0"/>
+              <a:rPr lang="en-US"/>
               <a:t>Click to edit Master title style</a:t>
             </a:r>
             <a:endParaRPr lang="en-US" dirty="0"/>
@@ -22843,35 +22799,35 @@
           <a:p>
             <a:pPr lvl="0"/>
             <a:r>
-              <a:rPr lang="en-US" smtClean="0"/>
+              <a:rPr lang="en-US"/>
               <a:t>Click to edit Master text styles</a:t>
             </a:r>
           </a:p>
           <a:p>
             <a:pPr lvl="1"/>
             <a:r>
-              <a:rPr lang="en-US" smtClean="0"/>
+              <a:rPr lang="en-US"/>
               <a:t>Second level</a:t>
             </a:r>
           </a:p>
           <a:p>
             <a:pPr lvl="2"/>
             <a:r>
-              <a:rPr lang="en-US" smtClean="0"/>
+              <a:rPr lang="en-US"/>
               <a:t>Third level</a:t>
             </a:r>
           </a:p>
           <a:p>
             <a:pPr lvl="3"/>
             <a:r>
-              <a:rPr lang="en-US" smtClean="0"/>
+              <a:rPr lang="en-US"/>
               <a:t>Fourth level</a:t>
             </a:r>
           </a:p>
           <a:p>
             <a:pPr lvl="4"/>
             <a:r>
-              <a:rPr lang="en-US" smtClean="0"/>
+              <a:rPr lang="en-US"/>
               <a:t>Fifth level</a:t>
             </a:r>
             <a:endParaRPr lang="en-US" dirty="0"/>
@@ -22915,7 +22871,7 @@
           <a:p>
             <a:fld id="{5AF17004-BA72-482E-B0B8-4E04C09BC19D}" type="datetimeFigureOut">
               <a:rPr lang="es-ES" smtClean="0"/>
-              <a:t>04.mar.2018</a:t>
+              <a:t>17/05/2018</a:t>
             </a:fld>
             <a:endParaRPr lang="es-ES"/>
           </a:p>
@@ -22997,7 +22953,7 @@
           <a:p>
             <a:fld id="{2510A040-14AA-4893-8DE2-2533720F2351}" type="slidenum">
               <a:rPr lang="es-ES" smtClean="0"/>
-              <a:t>‹#›</a:t>
+              <a:t>‹Nº›</a:t>
             </a:fld>
             <a:endParaRPr lang="es-ES"/>
           </a:p>
@@ -23441,7 +23397,7 @@
           <a:p>
             <a:pPr algn="ctr"/>
             <a:r>
-              <a:rPr lang="es-ES" sz="4400" b="1" dirty="0" smtClean="0">
+              <a:rPr lang="es-ES" sz="4400" b="1" dirty="0">
                 <a:solidFill>
                   <a:schemeClr val="accent1">
                     <a:lumMod val="75000"/>
@@ -23450,13 +23406,6 @@
               </a:rPr>
               <a:t>COMO HICE STEMTRIVIAL CON AURELIA.JS</a:t>
             </a:r>
-            <a:endParaRPr lang="es-ES" sz="4400" b="1" dirty="0">
-              <a:solidFill>
-                <a:schemeClr val="accent1">
-                  <a:lumMod val="75000"/>
-                </a:schemeClr>
-              </a:solidFill>
-            </a:endParaRPr>
           </a:p>
         </p:txBody>
       </p:sp>
@@ -23513,7 +23462,7 @@
           <a:lstStyle/>
           <a:p>
             <a:r>
-              <a:rPr lang="es-ES" b="1" dirty="0" smtClean="0">
+              <a:rPr lang="es-ES" b="1" dirty="0">
                 <a:solidFill>
                   <a:schemeClr val="accent1">
                     <a:lumMod val="75000"/>
@@ -23522,13 +23471,6 @@
               </a:rPr>
               <a:t>AZAHARA FERNANDEZ GUIZAN</a:t>
             </a:r>
-            <a:endParaRPr lang="es-ES" b="1" dirty="0">
-              <a:solidFill>
-                <a:schemeClr val="accent1">
-                  <a:lumMod val="75000"/>
-                </a:schemeClr>
-              </a:solidFill>
-            </a:endParaRPr>
           </a:p>
         </p:txBody>
       </p:sp>
@@ -23606,10 +23548,9 @@
           <a:lstStyle/>
           <a:p>
             <a:r>
-              <a:rPr lang="es-ES" dirty="0" smtClean="0"/>
+              <a:rPr lang="es-ES" dirty="0"/>
               <a:t>Instalación y preparación del entorno</a:t>
             </a:r>
-            <a:endParaRPr lang="es-ES" dirty="0"/>
           </a:p>
         </p:txBody>
       </p:sp>
@@ -23636,263 +23577,263 @@
           <a:lstStyle/>
           <a:p>
             <a:r>
-              <a:rPr lang="en-US" sz="2000" dirty="0" smtClean="0"/>
+              <a:rPr lang="en-US" sz="2000" dirty="0"/>
               <a:t>Aurelia </a:t>
             </a:r>
             <a:r>
-              <a:rPr lang="en-US" sz="2000" dirty="0" err="1" smtClean="0"/>
+              <a:rPr lang="en-US" sz="2000" dirty="0" err="1"/>
               <a:t>es</a:t>
             </a:r>
             <a:r>
-              <a:rPr lang="en-US" sz="2000" dirty="0" smtClean="0"/>
+              <a:rPr lang="en-US" sz="2000" dirty="0"/>
               <a:t> un framework JavaScript </a:t>
             </a:r>
             <a:r>
-              <a:rPr lang="en-US" sz="2000" dirty="0" err="1" smtClean="0"/>
+              <a:rPr lang="en-US" sz="2000" dirty="0" err="1"/>
               <a:t>que</a:t>
             </a:r>
             <a:r>
-              <a:rPr lang="en-US" sz="2000" dirty="0" smtClean="0"/>
+              <a:rPr lang="en-US" sz="2000" dirty="0"/>
               <a:t> </a:t>
             </a:r>
             <a:r>
-              <a:rPr lang="en-US" sz="2000" dirty="0" err="1" smtClean="0"/>
+              <a:rPr lang="en-US" sz="2000" dirty="0" err="1"/>
               <a:t>cuenta</a:t>
             </a:r>
             <a:r>
-              <a:rPr lang="en-US" sz="2000" dirty="0" smtClean="0"/>
+              <a:rPr lang="en-US" sz="2000" dirty="0"/>
               <a:t> al </a:t>
             </a:r>
             <a:r>
-              <a:rPr lang="en-US" sz="2000" dirty="0" err="1" smtClean="0"/>
+              <a:rPr lang="en-US" sz="2000" dirty="0" err="1"/>
               <a:t>igual</a:t>
             </a:r>
             <a:r>
-              <a:rPr lang="en-US" sz="2000" dirty="0" smtClean="0"/>
+              <a:rPr lang="en-US" sz="2000" dirty="0"/>
               <a:t> </a:t>
             </a:r>
             <a:r>
-              <a:rPr lang="en-US" sz="2000" dirty="0" err="1" smtClean="0"/>
+              <a:rPr lang="en-US" sz="2000" dirty="0" err="1"/>
               <a:t>que</a:t>
             </a:r>
             <a:r>
-              <a:rPr lang="en-US" sz="2000" dirty="0" smtClean="0"/>
+              <a:rPr lang="en-US" sz="2000" dirty="0"/>
               <a:t> </a:t>
             </a:r>
             <a:r>
-              <a:rPr lang="en-US" sz="2000" dirty="0" err="1" smtClean="0"/>
+              <a:rPr lang="en-US" sz="2000" dirty="0" err="1"/>
               <a:t>otros</a:t>
             </a:r>
             <a:r>
-              <a:rPr lang="en-US" sz="2000" dirty="0" smtClean="0"/>
+              <a:rPr lang="en-US" sz="2000" dirty="0"/>
               <a:t> </a:t>
             </a:r>
             <a:r>
-              <a:rPr lang="en-US" sz="2000" dirty="0" err="1" smtClean="0"/>
+              <a:rPr lang="en-US" sz="2000" dirty="0" err="1"/>
               <a:t>muchos</a:t>
             </a:r>
             <a:r>
-              <a:rPr lang="en-US" sz="2000" dirty="0" smtClean="0"/>
+              <a:rPr lang="en-US" sz="2000" dirty="0"/>
               <a:t> con </a:t>
             </a:r>
             <a:r>
-              <a:rPr lang="en-US" sz="2000" dirty="0" err="1" smtClean="0"/>
+              <a:rPr lang="en-US" sz="2000" dirty="0" err="1"/>
               <a:t>una</a:t>
             </a:r>
             <a:r>
-              <a:rPr lang="en-US" sz="2000" dirty="0" smtClean="0"/>
+              <a:rPr lang="en-US" sz="2000" dirty="0"/>
               <a:t> </a:t>
             </a:r>
             <a:r>
-              <a:rPr lang="en-US" sz="2000" dirty="0" err="1" smtClean="0"/>
+              <a:rPr lang="en-US" sz="2000" dirty="0" err="1"/>
               <a:t>herramienta</a:t>
             </a:r>
             <a:r>
-              <a:rPr lang="en-US" sz="2000" dirty="0" smtClean="0"/>
+              <a:rPr lang="en-US" sz="2000" dirty="0"/>
               <a:t> </a:t>
             </a:r>
             <a:r>
-              <a:rPr lang="en-US" sz="2000" dirty="0" err="1" smtClean="0"/>
+              <a:rPr lang="en-US" sz="2000" dirty="0" err="1"/>
               <a:t>llamada</a:t>
             </a:r>
             <a:r>
-              <a:rPr lang="en-US" sz="2000" dirty="0" smtClean="0"/>
+              <a:rPr lang="en-US" sz="2000" dirty="0"/>
               <a:t> Aurelia-CLI, para </a:t>
             </a:r>
             <a:r>
-              <a:rPr lang="en-US" sz="2000" dirty="0" err="1" smtClean="0"/>
+              <a:rPr lang="en-US" sz="2000" dirty="0" err="1"/>
               <a:t>todos</a:t>
             </a:r>
             <a:r>
-              <a:rPr lang="en-US" sz="2000" dirty="0" smtClean="0"/>
+              <a:rPr lang="en-US" sz="2000" dirty="0"/>
               <a:t> </a:t>
             </a:r>
             <a:r>
-              <a:rPr lang="en-US" sz="2000" dirty="0" err="1" smtClean="0"/>
+              <a:rPr lang="en-US" sz="2000" dirty="0" err="1"/>
               <a:t>aquellos</a:t>
             </a:r>
             <a:r>
-              <a:rPr lang="en-US" sz="2000" dirty="0" smtClean="0"/>
+              <a:rPr lang="en-US" sz="2000" dirty="0"/>
               <a:t> </a:t>
             </a:r>
             <a:r>
-              <a:rPr lang="en-US" sz="2000" dirty="0" err="1" smtClean="0"/>
+              <a:rPr lang="en-US" sz="2000" dirty="0" err="1"/>
               <a:t>que</a:t>
             </a:r>
             <a:r>
-              <a:rPr lang="en-US" sz="2000" dirty="0" smtClean="0"/>
+              <a:rPr lang="en-US" sz="2000" dirty="0"/>
               <a:t> </a:t>
             </a:r>
             <a:r>
-              <a:rPr lang="en-US" sz="2000" dirty="0" err="1" smtClean="0"/>
+              <a:rPr lang="en-US" sz="2000" dirty="0" err="1"/>
               <a:t>vengáis</a:t>
             </a:r>
             <a:r>
-              <a:rPr lang="en-US" sz="2000" dirty="0" smtClean="0"/>
+              <a:rPr lang="en-US" sz="2000" dirty="0"/>
               <a:t> de Angular no </a:t>
             </a:r>
             <a:r>
-              <a:rPr lang="en-US" sz="2000" dirty="0" err="1" smtClean="0"/>
+              <a:rPr lang="en-US" sz="2000" dirty="0" err="1"/>
               <a:t>os</a:t>
             </a:r>
             <a:r>
-              <a:rPr lang="en-US" sz="2000" dirty="0" smtClean="0"/>
+              <a:rPr lang="en-US" sz="2000" dirty="0"/>
               <a:t> </a:t>
             </a:r>
             <a:r>
-              <a:rPr lang="en-US" sz="2000" dirty="0" err="1" smtClean="0"/>
+              <a:rPr lang="en-US" sz="2000" dirty="0" err="1"/>
               <a:t>sonará</a:t>
             </a:r>
             <a:r>
-              <a:rPr lang="en-US" sz="2000" dirty="0" smtClean="0"/>
+              <a:rPr lang="en-US" sz="2000" dirty="0"/>
               <a:t> </a:t>
             </a:r>
             <a:r>
-              <a:rPr lang="en-US" sz="2000" dirty="0" err="1" smtClean="0"/>
+              <a:rPr lang="en-US" sz="2000" dirty="0" err="1"/>
               <a:t>raro</a:t>
             </a:r>
             <a:r>
-              <a:rPr lang="en-US" sz="2000" dirty="0" smtClean="0"/>
+              <a:rPr lang="en-US" sz="2000" dirty="0"/>
               <a:t>. </a:t>
             </a:r>
             <a:r>
-              <a:rPr lang="en-US" sz="2000" dirty="0" err="1" smtClean="0"/>
+              <a:rPr lang="en-US" sz="2000" dirty="0" err="1"/>
               <a:t>Es</a:t>
             </a:r>
             <a:r>
-              <a:rPr lang="en-US" sz="2000" dirty="0" smtClean="0"/>
+              <a:rPr lang="en-US" sz="2000" dirty="0"/>
               <a:t> </a:t>
             </a:r>
             <a:r>
-              <a:rPr lang="en-US" sz="2000" dirty="0" err="1" smtClean="0"/>
+              <a:rPr lang="en-US" sz="2000" dirty="0" err="1"/>
               <a:t>una</a:t>
             </a:r>
             <a:r>
-              <a:rPr lang="en-US" sz="2000" dirty="0" smtClean="0"/>
+              <a:rPr lang="en-US" sz="2000" dirty="0"/>
               <a:t> </a:t>
             </a:r>
             <a:r>
-              <a:rPr lang="en-US" sz="2000" dirty="0" err="1" smtClean="0"/>
+              <a:rPr lang="en-US" sz="2000" dirty="0" err="1"/>
               <a:t>herramienta</a:t>
             </a:r>
             <a:r>
-              <a:rPr lang="en-US" sz="2000" dirty="0" smtClean="0"/>
+              <a:rPr lang="en-US" sz="2000" dirty="0"/>
               <a:t> de </a:t>
             </a:r>
             <a:r>
-              <a:rPr lang="en-US" sz="2000" dirty="0" err="1" smtClean="0"/>
+              <a:rPr lang="en-US" sz="2000" dirty="0" err="1"/>
               <a:t>linea</a:t>
             </a:r>
             <a:r>
-              <a:rPr lang="en-US" sz="2000" dirty="0" smtClean="0"/>
+              <a:rPr lang="en-US" sz="2000" dirty="0"/>
               <a:t> de commando </a:t>
             </a:r>
             <a:r>
-              <a:rPr lang="en-US" sz="2000" dirty="0" err="1" smtClean="0"/>
+              <a:rPr lang="en-US" sz="2000" dirty="0" err="1"/>
               <a:t>que</a:t>
             </a:r>
             <a:r>
-              <a:rPr lang="en-US" sz="2000" dirty="0" smtClean="0"/>
+              <a:rPr lang="en-US" sz="2000" dirty="0"/>
               <a:t> </a:t>
             </a:r>
             <a:r>
-              <a:rPr lang="en-US" sz="2000" dirty="0" err="1" smtClean="0"/>
+              <a:rPr lang="en-US" sz="2000" dirty="0" err="1"/>
               <a:t>ayuda</a:t>
             </a:r>
             <a:r>
-              <a:rPr lang="en-US" sz="2000" dirty="0" smtClean="0"/>
+              <a:rPr lang="en-US" sz="2000" dirty="0"/>
               <a:t> con el bundling y el scaffolding. Como no me </a:t>
             </a:r>
             <a:r>
-              <a:rPr lang="en-US" sz="2000" dirty="0" err="1" smtClean="0"/>
+              <a:rPr lang="en-US" sz="2000" dirty="0" err="1"/>
               <a:t>gusta</a:t>
             </a:r>
             <a:r>
-              <a:rPr lang="en-US" sz="2000" dirty="0" smtClean="0"/>
+              <a:rPr lang="en-US" sz="2000" dirty="0"/>
               <a:t> </a:t>
             </a:r>
             <a:r>
-              <a:rPr lang="en-US" sz="2000" dirty="0" err="1" smtClean="0"/>
+              <a:rPr lang="en-US" sz="2000" dirty="0" err="1"/>
               <a:t>complicarme</a:t>
             </a:r>
             <a:r>
-              <a:rPr lang="en-US" sz="2000" dirty="0" smtClean="0"/>
+              <a:rPr lang="en-US" sz="2000" dirty="0"/>
               <a:t> la </a:t>
             </a:r>
             <a:r>
-              <a:rPr lang="en-US" sz="2000" dirty="0" err="1" smtClean="0"/>
+              <a:rPr lang="en-US" sz="2000" dirty="0" err="1"/>
               <a:t>vida</a:t>
             </a:r>
             <a:r>
-              <a:rPr lang="en-US" sz="2000" dirty="0" smtClean="0"/>
+              <a:rPr lang="en-US" sz="2000" dirty="0"/>
               <a:t> en </a:t>
             </a:r>
             <a:r>
-              <a:rPr lang="en-US" sz="2000" dirty="0" err="1" smtClean="0"/>
+              <a:rPr lang="en-US" sz="2000" dirty="0" err="1"/>
               <a:t>exceso</a:t>
             </a:r>
             <a:r>
-              <a:rPr lang="en-US" sz="2000" dirty="0" smtClean="0"/>
+              <a:rPr lang="en-US" sz="2000" dirty="0"/>
               <a:t> </a:t>
             </a:r>
             <a:r>
-              <a:rPr lang="en-US" sz="2000" dirty="0" err="1" smtClean="0"/>
+              <a:rPr lang="en-US" sz="2000" dirty="0" err="1"/>
               <a:t>decidí</a:t>
             </a:r>
             <a:r>
-              <a:rPr lang="en-US" sz="2000" dirty="0" smtClean="0"/>
+              <a:rPr lang="en-US" sz="2000" dirty="0"/>
               <a:t> </a:t>
             </a:r>
             <a:r>
-              <a:rPr lang="en-US" sz="2000" dirty="0" err="1" smtClean="0"/>
+              <a:rPr lang="en-US" sz="2000" dirty="0" err="1"/>
               <a:t>empezar</a:t>
             </a:r>
             <a:r>
-              <a:rPr lang="en-US" sz="2000" dirty="0" smtClean="0"/>
+              <a:rPr lang="en-US" sz="2000" dirty="0"/>
               <a:t> </a:t>
             </a:r>
             <a:r>
-              <a:rPr lang="en-US" sz="2000" dirty="0" err="1" smtClean="0"/>
+              <a:rPr lang="en-US" sz="2000" dirty="0" err="1"/>
               <a:t>usándola</a:t>
             </a:r>
             <a:r>
-              <a:rPr lang="en-US" sz="2000" dirty="0" smtClean="0"/>
+              <a:rPr lang="en-US" sz="2000" dirty="0"/>
               <a:t> </a:t>
             </a:r>
             <a:r>
-              <a:rPr lang="en-US" sz="2000" dirty="0" err="1" smtClean="0"/>
+              <a:rPr lang="en-US" sz="2000" dirty="0" err="1"/>
               <a:t>desde</a:t>
             </a:r>
             <a:r>
-              <a:rPr lang="en-US" sz="2000" dirty="0" smtClean="0"/>
+              <a:rPr lang="en-US" sz="2000" dirty="0"/>
               <a:t> el </a:t>
             </a:r>
             <a:r>
-              <a:rPr lang="en-US" sz="2000" dirty="0" err="1" smtClean="0"/>
+              <a:rPr lang="en-US" sz="2000" dirty="0" err="1"/>
               <a:t>inicio</a:t>
             </a:r>
             <a:r>
-              <a:rPr lang="en-US" sz="2000" dirty="0" smtClean="0"/>
+              <a:rPr lang="en-US" sz="2000" dirty="0"/>
               <a:t>.</a:t>
             </a:r>
           </a:p>
@@ -23901,151 +23842,143 @@
           </a:p>
           <a:p>
             <a:r>
-              <a:rPr lang="en-US" sz="2000" dirty="0" err="1" smtClean="0"/>
+              <a:rPr lang="en-US" sz="2000" dirty="0" err="1"/>
               <a:t>Es</a:t>
             </a:r>
             <a:r>
-              <a:rPr lang="en-US" sz="2000" dirty="0" smtClean="0"/>
+              <a:rPr lang="en-US" sz="2000" dirty="0"/>
               <a:t> </a:t>
             </a:r>
             <a:r>
-              <a:rPr lang="en-US" sz="2000" dirty="0" err="1" smtClean="0"/>
+              <a:rPr lang="en-US" sz="2000" dirty="0" err="1"/>
               <a:t>necesario</a:t>
             </a:r>
             <a:r>
-              <a:rPr lang="en-US" sz="2000" dirty="0" smtClean="0"/>
+              <a:rPr lang="en-US" sz="2000" dirty="0"/>
               <a:t> </a:t>
             </a:r>
             <a:r>
-              <a:rPr lang="en-US" sz="2000" dirty="0" err="1" smtClean="0"/>
+              <a:rPr lang="en-US" sz="2000" dirty="0" err="1"/>
               <a:t>tener</a:t>
             </a:r>
             <a:r>
-              <a:rPr lang="en-US" sz="2000" dirty="0" smtClean="0"/>
+              <a:rPr lang="en-US" sz="2000" dirty="0"/>
               <a:t> </a:t>
             </a:r>
             <a:r>
-              <a:rPr lang="en-US" sz="2000" dirty="0" err="1" smtClean="0"/>
+              <a:rPr lang="en-US" sz="2000" dirty="0" err="1"/>
               <a:t>instalado</a:t>
             </a:r>
             <a:r>
-              <a:rPr lang="en-US" sz="2000" dirty="0" smtClean="0"/>
+              <a:rPr lang="en-US" sz="2000" dirty="0"/>
               <a:t> en </a:t>
             </a:r>
             <a:r>
-              <a:rPr lang="en-US" sz="2000" dirty="0" err="1" smtClean="0"/>
+              <a:rPr lang="en-US" sz="2000" dirty="0" err="1"/>
               <a:t>nuestro</a:t>
             </a:r>
             <a:r>
-              <a:rPr lang="en-US" sz="2000" dirty="0" smtClean="0"/>
+              <a:rPr lang="en-US" sz="2000" dirty="0"/>
               <a:t> PC el </a:t>
             </a:r>
             <a:r>
-              <a:rPr lang="en-US" sz="2000" dirty="0" err="1" smtClean="0"/>
+              <a:rPr lang="en-US" sz="2000" dirty="0" err="1"/>
               <a:t>NodeJS</a:t>
             </a:r>
             <a:r>
-              <a:rPr lang="en-US" sz="2000" dirty="0" smtClean="0"/>
+              <a:rPr lang="en-US" sz="2000" dirty="0"/>
+              <a:t> version 4.x o superior, </a:t>
+            </a:r>
+            <a:r>
+              <a:rPr lang="en-US" sz="2000" dirty="0" err="1"/>
+              <a:t>yo</a:t>
+            </a:r>
+            <a:r>
+              <a:rPr lang="en-US" sz="2000" dirty="0"/>
               <a:t> </a:t>
             </a:r>
             <a:r>
-              <a:rPr lang="en-US" sz="2000" dirty="0"/>
-              <a:t>version 4.x </a:t>
+              <a:rPr lang="en-US" sz="2000" dirty="0" err="1"/>
+              <a:t>como</a:t>
             </a:r>
             <a:r>
-              <a:rPr lang="en-US" sz="2000" dirty="0" smtClean="0"/>
-              <a:t>o superior, </a:t>
-            </a:r>
-            <a:r>
-              <a:rPr lang="en-US" sz="2000" dirty="0" err="1" smtClean="0"/>
-              <a:t>yo</a:t>
-            </a:r>
-            <a:r>
-              <a:rPr lang="en-US" sz="2000" dirty="0" smtClean="0"/>
+              <a:rPr lang="en-US" sz="2000" dirty="0"/>
               <a:t> </a:t>
             </a:r>
             <a:r>
-              <a:rPr lang="en-US" sz="2000" dirty="0" err="1" smtClean="0"/>
-              <a:t>como</a:t>
+              <a:rPr lang="en-US" sz="2000" dirty="0" err="1"/>
+              <a:t>ese</a:t>
             </a:r>
             <a:r>
-              <a:rPr lang="en-US" sz="2000" dirty="0" smtClean="0"/>
+              <a:rPr lang="en-US" sz="2000" dirty="0"/>
               <a:t> </a:t>
             </a:r>
             <a:r>
-              <a:rPr lang="en-US" sz="2000" dirty="0" err="1" smtClean="0"/>
-              <a:t>ese</a:t>
+              <a:rPr lang="en-US" sz="2000" dirty="0" err="1"/>
+              <a:t>paso</a:t>
             </a:r>
             <a:r>
-              <a:rPr lang="en-US" sz="2000" dirty="0" smtClean="0"/>
+              <a:rPr lang="en-US" sz="2000" dirty="0"/>
               <a:t> </a:t>
             </a:r>
             <a:r>
-              <a:rPr lang="en-US" sz="2000" dirty="0" err="1" smtClean="0"/>
-              <a:t>paso</a:t>
+              <a:rPr lang="en-US" sz="2000" dirty="0" err="1"/>
+              <a:t>ya</a:t>
             </a:r>
             <a:r>
-              <a:rPr lang="en-US" sz="2000" dirty="0" smtClean="0"/>
+              <a:rPr lang="en-US" sz="2000" dirty="0"/>
+              <a:t> lo </a:t>
+            </a:r>
+            <a:r>
+              <a:rPr lang="en-US" sz="2000" dirty="0" err="1"/>
+              <a:t>tenía</a:t>
+            </a:r>
+            <a:r>
+              <a:rPr lang="en-US" sz="2000" dirty="0"/>
               <a:t> </a:t>
             </a:r>
             <a:r>
-              <a:rPr lang="en-US" sz="2000" dirty="0" err="1" smtClean="0"/>
-              <a:t>ya</a:t>
+              <a:rPr lang="en-US" sz="2000" dirty="0" err="1"/>
+              <a:t>complementado</a:t>
             </a:r>
             <a:r>
-              <a:rPr lang="en-US" sz="2000" dirty="0" smtClean="0"/>
-              <a:t> lo </a:t>
-            </a:r>
-            <a:r>
-              <a:rPr lang="en-US" sz="2000" dirty="0" err="1" smtClean="0"/>
-              <a:t>tenía</a:t>
-            </a:r>
-            <a:r>
-              <a:rPr lang="en-US" sz="2000" dirty="0" smtClean="0"/>
+              <a:rPr lang="en-US" sz="2000" dirty="0"/>
               <a:t> </a:t>
             </a:r>
             <a:r>
-              <a:rPr lang="en-US" sz="2000" dirty="0" err="1" smtClean="0"/>
-              <a:t>complementado</a:t>
+              <a:rPr lang="en-US" sz="2000" dirty="0" err="1"/>
+              <a:t>fuí</a:t>
             </a:r>
             <a:r>
-              <a:rPr lang="en-US" sz="2000" dirty="0" smtClean="0"/>
+              <a:rPr lang="en-US" sz="2000" dirty="0"/>
               <a:t> </a:t>
             </a:r>
             <a:r>
-              <a:rPr lang="en-US" sz="2000" dirty="0" err="1" smtClean="0"/>
-              <a:t>fuí</a:t>
+              <a:rPr lang="en-US" sz="2000" dirty="0" err="1"/>
+              <a:t>directamente</a:t>
             </a:r>
             <a:r>
-              <a:rPr lang="en-US" sz="2000" dirty="0" smtClean="0"/>
+              <a:rPr lang="en-US" sz="2000" dirty="0"/>
+              <a:t> a </a:t>
+            </a:r>
+            <a:r>
+              <a:rPr lang="en-US" sz="2000" dirty="0" err="1"/>
+              <a:t>installar</a:t>
+            </a:r>
+            <a:r>
+              <a:rPr lang="en-US" sz="2000" dirty="0"/>
               <a:t> </a:t>
             </a:r>
             <a:r>
-              <a:rPr lang="en-US" sz="2000" dirty="0" err="1" smtClean="0"/>
-              <a:t>directamente</a:t>
-            </a:r>
-            <a:r>
-              <a:rPr lang="en-US" sz="2000" dirty="0" smtClean="0"/>
-              <a:t> a </a:t>
-            </a:r>
-            <a:r>
-              <a:rPr lang="en-US" sz="2000" dirty="0" err="1" smtClean="0"/>
-              <a:t>installar</a:t>
-            </a:r>
-            <a:r>
-              <a:rPr lang="en-US" sz="2000" dirty="0" smtClean="0"/>
-              <a:t> </a:t>
-            </a:r>
-            <a:r>
-              <a:rPr lang="en-US" sz="2000" b="1" dirty="0" smtClean="0"/>
+              <a:rPr lang="en-US" sz="2000" b="1" dirty="0"/>
               <a:t>Aurelia-</a:t>
             </a:r>
             <a:r>
-              <a:rPr lang="en-US" sz="2000" b="1" dirty="0" err="1" smtClean="0"/>
+              <a:rPr lang="en-US" sz="2000" b="1" dirty="0" err="1"/>
               <a:t>Cli</a:t>
             </a:r>
             <a:r>
-              <a:rPr lang="en-US" sz="2000" dirty="0" smtClean="0"/>
+              <a:rPr lang="en-US" sz="2000" dirty="0"/>
               <a:t>:</a:t>
             </a:r>
             <a:endParaRPr lang="es-ES" sz="2000" dirty="0"/>
@@ -24128,10 +24061,9 @@
           <a:lstStyle/>
           <a:p>
             <a:r>
-              <a:rPr lang="es-ES" sz="2000" dirty="0" smtClean="0"/>
+              <a:rPr lang="es-ES" sz="2000" dirty="0"/>
               <a:t>El siguiente paso obvio es crear el proyecto:</a:t>
             </a:r>
-            <a:endParaRPr lang="es-ES" sz="2000" dirty="0"/>
           </a:p>
         </p:txBody>
       </p:sp>
@@ -24182,34 +24114,33 @@
           <a:lstStyle/>
           <a:p>
             <a:r>
-              <a:rPr lang="es-ES" sz="2000" dirty="0" smtClean="0"/>
+              <a:rPr lang="es-ES" sz="2000" dirty="0"/>
               <a:t>Aurelia-CLI te irá requiriendo la información necesaria, de forma que el proceso es rápido y sencillo, en primer lugar te pregunta si quieres una aplicación usando </a:t>
             </a:r>
             <a:r>
-              <a:rPr lang="es-ES" sz="2000" dirty="0" err="1" smtClean="0"/>
+              <a:rPr lang="es-ES" sz="2000" dirty="0" err="1"/>
               <a:t>ESNext</a:t>
             </a:r>
             <a:r>
-              <a:rPr lang="es-ES" sz="2000" dirty="0" smtClean="0"/>
+              <a:rPr lang="es-ES" sz="2000" dirty="0"/>
               <a:t> (opción 1), </a:t>
             </a:r>
             <a:r>
-              <a:rPr lang="es-ES" sz="2000" dirty="0" err="1" smtClean="0"/>
+              <a:rPr lang="es-ES" sz="2000" dirty="0" err="1"/>
               <a:t>Typescript</a:t>
             </a:r>
             <a:r>
-              <a:rPr lang="es-ES" sz="2000" dirty="0" smtClean="0"/>
+              <a:rPr lang="es-ES" sz="2000" dirty="0"/>
               <a:t> (opción 2) o </a:t>
             </a:r>
             <a:r>
-              <a:rPr lang="es-ES" sz="2000" dirty="0" err="1" smtClean="0"/>
+              <a:rPr lang="es-ES" sz="2000" dirty="0" err="1"/>
               <a:t>Custom</a:t>
             </a:r>
             <a:r>
-              <a:rPr lang="es-ES" sz="2000" dirty="0" smtClean="0"/>
+              <a:rPr lang="es-ES" sz="2000" dirty="0"/>
               <a:t> (opción 3). Yo escogí la opción 2:</a:t>
             </a:r>
-            <a:endParaRPr lang="es-ES" sz="2000" dirty="0"/>
           </a:p>
         </p:txBody>
       </p:sp>
@@ -24290,10 +24221,9 @@
           <a:lstStyle/>
           <a:p>
             <a:r>
-              <a:rPr lang="es-ES" sz="2000" dirty="0" smtClean="0"/>
+              <a:rPr lang="es-ES" sz="2000" dirty="0"/>
               <a:t>La siguiente pregunta se refiere a confirmar la estructura que Aurelia-CLI ha creado por nosotros, se puede confirmar, reiniciar para cambiar diferentes elecciones o abortar.</a:t>
             </a:r>
-            <a:endParaRPr lang="es-ES" sz="2000" dirty="0"/>
           </a:p>
         </p:txBody>
       </p:sp>
@@ -24374,10 +24304,9 @@
           <a:lstStyle/>
           <a:p>
             <a:r>
-              <a:rPr lang="es-ES" sz="2000" dirty="0" smtClean="0"/>
+              <a:rPr lang="es-ES" sz="2000" dirty="0"/>
               <a:t>Por último nos pregunta si queremos instalar las dependencias del proyecto:</a:t>
             </a:r>
-            <a:endParaRPr lang="es-ES" sz="2000" dirty="0"/>
           </a:p>
         </p:txBody>
       </p:sp>
@@ -24458,34 +24387,33 @@
           <a:lstStyle/>
           <a:p>
             <a:r>
-              <a:rPr lang="es-ES" dirty="0" smtClean="0"/>
+              <a:rPr lang="es-ES" dirty="0"/>
               <a:t>Y con esto ya está! Nos </a:t>
             </a:r>
             <a:r>
-              <a:rPr lang="es-ES" sz="2000" dirty="0" smtClean="0"/>
+              <a:rPr lang="es-ES" sz="2000" dirty="0"/>
               <a:t>desean</a:t>
             </a:r>
             <a:r>
-              <a:rPr lang="es-ES" dirty="0" smtClean="0"/>
+              <a:rPr lang="es-ES" dirty="0"/>
               <a:t> un </a:t>
             </a:r>
             <a:r>
-              <a:rPr lang="es-ES" dirty="0" err="1" smtClean="0"/>
+              <a:rPr lang="es-ES" dirty="0" err="1"/>
               <a:t>Happy</a:t>
             </a:r>
             <a:r>
-              <a:rPr lang="es-ES" dirty="0" smtClean="0"/>
+              <a:rPr lang="es-ES" dirty="0"/>
               <a:t> </a:t>
             </a:r>
             <a:r>
-              <a:rPr lang="es-ES" dirty="0" err="1" smtClean="0"/>
+              <a:rPr lang="es-ES" dirty="0" err="1"/>
               <a:t>Coding</a:t>
             </a:r>
             <a:r>
-              <a:rPr lang="es-ES" dirty="0" smtClean="0"/>
+              <a:rPr lang="es-ES" dirty="0"/>
               <a:t>!</a:t>
             </a:r>
-            <a:endParaRPr lang="es-ES" dirty="0"/>
           </a:p>
         </p:txBody>
       </p:sp>
@@ -24564,10 +24492,9 @@
           <a:lstStyle/>
           <a:p>
             <a:r>
-              <a:rPr lang="es-ES" dirty="0" smtClean="0"/>
+              <a:rPr lang="es-ES" dirty="0"/>
               <a:t>Estructura del proyecto</a:t>
             </a:r>
-            <a:endParaRPr lang="es-ES" dirty="0"/>
           </a:p>
         </p:txBody>
       </p:sp>
@@ -24594,15 +24521,15 @@
           <a:lstStyle/>
           <a:p>
             <a:r>
-              <a:rPr lang="es-ES" sz="2000" dirty="0" smtClean="0"/>
+              <a:rPr lang="es-ES" sz="2000" dirty="0"/>
               <a:t>La estructura de Aurelia es muy similar también a la de otros </a:t>
             </a:r>
             <a:r>
-              <a:rPr lang="es-ES" sz="2000" dirty="0" err="1" smtClean="0"/>
+              <a:rPr lang="es-ES" sz="2000" dirty="0" err="1"/>
               <a:t>frameworks</a:t>
             </a:r>
             <a:r>
-              <a:rPr lang="es-ES" sz="2000" dirty="0" smtClean="0"/>
+              <a:rPr lang="es-ES" sz="2000" dirty="0"/>
               <a:t>. Tiene:</a:t>
             </a:r>
           </a:p>
@@ -24612,10 +24539,10 @@
               <a:buChar char="v"/>
             </a:pPr>
             <a:r>
-              <a:rPr lang="es-ES" sz="2000" dirty="0" err="1" smtClean="0"/>
+              <a:rPr lang="es-ES" sz="2000" dirty="0" err="1"/>
               <a:t>Aurelia_Project</a:t>
             </a:r>
-            <a:endParaRPr lang="es-ES" sz="2000" dirty="0" smtClean="0"/>
+            <a:endParaRPr lang="es-ES" sz="2000" dirty="0"/>
           </a:p>
           <a:p>
             <a:pPr marL="742950" lvl="1" indent="-285750">
@@ -24623,19 +24550,19 @@
               <a:buChar char="v"/>
             </a:pPr>
             <a:r>
-              <a:rPr lang="es-ES" sz="2000" dirty="0" err="1" smtClean="0"/>
+              <a:rPr lang="es-ES" sz="2000" dirty="0" err="1"/>
               <a:t>Environments</a:t>
             </a:r>
             <a:r>
-              <a:rPr lang="es-ES" sz="2000" dirty="0" smtClean="0"/>
+              <a:rPr lang="es-ES" sz="2000" dirty="0"/>
               <a:t>: viene preparada para por defecto para desarrollo, </a:t>
             </a:r>
             <a:r>
-              <a:rPr lang="es-ES" sz="2000" dirty="0" err="1" smtClean="0"/>
+              <a:rPr lang="es-ES" sz="2000" dirty="0" err="1"/>
               <a:t>stage</a:t>
             </a:r>
             <a:r>
-              <a:rPr lang="es-ES" sz="2000" dirty="0" smtClean="0"/>
+              <a:rPr lang="es-ES" sz="2000" dirty="0"/>
               <a:t> y producción</a:t>
             </a:r>
           </a:p>
@@ -24645,10 +24572,10 @@
               <a:buChar char="v"/>
             </a:pPr>
             <a:r>
-              <a:rPr lang="es-ES" sz="2000" dirty="0" err="1" smtClean="0"/>
+              <a:rPr lang="es-ES" sz="2000" dirty="0" err="1"/>
               <a:t>Custom_typings</a:t>
             </a:r>
-            <a:endParaRPr lang="es-ES" sz="2000" dirty="0" smtClean="0"/>
+            <a:endParaRPr lang="es-ES" sz="2000" dirty="0"/>
           </a:p>
           <a:p>
             <a:pPr marL="285750" indent="-285750">
@@ -24656,10 +24583,10 @@
               <a:buChar char="v"/>
             </a:pPr>
             <a:r>
-              <a:rPr lang="es-ES" sz="2000" dirty="0" err="1" smtClean="0"/>
+              <a:rPr lang="es-ES" sz="2000" dirty="0" err="1"/>
               <a:t>Node_modules</a:t>
             </a:r>
-            <a:endParaRPr lang="es-ES" sz="2000" dirty="0" smtClean="0"/>
+            <a:endParaRPr lang="es-ES" sz="2000" dirty="0"/>
           </a:p>
           <a:p>
             <a:pPr marL="285750" indent="-285750">
@@ -24667,7 +24594,7 @@
               <a:buChar char="v"/>
             </a:pPr>
             <a:r>
-              <a:rPr lang="es-ES" sz="2000" dirty="0" smtClean="0"/>
+              <a:rPr lang="es-ES" sz="2000" dirty="0"/>
               <a:t>Scripts</a:t>
             </a:r>
           </a:p>
@@ -24677,20 +24604,20 @@
               <a:buChar char="v"/>
             </a:pPr>
             <a:r>
-              <a:rPr lang="es-ES" sz="2000" dirty="0" err="1" smtClean="0"/>
+              <a:rPr lang="es-ES" sz="2000" dirty="0" err="1"/>
               <a:t>Src</a:t>
             </a:r>
             <a:r>
-              <a:rPr lang="es-ES" sz="2000" dirty="0" smtClean="0"/>
+              <a:rPr lang="es-ES" sz="2000" dirty="0"/>
               <a:t> </a:t>
             </a:r>
             <a:r>
-              <a:rPr lang="es-ES" sz="2000" dirty="0" smtClean="0">
+              <a:rPr lang="es-ES" sz="2000" dirty="0">
                 <a:sym typeface="Wingdings" panose="05000000000000000000" pitchFamily="2" charset="2"/>
               </a:rPr>
               <a:t> Aquí es donde trabajaremos e iremos insertando nuestros desarrollos.</a:t>
             </a:r>
-            <a:endParaRPr lang="es-ES" sz="2000" dirty="0" smtClean="0"/>
+            <a:endParaRPr lang="es-ES" sz="2000" dirty="0"/>
           </a:p>
           <a:p>
             <a:pPr marL="285750" indent="-285750">
@@ -24698,7 +24625,7 @@
               <a:buChar char="v"/>
             </a:pPr>
             <a:r>
-              <a:rPr lang="es-ES" sz="2000" dirty="0" smtClean="0"/>
+              <a:rPr lang="es-ES" sz="2000" dirty="0"/>
               <a:t>Test</a:t>
             </a:r>
           </a:p>
@@ -24708,7 +24635,7 @@
               <a:buChar char="v"/>
             </a:pPr>
             <a:r>
-              <a:rPr lang="es-ES" sz="2000" dirty="0" smtClean="0"/>
+              <a:rPr lang="es-ES" sz="2000" dirty="0"/>
               <a:t>Index.html</a:t>
             </a:r>
           </a:p>
@@ -24718,20 +24645,20 @@
               <a:buChar char="v"/>
             </a:pPr>
             <a:r>
-              <a:rPr lang="es-ES" sz="2000" dirty="0" err="1" smtClean="0"/>
+              <a:rPr lang="es-ES" sz="2000" dirty="0" err="1"/>
               <a:t>Package.json</a:t>
             </a:r>
             <a:r>
-              <a:rPr lang="es-ES" sz="2000" dirty="0" smtClean="0"/>
+              <a:rPr lang="es-ES" sz="2000" dirty="0"/>
               <a:t> </a:t>
             </a:r>
             <a:r>
-              <a:rPr lang="es-ES" sz="2000" dirty="0" smtClean="0">
+              <a:rPr lang="es-ES" sz="2000" dirty="0">
                 <a:sym typeface="Wingdings" panose="05000000000000000000" pitchFamily="2" charset="2"/>
               </a:rPr>
               <a:t> tiene información de los paquetes instalados y permite actualizarlos y eliminarlos fácilmente.</a:t>
             </a:r>
-            <a:endParaRPr lang="es-ES" sz="2000" dirty="0" smtClean="0"/>
+            <a:endParaRPr lang="es-ES" sz="2000" dirty="0"/>
           </a:p>
         </p:txBody>
       </p:sp>
@@ -24786,11 +24713,11 @@
           <a:lstStyle/>
           <a:p>
             <a:r>
-              <a:rPr lang="es-ES" dirty="0" smtClean="0"/>
+              <a:rPr lang="es-ES" dirty="0"/>
               <a:t>Ejecutar nuestra primera app en </a:t>
             </a:r>
             <a:r>
-              <a:rPr lang="es-ES" dirty="0" err="1" smtClean="0"/>
+              <a:rPr lang="es-ES" dirty="0" err="1"/>
               <a:t>aurelia</a:t>
             </a:r>
             <a:endParaRPr lang="es-ES" dirty="0"/>
@@ -24975,7 +24902,7 @@
           <a:lstStyle/>
           <a:p>
             <a:r>
-              <a:rPr lang="es-ES" dirty="0" smtClean="0">
+              <a:rPr lang="es-ES" dirty="0">
                 <a:solidFill>
                   <a:schemeClr val="bg1"/>
                 </a:solidFill>
@@ -24983,7 +24910,7 @@
               <a:t>Ejecutamos con –</a:t>
             </a:r>
             <a:r>
-              <a:rPr lang="es-ES" dirty="0" err="1" smtClean="0">
+              <a:rPr lang="es-ES" dirty="0" err="1">
                 <a:solidFill>
                   <a:schemeClr val="bg1"/>
                 </a:solidFill>
@@ -24991,18 +24918,13 @@
               <a:t>watch</a:t>
             </a:r>
             <a:r>
-              <a:rPr lang="es-ES" dirty="0" smtClean="0">
+              <a:rPr lang="es-ES" dirty="0">
                 <a:solidFill>
                   <a:schemeClr val="bg1"/>
                 </a:solidFill>
               </a:rPr>
               <a:t> para que escuche los cambios según desarrollamos y reinicie el explorador</a:t>
             </a:r>
-            <a:endParaRPr lang="es-ES" dirty="0">
-              <a:solidFill>
-                <a:schemeClr val="bg1"/>
-              </a:solidFill>
-            </a:endParaRPr>
           </a:p>
         </p:txBody>
       </p:sp>
@@ -25029,18 +24951,13 @@
           <a:lstStyle/>
           <a:p>
             <a:r>
-              <a:rPr lang="es-ES" dirty="0" smtClean="0">
+              <a:rPr lang="es-ES" dirty="0">
                 <a:solidFill>
                   <a:schemeClr val="bg1"/>
                 </a:solidFill>
               </a:rPr>
               <a:t>Nos situamos en el proyecto</a:t>
             </a:r>
-            <a:endParaRPr lang="es-ES" dirty="0">
-              <a:solidFill>
-                <a:schemeClr val="bg1"/>
-              </a:solidFill>
-            </a:endParaRPr>
           </a:p>
         </p:txBody>
       </p:sp>
@@ -25107,7 +25024,7 @@
           <a:lstStyle/>
           <a:p>
             <a:r>
-              <a:rPr lang="es-ES" dirty="0" smtClean="0">
+              <a:rPr lang="es-ES" dirty="0">
                 <a:solidFill>
                   <a:schemeClr val="bg1"/>
                 </a:solidFill>
@@ -25115,7 +25032,7 @@
               <a:t>Están son las </a:t>
             </a:r>
             <a:r>
-              <a:rPr lang="es-ES" dirty="0" err="1" smtClean="0">
+              <a:rPr lang="es-ES" dirty="0" err="1">
                 <a:solidFill>
                   <a:schemeClr val="bg1"/>
                 </a:solidFill>
@@ -25123,18 +25040,13 @@
               <a:t>urls</a:t>
             </a:r>
             <a:r>
-              <a:rPr lang="es-ES" dirty="0" smtClean="0">
+              <a:rPr lang="es-ES" dirty="0">
                 <a:solidFill>
                   <a:schemeClr val="bg1"/>
                 </a:solidFill>
               </a:rPr>
               <a:t> en las que lo lanza</a:t>
             </a:r>
-            <a:endParaRPr lang="es-ES" dirty="0">
-              <a:solidFill>
-                <a:schemeClr val="bg1"/>
-              </a:solidFill>
-            </a:endParaRPr>
           </a:p>
         </p:txBody>
       </p:sp>
@@ -25262,10 +25174,9 @@
           <a:lstStyle/>
           <a:p>
             <a:r>
-              <a:rPr lang="es-ES" dirty="0" smtClean="0"/>
+              <a:rPr lang="es-ES" dirty="0"/>
               <a:t>PRIMEROS PASOS</a:t>
             </a:r>
-            <a:endParaRPr lang="es-ES" dirty="0"/>
           </a:p>
         </p:txBody>
       </p:sp>
@@ -25286,13 +25197,8 @@
           <a:p>
             <a:r>
               <a:rPr lang="es-ES" dirty="0"/>
-              <a:t>a</a:t>
+              <a:t>app.html</a:t>
             </a:r>
-            <a:r>
-              <a:rPr lang="es-ES" dirty="0" smtClean="0"/>
-              <a:t>pp.html</a:t>
-            </a:r>
-            <a:endParaRPr lang="es-ES" dirty="0"/>
           </a:p>
         </p:txBody>
       </p:sp>
@@ -25392,10 +25298,9 @@
             <a:lstStyle/>
             <a:p>
               <a:r>
-                <a:rPr lang="es-ES" sz="1600" dirty="0" smtClean="0"/>
+                <a:rPr lang="es-ES" sz="1600" dirty="0"/>
                 <a:t>Esta propiedad enlazada a un booleano determina la visibilidad</a:t>
               </a:r>
-              <a:endParaRPr lang="es-ES" sz="1600" dirty="0"/>
             </a:p>
           </p:txBody>
         </p:sp>
@@ -25427,18 +25332,17 @@
             <a:lstStyle/>
             <a:p>
               <a:r>
-                <a:rPr lang="es-ES" sz="1600" dirty="0" smtClean="0"/>
+                <a:rPr lang="es-ES" sz="1600" dirty="0"/>
                 <a:t>Así </a:t>
               </a:r>
               <a:r>
-                <a:rPr lang="es-ES" sz="1600" dirty="0" err="1" smtClean="0"/>
+                <a:rPr lang="es-ES" sz="1600" dirty="0" err="1"/>
                 <a:t>bindeamos</a:t>
               </a:r>
               <a:r>
-                <a:rPr lang="es-ES" sz="1600" dirty="0" smtClean="0"/>
+                <a:rPr lang="es-ES" sz="1600" dirty="0"/>
                 <a:t> el valor de una variable.</a:t>
               </a:r>
-              <a:endParaRPr lang="es-ES" sz="1600" dirty="0"/>
             </a:p>
           </p:txBody>
         </p:sp>
@@ -25470,18 +25374,17 @@
             <a:lstStyle/>
             <a:p>
               <a:r>
-                <a:rPr lang="es-ES" sz="1600" dirty="0" smtClean="0"/>
+                <a:rPr lang="es-ES" sz="1600" dirty="0"/>
                 <a:t>Así vinculamos el </a:t>
               </a:r>
               <a:r>
-                <a:rPr lang="es-ES" sz="1600" dirty="0" err="1" smtClean="0"/>
+                <a:rPr lang="es-ES" sz="1600" dirty="0" err="1"/>
                 <a:t>onClick</a:t>
               </a:r>
               <a:r>
-                <a:rPr lang="es-ES" sz="1600" dirty="0" smtClean="0"/>
+                <a:rPr lang="es-ES" sz="1600" dirty="0"/>
                 <a:t>.</a:t>
               </a:r>
-              <a:endParaRPr lang="es-ES" sz="1600" dirty="0"/>
             </a:p>
           </p:txBody>
         </p:sp>
@@ -25513,18 +25416,17 @@
             <a:lstStyle/>
             <a:p>
               <a:r>
-                <a:rPr lang="es-ES" sz="1600" dirty="0" smtClean="0"/>
+                <a:rPr lang="es-ES" sz="1600" dirty="0"/>
                 <a:t>Así generamos elementos en un </a:t>
               </a:r>
               <a:r>
-                <a:rPr lang="es-ES" sz="1600" dirty="0" err="1" smtClean="0"/>
+                <a:rPr lang="es-ES" sz="1600" dirty="0" err="1"/>
                 <a:t>for</a:t>
               </a:r>
               <a:r>
-                <a:rPr lang="es-ES" sz="1600" dirty="0" smtClean="0"/>
+                <a:rPr lang="es-ES" sz="1600" dirty="0"/>
                 <a:t>.</a:t>
               </a:r>
-              <a:endParaRPr lang="es-ES" sz="1600" dirty="0"/>
             </a:p>
           </p:txBody>
         </p:sp>
@@ -25556,18 +25458,17 @@
             <a:lstStyle/>
             <a:p>
               <a:r>
-                <a:rPr lang="es-ES" sz="1600" dirty="0" smtClean="0"/>
+                <a:rPr lang="es-ES" sz="1600" dirty="0"/>
                 <a:t>Y así un </a:t>
               </a:r>
               <a:r>
-                <a:rPr lang="es-ES" sz="1600" dirty="0" err="1" smtClean="0"/>
+                <a:rPr lang="es-ES" sz="1600" dirty="0" err="1"/>
                 <a:t>radiobutton</a:t>
               </a:r>
               <a:r>
-                <a:rPr lang="es-ES" sz="1600" dirty="0" smtClean="0"/>
+                <a:rPr lang="es-ES" sz="1600" dirty="0"/>
                 <a:t>.</a:t>
               </a:r>
-              <a:endParaRPr lang="es-ES" sz="1600" dirty="0"/>
             </a:p>
           </p:txBody>
         </p:sp>
@@ -25618,10 +25519,9 @@
           <a:lstStyle/>
           <a:p>
             <a:r>
-              <a:rPr lang="es-ES" dirty="0" smtClean="0"/>
+              <a:rPr lang="es-ES" dirty="0"/>
               <a:t>Que es Aurelia.js</a:t>
             </a:r>
-            <a:endParaRPr lang="es-ES" dirty="0"/>
           </a:p>
         </p:txBody>
       </p:sp>
@@ -25642,10 +25542,9 @@
           <a:p>
             <a:pPr algn="ctr"/>
             <a:r>
-              <a:rPr lang="es-ES" dirty="0" smtClean="0"/>
+              <a:rPr lang="es-ES" dirty="0"/>
               <a:t>DESCRIPCIÓN Y COMPARATIVA CON ANGULAR</a:t>
             </a:r>
-            <a:endParaRPr lang="es-ES" dirty="0"/>
           </a:p>
         </p:txBody>
       </p:sp>
@@ -25695,18 +25594,17 @@
           <a:lstStyle/>
           <a:p>
             <a:r>
-              <a:rPr lang="es-ES" dirty="0" smtClean="0"/>
+              <a:rPr lang="es-ES" dirty="0"/>
               <a:t>PRIMEROS </a:t>
             </a:r>
             <a:r>
-              <a:rPr lang="es-ES" dirty="0" err="1" smtClean="0"/>
+              <a:rPr lang="es-ES" dirty="0" err="1"/>
               <a:t>PasOS</a:t>
             </a:r>
             <a:r>
-              <a:rPr lang="es-ES" dirty="0" smtClean="0"/>
+              <a:rPr lang="es-ES" dirty="0"/>
               <a:t> </a:t>
             </a:r>
-            <a:endParaRPr lang="es-ES" dirty="0"/>
           </a:p>
         </p:txBody>
       </p:sp>
@@ -25727,11 +25625,7 @@
           <a:p>
             <a:r>
               <a:rPr lang="es-ES" dirty="0" err="1"/>
-              <a:t>a</a:t>
-            </a:r>
-            <a:r>
-              <a:rPr lang="es-ES" dirty="0" err="1" smtClean="0"/>
-              <a:t>pp.ts</a:t>
+              <a:t>app.ts</a:t>
             </a:r>
             <a:endParaRPr lang="es-ES" dirty="0"/>
           </a:p>
@@ -25843,18 +25737,17 @@
           <a:lstStyle/>
           <a:p>
             <a:r>
-              <a:rPr lang="es-ES" dirty="0" smtClean="0"/>
+              <a:rPr lang="es-ES" dirty="0"/>
               <a:t>Aquí por ahora hay declarado un </a:t>
             </a:r>
             <a:r>
-              <a:rPr lang="es-ES" dirty="0" err="1" smtClean="0"/>
+              <a:rPr lang="es-ES" dirty="0" err="1"/>
               <a:t>array</a:t>
             </a:r>
             <a:r>
-              <a:rPr lang="es-ES" dirty="0" smtClean="0"/>
+              <a:rPr lang="es-ES" dirty="0"/>
               <a:t> de preguntas que se cambiará por una lectura desde un archivo.</a:t>
             </a:r>
-            <a:endParaRPr lang="es-ES" dirty="0"/>
           </a:p>
         </p:txBody>
       </p:sp>
@@ -25886,14 +25779,13 @@
           <a:lstStyle/>
           <a:p>
             <a:r>
-              <a:rPr lang="es-ES" sz="2400" dirty="0" smtClean="0"/>
+              <a:rPr lang="es-ES" sz="2400" dirty="0"/>
               <a:t>1.- Declaramos los atributos</a:t>
             </a:r>
             <a:r>
-              <a:rPr lang="es-ES" dirty="0" smtClean="0"/>
+              <a:rPr lang="es-ES" dirty="0"/>
               <a:t>.</a:t>
             </a:r>
-            <a:endParaRPr lang="es-ES" dirty="0"/>
           </a:p>
         </p:txBody>
       </p:sp>
@@ -26027,10 +25919,9 @@
           <a:lstStyle/>
           <a:p>
             <a:r>
-              <a:rPr lang="es-ES" sz="2400" dirty="0" smtClean="0"/>
+              <a:rPr lang="es-ES" sz="2400" dirty="0"/>
               <a:t>2.- Declaramos el constructor</a:t>
             </a:r>
-            <a:endParaRPr lang="es-ES" sz="2400" dirty="0"/>
           </a:p>
         </p:txBody>
       </p:sp>
@@ -26062,10 +25953,9 @@
           <a:lstStyle/>
           <a:p>
             <a:r>
-              <a:rPr lang="es-ES" sz="2400" dirty="0" smtClean="0"/>
+              <a:rPr lang="es-ES" sz="2400" dirty="0"/>
               <a:t>2.- El evento del primer botón cambia los elementos a mostrar y carga la primera pregunta</a:t>
             </a:r>
-            <a:endParaRPr lang="es-ES" sz="2400" dirty="0"/>
           </a:p>
         </p:txBody>
       </p:sp>
@@ -26122,13 +26012,8 @@
           <a:p>
             <a:r>
               <a:rPr lang="es-ES" sz="2400" dirty="0"/>
-              <a:t>3</a:t>
+              <a:t>3.- Saco la funcionalidad de cambiar los elementos a mostrar a un método para reusarla.</a:t>
             </a:r>
-            <a:r>
-              <a:rPr lang="es-ES" sz="2400" dirty="0" smtClean="0"/>
-              <a:t>.- Saco la funcionalidad de cambiar los elementos a mostrar a un método para reusarla.</a:t>
-            </a:r>
-            <a:endParaRPr lang="es-ES" sz="2400" dirty="0"/>
           </a:p>
         </p:txBody>
       </p:sp>
@@ -26191,19 +26076,14 @@
           <a:p>
             <a:r>
               <a:rPr lang="es-ES" sz="2400" dirty="0"/>
-              <a:t>3</a:t>
-            </a:r>
-            <a:r>
-              <a:rPr lang="es-ES" sz="2400" dirty="0" smtClean="0"/>
-              <a:t>.- Creo la funcionalidad asociada al botón de “siguiente” de cada pregunta.</a:t>
+              <a:t>3.- Creo la funcionalidad asociada al botón de “siguiente” de cada pregunta.</a:t>
             </a:r>
           </a:p>
           <a:p>
             <a:r>
-              <a:rPr lang="es-ES" sz="2400" dirty="0" smtClean="0"/>
+              <a:rPr lang="es-ES" sz="2400" dirty="0"/>
               <a:t>PENDIENTE FINALIZAR</a:t>
             </a:r>
-            <a:endParaRPr lang="es-ES" sz="2400" dirty="0"/>
           </a:p>
         </p:txBody>
       </p:sp>
@@ -26235,16 +26115,15 @@
           <a:lstStyle/>
           <a:p>
             <a:r>
-              <a:rPr lang="es-ES" sz="2400" dirty="0" smtClean="0"/>
+              <a:rPr lang="es-ES" sz="2400" dirty="0"/>
               <a:t>4.- Creo la funcionalidad de calcular resultado.</a:t>
             </a:r>
           </a:p>
           <a:p>
             <a:r>
-              <a:rPr lang="es-ES" sz="2400" dirty="0" smtClean="0"/>
+              <a:rPr lang="es-ES" sz="2400" dirty="0"/>
               <a:t>PENDIENTE FINALIZAR</a:t>
             </a:r>
-            <a:endParaRPr lang="es-ES" sz="2400" dirty="0"/>
           </a:p>
         </p:txBody>
       </p:sp>
@@ -26342,10 +26221,9 @@
           <a:lstStyle/>
           <a:p>
             <a:r>
-              <a:rPr lang="es-ES" dirty="0" smtClean="0"/>
+              <a:rPr lang="es-ES" dirty="0"/>
               <a:t>ESTILOS CON CSS</a:t>
             </a:r>
-            <a:endParaRPr lang="es-ES" dirty="0"/>
           </a:p>
         </p:txBody>
       </p:sp>
@@ -26442,7 +26320,7 @@
           <a:lstStyle/>
           <a:p>
             <a:r>
-              <a:rPr lang="es-ES" dirty="0" smtClean="0">
+              <a:rPr lang="es-ES" dirty="0">
                 <a:solidFill>
                   <a:schemeClr val="bg1">
                     <a:lumMod val="95000"/>
@@ -26452,7 +26330,7 @@
               <a:t>Creo un archivo </a:t>
             </a:r>
             <a:r>
-              <a:rPr lang="es-ES" dirty="0" err="1" smtClean="0">
+              <a:rPr lang="es-ES" dirty="0" err="1">
                 <a:solidFill>
                   <a:schemeClr val="bg1">
                     <a:lumMod val="95000"/>
@@ -26558,7 +26436,7 @@
           <a:lstStyle/>
           <a:p>
             <a:r>
-              <a:rPr lang="es-ES" dirty="0" smtClean="0">
+              <a:rPr lang="es-ES" dirty="0">
                 <a:solidFill>
                   <a:schemeClr val="bg1">
                     <a:lumMod val="95000"/>
@@ -26567,13 +26445,6 @@
               </a:rPr>
               <a:t>Lo vinculo en el app.html y añado clases a los componentes</a:t>
             </a:r>
-            <a:endParaRPr lang="es-ES" dirty="0">
-              <a:solidFill>
-                <a:schemeClr val="bg1">
-                  <a:lumMod val="95000"/>
-                </a:schemeClr>
-              </a:solidFill>
-            </a:endParaRPr>
           </a:p>
         </p:txBody>
       </p:sp>
@@ -26776,7 +26647,7 @@
           <a:lstStyle/>
           <a:p>
             <a:r>
-              <a:rPr lang="es-ES" dirty="0" smtClean="0">
+              <a:rPr lang="es-ES" dirty="0">
                 <a:solidFill>
                   <a:schemeClr val="bg1">
                     <a:lumMod val="95000"/>
@@ -26785,13 +26656,6 @@
               </a:rPr>
               <a:t>Añado los estilos.</a:t>
             </a:r>
-            <a:endParaRPr lang="es-ES" dirty="0">
-              <a:solidFill>
-                <a:schemeClr val="bg1">
-                  <a:lumMod val="95000"/>
-                </a:schemeClr>
-              </a:solidFill>
-            </a:endParaRPr>
           </a:p>
         </p:txBody>
       </p:sp>
@@ -26940,10 +26804,9 @@
           <a:lstStyle/>
           <a:p>
             <a:r>
-              <a:rPr lang="es-ES" sz="2400" dirty="0" smtClean="0"/>
+              <a:rPr lang="es-ES" sz="2400" dirty="0"/>
               <a:t>index.html</a:t>
             </a:r>
-            <a:endParaRPr lang="es-ES" sz="2400" dirty="0"/>
           </a:p>
         </p:txBody>
       </p:sp>
@@ -27105,13 +26968,8 @@
           <a:p>
             <a:r>
               <a:rPr lang="es-ES" sz="2400" dirty="0"/>
-              <a:t>s</a:t>
+              <a:t>styles.css</a:t>
             </a:r>
-            <a:r>
-              <a:rPr lang="es-ES" sz="2400" dirty="0" smtClean="0"/>
-              <a:t>tyles.css</a:t>
-            </a:r>
-            <a:endParaRPr lang="es-ES" sz="2400" dirty="0"/>
           </a:p>
         </p:txBody>
       </p:sp>
@@ -27139,7 +26997,7 @@
           <a:p>
             <a:pPr algn="ctr"/>
             <a:r>
-              <a:rPr lang="es-ES" dirty="0" smtClean="0">
+              <a:rPr lang="es-ES" dirty="0">
                 <a:solidFill>
                   <a:schemeClr val="bg1">
                     <a:lumMod val="95000"/>
@@ -27149,7 +27007,7 @@
               <a:t>Para dar formato al </a:t>
             </a:r>
             <a:r>
-              <a:rPr lang="es-ES" dirty="0" err="1" smtClean="0">
+              <a:rPr lang="es-ES" dirty="0" err="1">
                 <a:solidFill>
                   <a:schemeClr val="bg1">
                     <a:lumMod val="95000"/>
@@ -27214,11 +27072,11 @@
           <a:lstStyle/>
           <a:p>
             <a:r>
-              <a:rPr lang="es-ES" dirty="0" smtClean="0"/>
+              <a:rPr lang="es-ES" dirty="0"/>
               <a:t>Leer preguntas de fichero </a:t>
             </a:r>
             <a:r>
-              <a:rPr lang="es-ES" dirty="0" err="1" smtClean="0"/>
+              <a:rPr lang="es-ES" dirty="0" err="1"/>
               <a:t>json</a:t>
             </a:r>
             <a:endParaRPr lang="es-ES" dirty="0"/>
@@ -27352,7 +27210,7 @@
             <a:p>
               <a:pPr algn="ctr"/>
               <a:r>
-                <a:rPr lang="es-ES" dirty="0" smtClean="0">
+                <a:rPr lang="es-ES" dirty="0">
                   <a:solidFill>
                     <a:schemeClr val="bg1">
                       <a:lumMod val="95000"/>
@@ -27362,7 +27220,7 @@
                 <a:t>Pasamos las preguntas a un archivo </a:t>
               </a:r>
               <a:r>
-                <a:rPr lang="es-ES" dirty="0" err="1" smtClean="0">
+                <a:rPr lang="es-ES" dirty="0" err="1">
                   <a:solidFill>
                     <a:schemeClr val="bg1">
                       <a:lumMod val="95000"/>
@@ -27727,7 +27585,7 @@
             <a:p>
               <a:pPr algn="ctr"/>
               <a:r>
-                <a:rPr lang="es-ES" dirty="0" smtClean="0">
+                <a:rPr lang="es-ES" dirty="0">
                   <a:solidFill>
                     <a:schemeClr val="bg1">
                       <a:lumMod val="95000"/>
@@ -27744,17 +27602,7 @@
                     </a:schemeClr>
                   </a:solidFill>
                 </a:rPr>
-                <a:t>a</a:t>
-              </a:r>
-              <a:r>
-                <a:rPr lang="es-ES" dirty="0" err="1" smtClean="0">
-                  <a:solidFill>
-                    <a:schemeClr val="bg1">
-                      <a:lumMod val="95000"/>
-                    </a:schemeClr>
-                  </a:solidFill>
-                </a:rPr>
-                <a:t>urelia.json</a:t>
+                <a:t>aurelia.json</a:t>
               </a:r>
               <a:endParaRPr lang="es-ES" dirty="0">
                 <a:solidFill>
@@ -27795,26 +27643,25 @@
           <a:lstStyle/>
           <a:p>
             <a:r>
-              <a:rPr lang="es-ES" dirty="0" smtClean="0"/>
+              <a:rPr lang="es-ES" dirty="0"/>
               <a:t>Añadir el formato </a:t>
             </a:r>
             <a:r>
-              <a:rPr lang="es-ES" dirty="0" err="1" smtClean="0"/>
+              <a:rPr lang="es-ES" dirty="0" err="1"/>
               <a:t>json</a:t>
             </a:r>
             <a:r>
-              <a:rPr lang="es-ES" dirty="0" smtClean="0"/>
+              <a:rPr lang="es-ES" dirty="0"/>
               <a:t> al </a:t>
             </a:r>
             <a:r>
-              <a:rPr lang="es-ES" dirty="0" err="1" smtClean="0"/>
+              <a:rPr lang="es-ES" dirty="0" err="1"/>
               <a:t>bundle</a:t>
             </a:r>
             <a:r>
-              <a:rPr lang="es-ES" dirty="0" smtClean="0"/>
+              <a:rPr lang="es-ES" dirty="0"/>
               <a:t> </a:t>
             </a:r>
-            <a:endParaRPr lang="es-ES" dirty="0"/>
           </a:p>
         </p:txBody>
       </p:sp>
@@ -27847,14 +27694,10 @@
           <a:p>
             <a:r>
               <a:rPr lang="es-ES" dirty="0"/>
-              <a:t>Añadir </a:t>
+              <a:t>Añadir la ruta del data a las </a:t>
             </a:r>
             <a:r>
-              <a:rPr lang="es-ES" dirty="0" smtClean="0"/>
-              <a:t>la ruta del data a las </a:t>
-            </a:r>
-            <a:r>
-              <a:rPr lang="es-ES" dirty="0" err="1" smtClean="0"/>
+              <a:rPr lang="es-ES" dirty="0" err="1"/>
               <a:t>paths</a:t>
             </a:r>
             <a:endParaRPr lang="es-ES" dirty="0"/>
@@ -27901,14 +27744,10 @@
             </a:r>
             <a:r>
               <a:rPr lang="es-ES" dirty="0"/>
-              <a:t> </a:t>
+              <a:t> al </a:t>
             </a:r>
             <a:r>
-              <a:rPr lang="es-ES" dirty="0" smtClean="0"/>
-              <a:t>al </a:t>
-            </a:r>
-            <a:r>
-              <a:rPr lang="es-ES" dirty="0" err="1" smtClean="0"/>
+              <a:rPr lang="es-ES" dirty="0" err="1"/>
               <a:t>plugin</a:t>
             </a:r>
             <a:endParaRPr lang="es-ES" dirty="0"/>
@@ -28047,7 +27886,7 @@
             <a:p>
               <a:pPr algn="ctr"/>
               <a:r>
-                <a:rPr lang="es-ES" dirty="0" smtClean="0">
+                <a:rPr lang="es-ES" dirty="0">
                   <a:solidFill>
                     <a:schemeClr val="bg1">
                       <a:lumMod val="95000"/>
@@ -28057,7 +27896,7 @@
                 <a:t>Creo el modelo </a:t>
               </a:r>
               <a:r>
-                <a:rPr lang="es-ES" dirty="0" err="1" smtClean="0">
+                <a:rPr lang="es-ES" dirty="0" err="1">
                   <a:solidFill>
                     <a:schemeClr val="bg1">
                       <a:lumMod val="95000"/>
@@ -28153,10 +27992,9 @@
           <a:lstStyle/>
           <a:p>
             <a:r>
-              <a:rPr lang="es-ES" dirty="0" smtClean="0"/>
+              <a:rPr lang="es-ES" dirty="0"/>
               <a:t>Creo las propiedades</a:t>
             </a:r>
-            <a:endParaRPr lang="es-ES" dirty="0"/>
           </a:p>
         </p:txBody>
       </p:sp>
@@ -28188,10 +28026,9 @@
           <a:lstStyle/>
           <a:p>
             <a:r>
-              <a:rPr lang="es-ES" dirty="0" smtClean="0"/>
+              <a:rPr lang="es-ES" dirty="0"/>
               <a:t>Creo el constructor</a:t>
             </a:r>
-            <a:endParaRPr lang="es-ES" dirty="0"/>
           </a:p>
         </p:txBody>
       </p:sp>
@@ -28301,11 +28138,11 @@
           <a:lstStyle/>
           <a:p>
             <a:r>
-              <a:rPr lang="es-ES" dirty="0" smtClean="0"/>
+              <a:rPr lang="es-ES" dirty="0"/>
               <a:t>Importo el modelo de </a:t>
             </a:r>
             <a:r>
-              <a:rPr lang="es-ES" dirty="0" err="1" smtClean="0"/>
+              <a:rPr lang="es-ES" dirty="0" err="1"/>
               <a:t>Answers</a:t>
             </a:r>
             <a:endParaRPr lang="es-ES" dirty="0"/>
@@ -28340,10 +28177,9 @@
           <a:lstStyle/>
           <a:p>
             <a:r>
-              <a:rPr lang="es-ES" dirty="0" smtClean="0"/>
+              <a:rPr lang="es-ES" dirty="0"/>
               <a:t>Creo las propiedades</a:t>
             </a:r>
-            <a:endParaRPr lang="es-ES" dirty="0"/>
           </a:p>
         </p:txBody>
       </p:sp>
@@ -28375,10 +28211,9 @@
           <a:lstStyle/>
           <a:p>
             <a:r>
-              <a:rPr lang="es-ES" dirty="0" smtClean="0"/>
+              <a:rPr lang="es-ES" dirty="0"/>
               <a:t>Creo el constructor</a:t>
             </a:r>
-            <a:endParaRPr lang="es-ES" dirty="0"/>
           </a:p>
         </p:txBody>
       </p:sp>
@@ -28460,7 +28295,7 @@
             <a:p>
               <a:pPr algn="ctr"/>
               <a:r>
-                <a:rPr lang="es-ES" dirty="0" smtClean="0">
+                <a:rPr lang="es-ES" dirty="0">
                   <a:solidFill>
                     <a:schemeClr val="bg1">
                       <a:lumMod val="95000"/>
@@ -28470,7 +28305,7 @@
                 <a:t>Creo el modelo </a:t>
               </a:r>
               <a:r>
-                <a:rPr lang="es-ES" dirty="0" err="1" smtClean="0">
+                <a:rPr lang="es-ES" dirty="0" err="1">
                   <a:solidFill>
                     <a:schemeClr val="bg1">
                       <a:lumMod val="95000"/>
@@ -28622,7 +28457,7 @@
             <a:p>
               <a:pPr algn="ctr"/>
               <a:r>
-                <a:rPr lang="es-ES" dirty="0" smtClean="0">
+                <a:rPr lang="es-ES" dirty="0">
                   <a:solidFill>
                     <a:schemeClr val="bg1">
                       <a:lumMod val="95000"/>
@@ -28632,7 +28467,7 @@
                 <a:t>Creo el </a:t>
               </a:r>
               <a:r>
-                <a:rPr lang="es-ES" dirty="0" err="1" smtClean="0">
+                <a:rPr lang="es-ES" dirty="0" err="1">
                   <a:solidFill>
                     <a:schemeClr val="bg1">
                       <a:lumMod val="95000"/>
@@ -28704,27 +28539,27 @@
           <a:lstStyle/>
           <a:p>
             <a:r>
-              <a:rPr lang="es-ES" dirty="0" smtClean="0"/>
+              <a:rPr lang="es-ES" dirty="0"/>
               <a:t>Importo el modelo de </a:t>
             </a:r>
             <a:r>
-              <a:rPr lang="es-ES" dirty="0" err="1" smtClean="0"/>
+              <a:rPr lang="es-ES" dirty="0" err="1"/>
               <a:t>Question</a:t>
             </a:r>
             <a:r>
-              <a:rPr lang="es-ES" dirty="0" smtClean="0"/>
+              <a:rPr lang="es-ES" dirty="0"/>
               <a:t>, el </a:t>
             </a:r>
             <a:r>
-              <a:rPr lang="es-ES" dirty="0" err="1" smtClean="0"/>
+              <a:rPr lang="es-ES" dirty="0" err="1"/>
               <a:t>Inject</a:t>
             </a:r>
             <a:r>
-              <a:rPr lang="es-ES" dirty="0" smtClean="0"/>
+              <a:rPr lang="es-ES" dirty="0"/>
               <a:t> y </a:t>
             </a:r>
             <a:r>
-              <a:rPr lang="es-ES" dirty="0" err="1" smtClean="0"/>
+              <a:rPr lang="es-ES" dirty="0" err="1"/>
               <a:t>NewInstance</a:t>
             </a:r>
             <a:endParaRPr lang="es-ES" dirty="0"/>
@@ -28759,26 +28594,25 @@
           <a:lstStyle/>
           <a:p>
             <a:r>
-              <a:rPr lang="es-ES" dirty="0" smtClean="0"/>
+              <a:rPr lang="es-ES" dirty="0"/>
               <a:t>Configuro la ruta y tipo de archivo del cual leer y </a:t>
             </a:r>
             <a:r>
-              <a:rPr lang="es-ES" dirty="0" err="1" smtClean="0"/>
+              <a:rPr lang="es-ES" dirty="0" err="1"/>
               <a:t>parseo</a:t>
             </a:r>
             <a:r>
-              <a:rPr lang="es-ES" dirty="0" smtClean="0"/>
+              <a:rPr lang="es-ES" dirty="0"/>
               <a:t> el JSON  al objeto </a:t>
             </a:r>
             <a:r>
-              <a:rPr lang="es-ES" dirty="0" err="1" smtClean="0"/>
+              <a:rPr lang="es-ES" dirty="0" err="1"/>
               <a:t>Question</a:t>
             </a:r>
             <a:r>
-              <a:rPr lang="es-ES" dirty="0" smtClean="0"/>
+              <a:rPr lang="es-ES" dirty="0"/>
               <a:t>.</a:t>
             </a:r>
-            <a:endParaRPr lang="es-ES" dirty="0"/>
           </a:p>
         </p:txBody>
       </p:sp>
@@ -28810,11 +28644,11 @@
           <a:lstStyle/>
           <a:p>
             <a:r>
-              <a:rPr lang="es-ES" dirty="0" smtClean="0"/>
+              <a:rPr lang="es-ES" dirty="0"/>
               <a:t>Inyecto la </a:t>
             </a:r>
             <a:r>
-              <a:rPr lang="es-ES" dirty="0" err="1" smtClean="0"/>
+              <a:rPr lang="es-ES" dirty="0" err="1"/>
               <a:t>Question</a:t>
             </a:r>
             <a:endParaRPr lang="es-ES" dirty="0"/>
@@ -28953,7 +28787,7 @@
             <a:p>
               <a:pPr algn="ctr"/>
               <a:r>
-                <a:rPr lang="es-ES" dirty="0" smtClean="0">
+                <a:rPr lang="es-ES" dirty="0">
                   <a:solidFill>
                     <a:schemeClr val="bg1">
                       <a:lumMod val="95000"/>
@@ -28963,7 +28797,7 @@
                 <a:t>Modifico el </a:t>
               </a:r>
               <a:r>
-                <a:rPr lang="es-ES" dirty="0" err="1" smtClean="0">
+                <a:rPr lang="es-ES" dirty="0" err="1">
                   <a:solidFill>
                     <a:schemeClr val="bg1">
                       <a:lumMod val="95000"/>
@@ -29011,27 +28845,27 @@
           <a:lstStyle/>
           <a:p>
             <a:r>
-              <a:rPr lang="es-ES" dirty="0" smtClean="0"/>
+              <a:rPr lang="es-ES" dirty="0"/>
               <a:t>Importo el modelo de </a:t>
             </a:r>
             <a:r>
-              <a:rPr lang="es-ES" dirty="0" err="1" smtClean="0"/>
+              <a:rPr lang="es-ES" dirty="0" err="1"/>
               <a:t>Question</a:t>
             </a:r>
             <a:r>
-              <a:rPr lang="es-ES" dirty="0" smtClean="0"/>
+              <a:rPr lang="es-ES" dirty="0"/>
               <a:t>, el </a:t>
             </a:r>
             <a:r>
-              <a:rPr lang="es-ES" dirty="0" err="1" smtClean="0"/>
+              <a:rPr lang="es-ES" dirty="0" err="1"/>
               <a:t>Inject</a:t>
             </a:r>
             <a:r>
-              <a:rPr lang="es-ES" dirty="0" smtClean="0"/>
+              <a:rPr lang="es-ES" dirty="0"/>
               <a:t> y el </a:t>
             </a:r>
             <a:r>
-              <a:rPr lang="es-ES" dirty="0" err="1" smtClean="0"/>
+              <a:rPr lang="es-ES" dirty="0" err="1"/>
               <a:t>Service</a:t>
             </a:r>
             <a:endParaRPr lang="es-ES" dirty="0"/>
@@ -29066,10 +28900,9 @@
           <a:lstStyle/>
           <a:p>
             <a:r>
-              <a:rPr lang="es-ES" dirty="0" smtClean="0"/>
+              <a:rPr lang="es-ES" dirty="0"/>
               <a:t>Modifico las propiedades</a:t>
             </a:r>
-            <a:endParaRPr lang="es-ES" dirty="0"/>
           </a:p>
         </p:txBody>
       </p:sp>
@@ -29265,16 +29098,12 @@
           <a:lstStyle/>
           <a:p>
             <a:r>
-              <a:rPr lang="es-ES" dirty="0" smtClean="0"/>
+              <a:rPr lang="es-ES" dirty="0"/>
               <a:t>Inyecto el </a:t>
             </a:r>
             <a:r>
               <a:rPr lang="es-ES" dirty="0" err="1"/>
-              <a:t>S</a:t>
-            </a:r>
-            <a:r>
-              <a:rPr lang="es-ES" dirty="0" err="1" smtClean="0"/>
-              <a:t>ervice</a:t>
+              <a:t>Service</a:t>
             </a:r>
             <a:endParaRPr lang="es-ES" dirty="0"/>
           </a:p>
@@ -29308,10 +29137,9 @@
           <a:lstStyle/>
           <a:p>
             <a:r>
-              <a:rPr lang="es-ES" dirty="0" smtClean="0"/>
+              <a:rPr lang="es-ES" dirty="0"/>
               <a:t>Inicializo el servicio</a:t>
             </a:r>
-            <a:endParaRPr lang="es-ES" dirty="0"/>
           </a:p>
         </p:txBody>
       </p:sp>
@@ -29397,10 +29225,9 @@
           <a:lstStyle/>
           <a:p>
             <a:r>
-              <a:rPr lang="es-ES" dirty="0" smtClean="0"/>
+              <a:rPr lang="es-ES" dirty="0"/>
               <a:t>Llamo al método de obtener las preguntas del servicio</a:t>
             </a:r>
-            <a:endParaRPr lang="es-ES" dirty="0"/>
           </a:p>
         </p:txBody>
       </p:sp>
@@ -29432,10 +29259,9 @@
           <a:lstStyle/>
           <a:p>
             <a:r>
-              <a:rPr lang="es-ES" dirty="0" smtClean="0"/>
+              <a:rPr lang="es-ES" dirty="0"/>
               <a:t>Asigno las preguntas a la variable</a:t>
             </a:r>
-            <a:endParaRPr lang="es-ES" dirty="0"/>
           </a:p>
         </p:txBody>
       </p:sp>
@@ -29608,10 +29434,9 @@
           <a:lstStyle/>
           <a:p>
             <a:r>
-              <a:rPr lang="es-ES" dirty="0" smtClean="0"/>
+              <a:rPr lang="es-ES" dirty="0"/>
               <a:t>Preguntas aleatorias</a:t>
             </a:r>
-            <a:endParaRPr lang="es-ES" dirty="0"/>
           </a:p>
         </p:txBody>
       </p:sp>
@@ -29723,7 +29548,7 @@
             <a:p>
               <a:pPr algn="ctr"/>
               <a:r>
-                <a:rPr lang="es-ES" dirty="0" smtClean="0">
+                <a:rPr lang="es-ES" dirty="0">
                   <a:solidFill>
                     <a:schemeClr val="bg1">
                       <a:lumMod val="95000"/>
@@ -29733,7 +29558,7 @@
                 <a:t>Modifico el </a:t>
               </a:r>
               <a:r>
-                <a:rPr lang="es-ES" dirty="0" err="1" smtClean="0">
+                <a:rPr lang="es-ES" dirty="0" err="1">
                   <a:solidFill>
                     <a:schemeClr val="bg1">
                       <a:lumMod val="95000"/>
@@ -29743,7 +29568,7 @@
                 <a:t>Service</a:t>
               </a:r>
               <a:r>
-                <a:rPr lang="es-ES" dirty="0" smtClean="0">
+                <a:rPr lang="es-ES" dirty="0">
                   <a:solidFill>
                     <a:schemeClr val="bg1">
                       <a:lumMod val="95000"/>
@@ -29752,13 +29577,6 @@
                 </a:rPr>
                 <a:t>.</a:t>
               </a:r>
-              <a:endParaRPr lang="es-ES" dirty="0">
-                <a:solidFill>
-                  <a:schemeClr val="bg1">
-                    <a:lumMod val="95000"/>
-                  </a:schemeClr>
-                </a:solidFill>
-              </a:endParaRPr>
             </a:p>
           </p:txBody>
         </p:sp>
@@ -29839,10 +29657,9 @@
           <a:lstStyle/>
           <a:p>
             <a:r>
-              <a:rPr lang="es-ES" dirty="0" smtClean="0"/>
+              <a:rPr lang="es-ES" dirty="0"/>
               <a:t>Se selecciona aleatoriamente los índices de las preguntas a mostrar</a:t>
             </a:r>
-            <a:endParaRPr lang="es-ES" dirty="0"/>
           </a:p>
         </p:txBody>
       </p:sp>
@@ -29874,10 +29691,9 @@
           <a:lstStyle/>
           <a:p>
             <a:r>
-              <a:rPr lang="es-ES" dirty="0" smtClean="0"/>
+              <a:rPr lang="es-ES" dirty="0"/>
               <a:t>Si el índice no está repetido se selecciona la pregunta.</a:t>
             </a:r>
-            <a:endParaRPr lang="es-ES" dirty="0"/>
           </a:p>
         </p:txBody>
       </p:sp>
@@ -30013,7 +29829,7 @@
             <a:p>
               <a:pPr algn="ctr"/>
               <a:r>
-                <a:rPr lang="es-ES" dirty="0" smtClean="0">
+                <a:rPr lang="es-ES" dirty="0">
                   <a:solidFill>
                     <a:schemeClr val="bg1">
                       <a:lumMod val="95000"/>
@@ -30023,7 +29839,7 @@
                 <a:t>Modifico el </a:t>
               </a:r>
               <a:r>
-                <a:rPr lang="es-ES" dirty="0" err="1" smtClean="0">
+                <a:rPr lang="es-ES" dirty="0" err="1">
                   <a:solidFill>
                     <a:schemeClr val="bg1">
                       <a:lumMod val="95000"/>
@@ -30033,7 +29849,7 @@
                 <a:t>app.ts</a:t>
               </a:r>
               <a:r>
-                <a:rPr lang="es-ES" dirty="0" smtClean="0">
+                <a:rPr lang="es-ES" dirty="0">
                   <a:solidFill>
                     <a:schemeClr val="bg1">
                       <a:lumMod val="95000"/>
@@ -30042,13 +29858,6 @@
                 </a:rPr>
                 <a:t>.</a:t>
               </a:r>
-              <a:endParaRPr lang="es-ES" dirty="0">
-                <a:solidFill>
-                  <a:schemeClr val="bg1">
-                    <a:lumMod val="95000"/>
-                  </a:schemeClr>
-                </a:solidFill>
-              </a:endParaRPr>
             </a:p>
           </p:txBody>
         </p:sp>
@@ -30105,18 +29914,17 @@
           <a:lstStyle/>
           <a:p>
             <a:r>
-              <a:rPr lang="es-ES" dirty="0" smtClean="0"/>
+              <a:rPr lang="es-ES" dirty="0"/>
               <a:t>Cargo el </a:t>
             </a:r>
             <a:r>
-              <a:rPr lang="es-ES" dirty="0" err="1" smtClean="0"/>
+              <a:rPr lang="es-ES" dirty="0" err="1"/>
               <a:t>array</a:t>
             </a:r>
             <a:r>
-              <a:rPr lang="es-ES" dirty="0" smtClean="0"/>
+              <a:rPr lang="es-ES" dirty="0"/>
               <a:t> de preguntas con el número que necesito.</a:t>
             </a:r>
-            <a:endParaRPr lang="es-ES" dirty="0"/>
           </a:p>
         </p:txBody>
       </p:sp>
@@ -30166,10 +29974,9 @@
           <a:lstStyle/>
           <a:p>
             <a:r>
-              <a:rPr lang="es-ES" dirty="0" smtClean="0"/>
+              <a:rPr lang="es-ES" dirty="0"/>
               <a:t>VOLVER A JUGAR</a:t>
             </a:r>
-            <a:endParaRPr lang="es-ES" dirty="0"/>
           </a:p>
         </p:txBody>
       </p:sp>
@@ -30383,7 +30190,7 @@
             <a:p>
               <a:pPr algn="ctr"/>
               <a:r>
-                <a:rPr lang="es-ES" dirty="0" smtClean="0">
+                <a:rPr lang="es-ES" dirty="0">
                   <a:solidFill>
                     <a:schemeClr val="bg1">
                       <a:lumMod val="95000"/>
@@ -30393,7 +30200,7 @@
                 <a:t>Añado el botón en el </a:t>
               </a:r>
               <a:r>
-                <a:rPr lang="es-ES" dirty="0" err="1" smtClean="0">
+                <a:rPr lang="es-ES" dirty="0" err="1">
                   <a:solidFill>
                     <a:schemeClr val="bg1">
                       <a:lumMod val="95000"/>
@@ -30545,7 +30352,7 @@
             <a:p>
               <a:pPr algn="ctr"/>
               <a:r>
-                <a:rPr lang="es-ES" dirty="0" smtClean="0">
+                <a:rPr lang="es-ES" dirty="0">
                   <a:solidFill>
                     <a:schemeClr val="bg1">
                       <a:lumMod val="95000"/>
@@ -30555,7 +30362,7 @@
                 <a:t>Añado la funcionalidad del botón en el </a:t>
               </a:r>
               <a:r>
-                <a:rPr lang="es-ES" dirty="0" err="1" smtClean="0">
+                <a:rPr lang="es-ES" dirty="0" err="1">
                   <a:solidFill>
                     <a:schemeClr val="bg1">
                       <a:lumMod val="95000"/>
@@ -30651,10 +30458,9 @@
           <a:lstStyle/>
           <a:p>
             <a:r>
-              <a:rPr lang="es-ES" dirty="0" smtClean="0"/>
+              <a:rPr lang="es-ES" dirty="0"/>
               <a:t>Reseteo las variables necesarias y llamo a inicializar juego.</a:t>
             </a:r>
-            <a:endParaRPr lang="es-ES" dirty="0"/>
           </a:p>
         </p:txBody>
       </p:sp>
@@ -30704,10 +30510,9 @@
           <a:lstStyle/>
           <a:p>
             <a:r>
-              <a:rPr lang="es-ES" dirty="0" smtClean="0"/>
+              <a:rPr lang="es-ES" dirty="0"/>
               <a:t>pantallas</a:t>
             </a:r>
-            <a:endParaRPr lang="es-ES" dirty="0"/>
           </a:p>
         </p:txBody>
       </p:sp>
@@ -30757,10 +30562,9 @@
           <a:lstStyle/>
           <a:p>
             <a:r>
-              <a:rPr lang="es-ES" dirty="0" smtClean="0"/>
+              <a:rPr lang="es-ES" dirty="0"/>
               <a:t>Pantalla inicio</a:t>
             </a:r>
-            <a:endParaRPr lang="es-ES" dirty="0"/>
           </a:p>
         </p:txBody>
       </p:sp>
@@ -30803,10 +30607,9 @@
           <a:lstStyle/>
           <a:p>
             <a:r>
-              <a:rPr lang="es-ES" dirty="0" smtClean="0"/>
+              <a:rPr lang="es-ES" dirty="0"/>
               <a:t>Si se aprieta a jugar comienza el juego</a:t>
             </a:r>
-            <a:endParaRPr lang="es-ES" dirty="0"/>
           </a:p>
         </p:txBody>
       </p:sp>
@@ -30856,10 +30659,9 @@
           <a:lstStyle/>
           <a:p>
             <a:r>
-              <a:rPr lang="es-ES" dirty="0" smtClean="0"/>
+              <a:rPr lang="es-ES" dirty="0"/>
               <a:t>Pantalla de juego</a:t>
             </a:r>
-            <a:endParaRPr lang="es-ES" dirty="0"/>
           </a:p>
         </p:txBody>
       </p:sp>
@@ -30902,10 +30704,9 @@
           <a:lstStyle/>
           <a:p>
             <a:r>
-              <a:rPr lang="es-ES" dirty="0" smtClean="0"/>
+              <a:rPr lang="es-ES" dirty="0"/>
               <a:t>Seleccionar cada pregunta y apretar a Jugar.</a:t>
             </a:r>
-            <a:endParaRPr lang="es-ES" dirty="0"/>
           </a:p>
         </p:txBody>
       </p:sp>
@@ -30955,10 +30756,9 @@
           <a:lstStyle/>
           <a:p>
             <a:r>
-              <a:rPr lang="es-ES" dirty="0" smtClean="0"/>
+              <a:rPr lang="es-ES" dirty="0"/>
               <a:t>PANTALLA RESULTADO</a:t>
             </a:r>
-            <a:endParaRPr lang="es-ES" dirty="0"/>
           </a:p>
         </p:txBody>
       </p:sp>
@@ -31001,10 +30801,9 @@
           <a:lstStyle/>
           <a:p>
             <a:r>
-              <a:rPr lang="es-ES" dirty="0" smtClean="0"/>
+              <a:rPr lang="es-ES" dirty="0"/>
               <a:t>Muestra el resultado y permite volver a jugar al apretar el botón.</a:t>
             </a:r>
-            <a:endParaRPr lang="es-ES" dirty="0"/>
           </a:p>
         </p:txBody>
       </p:sp>
@@ -31012,6 +30811,866 @@
     <p:extLst>
       <p:ext uri="{BB962C8B-B14F-4D97-AF65-F5344CB8AC3E}">
         <p14:creationId xmlns:p14="http://schemas.microsoft.com/office/powerpoint/2010/main" val="1913989324"/>
+      </p:ext>
+    </p:extLst>
+  </p:cSld>
+  <p:clrMapOvr>
+    <a:masterClrMapping/>
+  </p:clrMapOvr>
+</p:sld>
+</file>
+
+<file path=ppt/slides/slide46.xml><?xml version="1.0" encoding="utf-8"?>
+<p:sld xmlns:a="http://schemas.openxmlformats.org/drawingml/2006/main" xmlns:r="http://schemas.openxmlformats.org/officeDocument/2006/relationships" xmlns:p="http://schemas.openxmlformats.org/presentationml/2006/main">
+  <p:cSld>
+    <p:spTree>
+      <p:nvGrpSpPr>
+        <p:cNvPr id="1" name=""/>
+        <p:cNvGrpSpPr/>
+        <p:nvPr/>
+      </p:nvGrpSpPr>
+      <p:grpSpPr>
+        <a:xfrm>
+          <a:off x="0" y="0"/>
+          <a:ext cx="0" cy="0"/>
+          <a:chOff x="0" y="0"/>
+          <a:chExt cx="0" cy="0"/>
+        </a:xfrm>
+      </p:grpSpPr>
+      <p:sp>
+        <p:nvSpPr>
+          <p:cNvPr id="2" name="Título 1">
+            <a:extLst>
+              <a:ext uri="{FF2B5EF4-FFF2-40B4-BE49-F238E27FC236}">
+                <a16:creationId xmlns:a16="http://schemas.microsoft.com/office/drawing/2014/main" id="{6B36A7CC-A8E6-4302-B37A-14B8A3087BB0}"/>
+              </a:ext>
+            </a:extLst>
+          </p:cNvPr>
+          <p:cNvSpPr>
+            <a:spLocks noGrp="1"/>
+          </p:cNvSpPr>
+          <p:nvPr>
+            <p:ph type="title"/>
+          </p:nvPr>
+        </p:nvSpPr>
+        <p:spPr/>
+        <p:txBody>
+          <a:bodyPr/>
+          <a:lstStyle/>
+          <a:p>
+            <a:r>
+              <a:rPr lang="es-ES" dirty="0"/>
+              <a:t>MEJORAS A POSTERIORI</a:t>
+            </a:r>
+          </a:p>
+        </p:txBody>
+      </p:sp>
+      <p:sp>
+        <p:nvSpPr>
+          <p:cNvPr id="4" name="CuadroTexto 3">
+            <a:extLst>
+              <a:ext uri="{FF2B5EF4-FFF2-40B4-BE49-F238E27FC236}">
+                <a16:creationId xmlns:a16="http://schemas.microsoft.com/office/drawing/2014/main" id="{AC95679F-6FA1-457B-8244-1BAC94E3369A}"/>
+              </a:ext>
+            </a:extLst>
+          </p:cNvPr>
+          <p:cNvSpPr txBox="1"/>
+          <p:nvPr/>
+        </p:nvSpPr>
+        <p:spPr>
+          <a:xfrm>
+            <a:off x="8442960" y="5346340"/>
+            <a:ext cx="2696095" cy="830997"/>
+          </a:xfrm>
+          <a:prstGeom prst="rect">
+            <a:avLst/>
+          </a:prstGeom>
+          <a:noFill/>
+        </p:spPr>
+        <p:txBody>
+          <a:bodyPr wrap="square" rtlCol="0">
+            <a:spAutoFit/>
+          </a:bodyPr>
+          <a:lstStyle/>
+          <a:p>
+            <a:pPr algn="ctr"/>
+            <a:r>
+              <a:rPr lang="es-ES" sz="2400" dirty="0">
+                <a:solidFill>
+                  <a:schemeClr val="accent6">
+                    <a:lumMod val="75000"/>
+                  </a:schemeClr>
+                </a:solidFill>
+              </a:rPr>
+              <a:t>Gracias a Sergio Álvarez</a:t>
+            </a:r>
+          </a:p>
+        </p:txBody>
+      </p:sp>
+    </p:spTree>
+    <p:extLst>
+      <p:ext uri="{BB962C8B-B14F-4D97-AF65-F5344CB8AC3E}">
+        <p14:creationId xmlns:p14="http://schemas.microsoft.com/office/powerpoint/2010/main" val="3110787141"/>
+      </p:ext>
+    </p:extLst>
+  </p:cSld>
+  <p:clrMapOvr>
+    <a:masterClrMapping/>
+  </p:clrMapOvr>
+</p:sld>
+</file>
+
+<file path=ppt/slides/slide47.xml><?xml version="1.0" encoding="utf-8"?>
+<p:sld xmlns:a="http://schemas.openxmlformats.org/drawingml/2006/main" xmlns:r="http://schemas.openxmlformats.org/officeDocument/2006/relationships" xmlns:p="http://schemas.openxmlformats.org/presentationml/2006/main">
+  <p:cSld>
+    <p:spTree>
+      <p:nvGrpSpPr>
+        <p:cNvPr id="1" name=""/>
+        <p:cNvGrpSpPr/>
+        <p:nvPr/>
+      </p:nvGrpSpPr>
+      <p:grpSpPr>
+        <a:xfrm>
+          <a:off x="0" y="0"/>
+          <a:ext cx="0" cy="0"/>
+          <a:chOff x="0" y="0"/>
+          <a:chExt cx="0" cy="0"/>
+        </a:xfrm>
+      </p:grpSpPr>
+      <p:sp>
+        <p:nvSpPr>
+          <p:cNvPr id="4" name="TextBox 6">
+            <a:extLst>
+              <a:ext uri="{FF2B5EF4-FFF2-40B4-BE49-F238E27FC236}">
+                <a16:creationId xmlns:a16="http://schemas.microsoft.com/office/drawing/2014/main" id="{DDF28C2B-6EB3-4B0E-8C5D-DFDFEF6A89A2}"/>
+              </a:ext>
+            </a:extLst>
+          </p:cNvPr>
+          <p:cNvSpPr txBox="1"/>
+          <p:nvPr/>
+        </p:nvSpPr>
+        <p:spPr>
+          <a:xfrm>
+            <a:off x="1414314" y="412616"/>
+            <a:ext cx="9770921" cy="1200329"/>
+          </a:xfrm>
+          <a:prstGeom prst="rect">
+            <a:avLst/>
+          </a:prstGeom>
+          <a:solidFill>
+            <a:schemeClr val="accent1">
+              <a:lumMod val="40000"/>
+              <a:lumOff val="60000"/>
+            </a:schemeClr>
+          </a:solidFill>
+        </p:spPr>
+        <p:txBody>
+          <a:bodyPr wrap="square" rtlCol="0">
+            <a:spAutoFit/>
+          </a:bodyPr>
+          <a:lstStyle/>
+          <a:p>
+            <a:r>
+              <a:rPr lang="es-ES" dirty="0"/>
+              <a:t>Lo más bonito que tiene este sector, es la comunidad de desarrolladores. Durante la presentación de este proyecto en </a:t>
+            </a:r>
+            <a:r>
+              <a:rPr lang="es-ES" dirty="0" err="1"/>
+              <a:t>WTMAsturias</a:t>
+            </a:r>
+            <a:r>
+              <a:rPr lang="es-ES" dirty="0"/>
+              <a:t>, </a:t>
+            </a:r>
+            <a:r>
+              <a:rPr lang="es-ES" b="1" dirty="0"/>
+              <a:t>Sergio </a:t>
+            </a:r>
+            <a:r>
+              <a:rPr lang="es-ES" b="1" dirty="0" err="1"/>
+              <a:t>Alvarez</a:t>
+            </a:r>
+            <a:r>
+              <a:rPr lang="es-ES" b="1" dirty="0"/>
+              <a:t> </a:t>
+            </a:r>
+            <a:r>
+              <a:rPr lang="es-ES" dirty="0"/>
+              <a:t>(quien no lo conozca, que lo siga ya!) me comentó que había visto un par de cosillas que podrían mejorar el proyecto. Me pidió permiso (cosa que no hacía falta!) y me hizo unas </a:t>
+            </a:r>
+            <a:r>
+              <a:rPr lang="es-ES" dirty="0" err="1"/>
+              <a:t>pull</a:t>
+            </a:r>
+            <a:r>
+              <a:rPr lang="es-ES" dirty="0"/>
+              <a:t> </a:t>
+            </a:r>
+            <a:r>
+              <a:rPr lang="es-ES" dirty="0" err="1"/>
+              <a:t>requests</a:t>
+            </a:r>
+            <a:r>
+              <a:rPr lang="es-ES" dirty="0"/>
+              <a:t> que paso a detallar.</a:t>
+            </a:r>
+          </a:p>
+        </p:txBody>
+      </p:sp>
+      <p:pic>
+        <p:nvPicPr>
+          <p:cNvPr id="5" name="Imagen 4">
+            <a:extLst>
+              <a:ext uri="{FF2B5EF4-FFF2-40B4-BE49-F238E27FC236}">
+                <a16:creationId xmlns:a16="http://schemas.microsoft.com/office/drawing/2014/main" id="{4BEAB499-930F-42D9-A9BB-4174DCF084E0}"/>
+              </a:ext>
+            </a:extLst>
+          </p:cNvPr>
+          <p:cNvPicPr>
+            <a:picLocks noChangeAspect="1"/>
+          </p:cNvPicPr>
+          <p:nvPr/>
+        </p:nvPicPr>
+        <p:blipFill>
+          <a:blip r:embed="rId2"/>
+          <a:stretch>
+            <a:fillRect/>
+          </a:stretch>
+        </p:blipFill>
+        <p:spPr>
+          <a:xfrm>
+            <a:off x="1414314" y="1911250"/>
+            <a:ext cx="5875338" cy="4534134"/>
+          </a:xfrm>
+          <a:prstGeom prst="rect">
+            <a:avLst/>
+          </a:prstGeom>
+        </p:spPr>
+      </p:pic>
+      <p:grpSp>
+        <p:nvGrpSpPr>
+          <p:cNvPr id="6" name="Group 1">
+            <a:extLst>
+              <a:ext uri="{FF2B5EF4-FFF2-40B4-BE49-F238E27FC236}">
+                <a16:creationId xmlns:a16="http://schemas.microsoft.com/office/drawing/2014/main" id="{3076946E-8EB9-44BB-A3D8-1843B2E438E6}"/>
+              </a:ext>
+            </a:extLst>
+          </p:cNvPr>
+          <p:cNvGrpSpPr/>
+          <p:nvPr/>
+        </p:nvGrpSpPr>
+        <p:grpSpPr>
+          <a:xfrm>
+            <a:off x="8058526" y="3010954"/>
+            <a:ext cx="2905036" cy="2734063"/>
+            <a:chOff x="119854" y="200539"/>
+            <a:chExt cx="2378964" cy="2734063"/>
+          </a:xfrm>
+        </p:grpSpPr>
+        <p:sp>
+          <p:nvSpPr>
+            <p:cNvPr id="7" name="Cloud 2">
+              <a:extLst>
+                <a:ext uri="{FF2B5EF4-FFF2-40B4-BE49-F238E27FC236}">
+                  <a16:creationId xmlns:a16="http://schemas.microsoft.com/office/drawing/2014/main" id="{2B64D7B3-2DE3-461F-93FA-3193D3D48149}"/>
+                </a:ext>
+              </a:extLst>
+            </p:cNvPr>
+            <p:cNvSpPr/>
+            <p:nvPr/>
+          </p:nvSpPr>
+          <p:spPr>
+            <a:xfrm>
+              <a:off x="119854" y="200539"/>
+              <a:ext cx="2378964" cy="2734063"/>
+            </a:xfrm>
+            <a:prstGeom prst="cloud">
+              <a:avLst/>
+            </a:prstGeom>
+          </p:spPr>
+          <p:style>
+            <a:lnRef idx="2">
+              <a:schemeClr val="accent1">
+                <a:shade val="50000"/>
+              </a:schemeClr>
+            </a:lnRef>
+            <a:fillRef idx="1">
+              <a:schemeClr val="accent1"/>
+            </a:fillRef>
+            <a:effectRef idx="0">
+              <a:schemeClr val="accent1"/>
+            </a:effectRef>
+            <a:fontRef idx="minor">
+              <a:schemeClr val="lt1"/>
+            </a:fontRef>
+          </p:style>
+          <p:txBody>
+            <a:bodyPr rtlCol="0" anchor="ctr"/>
+            <a:lstStyle/>
+            <a:p>
+              <a:pPr algn="ctr"/>
+              <a:endParaRPr lang="es-ES"/>
+            </a:p>
+          </p:txBody>
+        </p:sp>
+        <p:sp>
+          <p:nvSpPr>
+            <p:cNvPr id="8" name="TextBox 3">
+              <a:extLst>
+                <a:ext uri="{FF2B5EF4-FFF2-40B4-BE49-F238E27FC236}">
+                  <a16:creationId xmlns:a16="http://schemas.microsoft.com/office/drawing/2014/main" id="{DE333718-F3BA-445B-8896-8D707F4DFE8C}"/>
+                </a:ext>
+              </a:extLst>
+            </p:cNvPr>
+            <p:cNvSpPr txBox="1"/>
+            <p:nvPr/>
+          </p:nvSpPr>
+          <p:spPr>
+            <a:xfrm>
+              <a:off x="478149" y="411000"/>
+              <a:ext cx="1524351" cy="2031325"/>
+            </a:xfrm>
+            <a:prstGeom prst="rect">
+              <a:avLst/>
+            </a:prstGeom>
+            <a:noFill/>
+          </p:spPr>
+          <p:txBody>
+            <a:bodyPr wrap="square" rtlCol="0">
+              <a:spAutoFit/>
+            </a:bodyPr>
+            <a:lstStyle/>
+            <a:p>
+              <a:pPr algn="ctr"/>
+              <a:r>
+                <a:rPr lang="es-ES" dirty="0">
+                  <a:solidFill>
+                    <a:schemeClr val="bg1">
+                      <a:lumMod val="95000"/>
+                    </a:schemeClr>
+                  </a:solidFill>
+                </a:rPr>
+                <a:t>Al añadir el “</a:t>
+              </a:r>
+              <a:r>
+                <a:rPr lang="es-ES" dirty="0" err="1">
+                  <a:solidFill>
+                    <a:schemeClr val="bg1">
+                      <a:lumMod val="95000"/>
+                    </a:schemeClr>
+                  </a:solidFill>
+                </a:rPr>
+                <a:t>au</a:t>
+              </a:r>
+              <a:r>
+                <a:rPr lang="es-ES" dirty="0">
+                  <a:solidFill>
+                    <a:schemeClr val="bg1">
+                      <a:lumMod val="95000"/>
+                    </a:schemeClr>
+                  </a:solidFill>
+                </a:rPr>
+                <a:t> run –</a:t>
+              </a:r>
+              <a:r>
+                <a:rPr lang="es-ES" dirty="0" err="1">
+                  <a:solidFill>
+                    <a:schemeClr val="bg1">
+                      <a:lumMod val="95000"/>
+                    </a:schemeClr>
+                  </a:solidFill>
+                </a:rPr>
+                <a:t>watch</a:t>
+              </a:r>
+              <a:r>
+                <a:rPr lang="es-ES" dirty="0">
+                  <a:solidFill>
+                    <a:schemeClr val="bg1">
+                      <a:lumMod val="95000"/>
+                    </a:schemeClr>
+                  </a:solidFill>
+                </a:rPr>
+                <a:t>” al </a:t>
+              </a:r>
+              <a:r>
+                <a:rPr lang="es-ES" dirty="0" err="1">
+                  <a:solidFill>
+                    <a:schemeClr val="bg1">
+                      <a:lumMod val="95000"/>
+                    </a:schemeClr>
+                  </a:solidFill>
+                </a:rPr>
+                <a:t>package.json</a:t>
+              </a:r>
+              <a:r>
+                <a:rPr lang="es-ES" dirty="0">
+                  <a:solidFill>
+                    <a:schemeClr val="bg1">
+                      <a:lumMod val="95000"/>
+                    </a:schemeClr>
+                  </a:solidFill>
+                </a:rPr>
+                <a:t>, de forma que ahora para lanzarlo solo hace falta </a:t>
+              </a:r>
+              <a:r>
+                <a:rPr lang="es-ES" dirty="0" err="1">
+                  <a:solidFill>
+                    <a:schemeClr val="bg1">
+                      <a:lumMod val="95000"/>
+                    </a:schemeClr>
+                  </a:solidFill>
+                </a:rPr>
+                <a:t>npm</a:t>
+              </a:r>
+              <a:r>
+                <a:rPr lang="es-ES" dirty="0">
+                  <a:solidFill>
+                    <a:schemeClr val="bg1">
+                      <a:lumMod val="95000"/>
+                    </a:schemeClr>
+                  </a:solidFill>
+                </a:rPr>
+                <a:t> </a:t>
+              </a:r>
+              <a:r>
+                <a:rPr lang="es-ES" dirty="0" err="1">
+                  <a:solidFill>
+                    <a:schemeClr val="bg1">
+                      <a:lumMod val="95000"/>
+                    </a:schemeClr>
+                  </a:solidFill>
+                </a:rPr>
+                <a:t>start</a:t>
+              </a:r>
+              <a:endParaRPr lang="es-ES" dirty="0">
+                <a:solidFill>
+                  <a:schemeClr val="bg1">
+                    <a:lumMod val="95000"/>
+                  </a:schemeClr>
+                </a:solidFill>
+              </a:endParaRPr>
+            </a:p>
+          </p:txBody>
+        </p:sp>
+      </p:grpSp>
+    </p:spTree>
+    <p:extLst>
+      <p:ext uri="{BB962C8B-B14F-4D97-AF65-F5344CB8AC3E}">
+        <p14:creationId xmlns:p14="http://schemas.microsoft.com/office/powerpoint/2010/main" val="1744209134"/>
+      </p:ext>
+    </p:extLst>
+  </p:cSld>
+  <p:clrMapOvr>
+    <a:masterClrMapping/>
+  </p:clrMapOvr>
+</p:sld>
+</file>
+
+<file path=ppt/slides/slide48.xml><?xml version="1.0" encoding="utf-8"?>
+<p:sld xmlns:a="http://schemas.openxmlformats.org/drawingml/2006/main" xmlns:r="http://schemas.openxmlformats.org/officeDocument/2006/relationships" xmlns:p="http://schemas.openxmlformats.org/presentationml/2006/main">
+  <p:cSld>
+    <p:spTree>
+      <p:nvGrpSpPr>
+        <p:cNvPr id="1" name=""/>
+        <p:cNvGrpSpPr/>
+        <p:nvPr/>
+      </p:nvGrpSpPr>
+      <p:grpSpPr>
+        <a:xfrm>
+          <a:off x="0" y="0"/>
+          <a:ext cx="0" cy="0"/>
+          <a:chOff x="0" y="0"/>
+          <a:chExt cx="0" cy="0"/>
+        </a:xfrm>
+      </p:grpSpPr>
+      <p:pic>
+        <p:nvPicPr>
+          <p:cNvPr id="2" name="Imagen 1">
+            <a:extLst>
+              <a:ext uri="{FF2B5EF4-FFF2-40B4-BE49-F238E27FC236}">
+                <a16:creationId xmlns:a16="http://schemas.microsoft.com/office/drawing/2014/main" id="{B822EAF6-9F28-4AB6-B40E-E53429E2E15D}"/>
+              </a:ext>
+            </a:extLst>
+          </p:cNvPr>
+          <p:cNvPicPr>
+            <a:picLocks noChangeAspect="1"/>
+          </p:cNvPicPr>
+          <p:nvPr/>
+        </p:nvPicPr>
+        <p:blipFill>
+          <a:blip r:embed="rId2"/>
+          <a:stretch>
+            <a:fillRect/>
+          </a:stretch>
+        </p:blipFill>
+        <p:spPr>
+          <a:xfrm>
+            <a:off x="535940" y="580390"/>
+            <a:ext cx="9372600" cy="5372100"/>
+          </a:xfrm>
+          <a:prstGeom prst="rect">
+            <a:avLst/>
+          </a:prstGeom>
+        </p:spPr>
+      </p:pic>
+      <p:grpSp>
+        <p:nvGrpSpPr>
+          <p:cNvPr id="3" name="Group 1">
+            <a:extLst>
+              <a:ext uri="{FF2B5EF4-FFF2-40B4-BE49-F238E27FC236}">
+                <a16:creationId xmlns:a16="http://schemas.microsoft.com/office/drawing/2014/main" id="{3308E220-574F-4E3B-A392-09CE3D0BF572}"/>
+              </a:ext>
+            </a:extLst>
+          </p:cNvPr>
+          <p:cNvGrpSpPr/>
+          <p:nvPr/>
+        </p:nvGrpSpPr>
+        <p:grpSpPr>
+          <a:xfrm>
+            <a:off x="8373486" y="3874554"/>
+            <a:ext cx="3696594" cy="3072783"/>
+            <a:chOff x="119854" y="200539"/>
+            <a:chExt cx="2378964" cy="3072783"/>
+          </a:xfrm>
+        </p:grpSpPr>
+        <p:sp>
+          <p:nvSpPr>
+            <p:cNvPr id="4" name="Cloud 2">
+              <a:extLst>
+                <a:ext uri="{FF2B5EF4-FFF2-40B4-BE49-F238E27FC236}">
+                  <a16:creationId xmlns:a16="http://schemas.microsoft.com/office/drawing/2014/main" id="{D720E94E-84A2-4850-B766-F8BA8E356404}"/>
+                </a:ext>
+              </a:extLst>
+            </p:cNvPr>
+            <p:cNvSpPr/>
+            <p:nvPr/>
+          </p:nvSpPr>
+          <p:spPr>
+            <a:xfrm>
+              <a:off x="119854" y="200539"/>
+              <a:ext cx="2378964" cy="2734063"/>
+            </a:xfrm>
+            <a:prstGeom prst="cloud">
+              <a:avLst/>
+            </a:prstGeom>
+          </p:spPr>
+          <p:style>
+            <a:lnRef idx="2">
+              <a:schemeClr val="accent1">
+                <a:shade val="50000"/>
+              </a:schemeClr>
+            </a:lnRef>
+            <a:fillRef idx="1">
+              <a:schemeClr val="accent1"/>
+            </a:fillRef>
+            <a:effectRef idx="0">
+              <a:schemeClr val="accent1"/>
+            </a:effectRef>
+            <a:fontRef idx="minor">
+              <a:schemeClr val="lt1"/>
+            </a:fontRef>
+          </p:style>
+          <p:txBody>
+            <a:bodyPr rtlCol="0" anchor="ctr"/>
+            <a:lstStyle/>
+            <a:p>
+              <a:pPr algn="ctr"/>
+              <a:endParaRPr lang="es-ES"/>
+            </a:p>
+          </p:txBody>
+        </p:sp>
+        <p:sp>
+          <p:nvSpPr>
+            <p:cNvPr id="5" name="TextBox 3">
+              <a:extLst>
+                <a:ext uri="{FF2B5EF4-FFF2-40B4-BE49-F238E27FC236}">
+                  <a16:creationId xmlns:a16="http://schemas.microsoft.com/office/drawing/2014/main" id="{01297599-9B77-44B8-88DF-EDF10D4B7B9E}"/>
+                </a:ext>
+              </a:extLst>
+            </p:cNvPr>
+            <p:cNvSpPr txBox="1"/>
+            <p:nvPr/>
+          </p:nvSpPr>
+          <p:spPr>
+            <a:xfrm>
+              <a:off x="478149" y="411000"/>
+              <a:ext cx="1524351" cy="2862322"/>
+            </a:xfrm>
+            <a:prstGeom prst="rect">
+              <a:avLst/>
+            </a:prstGeom>
+            <a:noFill/>
+          </p:spPr>
+          <p:txBody>
+            <a:bodyPr wrap="square" rtlCol="0">
+              <a:spAutoFit/>
+            </a:bodyPr>
+            <a:lstStyle/>
+            <a:p>
+              <a:pPr algn="ctr"/>
+              <a:r>
+                <a:rPr lang="es-ES" dirty="0">
+                  <a:solidFill>
+                    <a:schemeClr val="bg1">
+                      <a:lumMod val="95000"/>
+                    </a:schemeClr>
+                  </a:solidFill>
+                </a:rPr>
+                <a:t>Esto fue algo que se me escapó totalmente!</a:t>
+              </a:r>
+            </a:p>
+            <a:p>
+              <a:pPr algn="ctr"/>
+              <a:r>
+                <a:rPr lang="es-ES" dirty="0">
+                  <a:solidFill>
+                    <a:schemeClr val="bg1">
+                      <a:lumMod val="95000"/>
+                    </a:schemeClr>
+                  </a:solidFill>
+                </a:rPr>
+                <a:t>Es muy importante comparar con === en lugar de == para que tenga en cuenta el tipo además del valor</a:t>
+              </a:r>
+            </a:p>
+          </p:txBody>
+        </p:sp>
+      </p:grpSp>
+    </p:spTree>
+    <p:extLst>
+      <p:ext uri="{BB962C8B-B14F-4D97-AF65-F5344CB8AC3E}">
+        <p14:creationId xmlns:p14="http://schemas.microsoft.com/office/powerpoint/2010/main" val="3995132088"/>
+      </p:ext>
+    </p:extLst>
+  </p:cSld>
+  <p:clrMapOvr>
+    <a:masterClrMapping/>
+  </p:clrMapOvr>
+</p:sld>
+</file>
+
+<file path=ppt/slides/slide49.xml><?xml version="1.0" encoding="utf-8"?>
+<p:sld xmlns:a="http://schemas.openxmlformats.org/drawingml/2006/main" xmlns:r="http://schemas.openxmlformats.org/officeDocument/2006/relationships" xmlns:p="http://schemas.openxmlformats.org/presentationml/2006/main">
+  <p:cSld>
+    <p:spTree>
+      <p:nvGrpSpPr>
+        <p:cNvPr id="1" name=""/>
+        <p:cNvGrpSpPr/>
+        <p:nvPr/>
+      </p:nvGrpSpPr>
+      <p:grpSpPr>
+        <a:xfrm>
+          <a:off x="0" y="0"/>
+          <a:ext cx="0" cy="0"/>
+          <a:chOff x="0" y="0"/>
+          <a:chExt cx="0" cy="0"/>
+        </a:xfrm>
+      </p:grpSpPr>
+      <p:grpSp>
+        <p:nvGrpSpPr>
+          <p:cNvPr id="3" name="Group 1">
+            <a:extLst>
+              <a:ext uri="{FF2B5EF4-FFF2-40B4-BE49-F238E27FC236}">
+                <a16:creationId xmlns:a16="http://schemas.microsoft.com/office/drawing/2014/main" id="{888DB42F-890A-4A33-BCF9-37D3B56B260E}"/>
+              </a:ext>
+            </a:extLst>
+          </p:cNvPr>
+          <p:cNvGrpSpPr/>
+          <p:nvPr/>
+        </p:nvGrpSpPr>
+        <p:grpSpPr>
+          <a:xfrm>
+            <a:off x="7563137" y="1478331"/>
+            <a:ext cx="4336674" cy="5719070"/>
+            <a:chOff x="119854" y="200539"/>
+            <a:chExt cx="2378964" cy="4706629"/>
+          </a:xfrm>
+        </p:grpSpPr>
+        <p:sp>
+          <p:nvSpPr>
+            <p:cNvPr id="4" name="Cloud 2">
+              <a:extLst>
+                <a:ext uri="{FF2B5EF4-FFF2-40B4-BE49-F238E27FC236}">
+                  <a16:creationId xmlns:a16="http://schemas.microsoft.com/office/drawing/2014/main" id="{EA30D4C3-5C58-4AE7-B504-807F27CB1E1F}"/>
+                </a:ext>
+              </a:extLst>
+            </p:cNvPr>
+            <p:cNvSpPr/>
+            <p:nvPr/>
+          </p:nvSpPr>
+          <p:spPr>
+            <a:xfrm>
+              <a:off x="119854" y="200539"/>
+              <a:ext cx="2378964" cy="2734063"/>
+            </a:xfrm>
+            <a:prstGeom prst="cloud">
+              <a:avLst/>
+            </a:prstGeom>
+          </p:spPr>
+          <p:style>
+            <a:lnRef idx="2">
+              <a:schemeClr val="accent1">
+                <a:shade val="50000"/>
+              </a:schemeClr>
+            </a:lnRef>
+            <a:fillRef idx="1">
+              <a:schemeClr val="accent1"/>
+            </a:fillRef>
+            <a:effectRef idx="0">
+              <a:schemeClr val="accent1"/>
+            </a:effectRef>
+            <a:fontRef idx="minor">
+              <a:schemeClr val="lt1"/>
+            </a:fontRef>
+          </p:style>
+          <p:txBody>
+            <a:bodyPr rtlCol="0" anchor="ctr"/>
+            <a:lstStyle/>
+            <a:p>
+              <a:pPr algn="ctr"/>
+              <a:endParaRPr lang="es-ES"/>
+            </a:p>
+          </p:txBody>
+        </p:sp>
+        <p:sp>
+          <p:nvSpPr>
+            <p:cNvPr id="5" name="TextBox 3">
+              <a:extLst>
+                <a:ext uri="{FF2B5EF4-FFF2-40B4-BE49-F238E27FC236}">
+                  <a16:creationId xmlns:a16="http://schemas.microsoft.com/office/drawing/2014/main" id="{79338B25-6619-4680-AE82-CD923E752C51}"/>
+                </a:ext>
+              </a:extLst>
+            </p:cNvPr>
+            <p:cNvSpPr txBox="1"/>
+            <p:nvPr/>
+          </p:nvSpPr>
+          <p:spPr>
+            <a:xfrm>
+              <a:off x="547161" y="661841"/>
+              <a:ext cx="1524351" cy="4245327"/>
+            </a:xfrm>
+            <a:prstGeom prst="rect">
+              <a:avLst/>
+            </a:prstGeom>
+            <a:noFill/>
+          </p:spPr>
+          <p:txBody>
+            <a:bodyPr wrap="square" rtlCol="0">
+              <a:spAutoFit/>
+            </a:bodyPr>
+            <a:lstStyle/>
+            <a:p>
+              <a:pPr algn="ctr"/>
+              <a:r>
+                <a:rPr lang="es-ES" dirty="0">
+                  <a:solidFill>
+                    <a:schemeClr val="bg1">
+                      <a:lumMod val="95000"/>
+                    </a:schemeClr>
+                  </a:solidFill>
+                </a:rPr>
+                <a:t>Y el código que menos me gustaba que era la parte del servicio, se soluciona con un </a:t>
+              </a:r>
+              <a:r>
+                <a:rPr lang="es-ES" dirty="0" err="1">
+                  <a:solidFill>
+                    <a:schemeClr val="bg1">
+                      <a:lumMod val="95000"/>
+                    </a:schemeClr>
+                  </a:solidFill>
+                </a:rPr>
+                <a:t>fetch</a:t>
+              </a:r>
+              <a:r>
+                <a:rPr lang="es-ES" dirty="0">
+                  <a:solidFill>
+                    <a:schemeClr val="bg1">
+                      <a:lumMod val="95000"/>
+                    </a:schemeClr>
+                  </a:solidFill>
+                </a:rPr>
+                <a:t> y queda así de limpio.</a:t>
+              </a:r>
+            </a:p>
+            <a:p>
+              <a:pPr algn="ctr"/>
+              <a:r>
+                <a:rPr lang="es-ES" dirty="0">
+                  <a:solidFill>
+                    <a:schemeClr val="bg1">
+                      <a:lumMod val="95000"/>
+                    </a:schemeClr>
+                  </a:solidFill>
+                </a:rPr>
+                <a:t>Que suerte tengo de conocer a gente tan maja y tan crack! </a:t>
+              </a:r>
+            </a:p>
+          </p:txBody>
+        </p:sp>
+      </p:grpSp>
+      <p:pic>
+        <p:nvPicPr>
+          <p:cNvPr id="6" name="Imagen 5">
+            <a:extLst>
+              <a:ext uri="{FF2B5EF4-FFF2-40B4-BE49-F238E27FC236}">
+                <a16:creationId xmlns:a16="http://schemas.microsoft.com/office/drawing/2014/main" id="{AF50788F-2989-4EC8-B57D-AFEF1C4A2414}"/>
+              </a:ext>
+            </a:extLst>
+          </p:cNvPr>
+          <p:cNvPicPr>
+            <a:picLocks noChangeAspect="1"/>
+          </p:cNvPicPr>
+          <p:nvPr/>
+        </p:nvPicPr>
+        <p:blipFill>
+          <a:blip r:embed="rId2"/>
+          <a:stretch>
+            <a:fillRect/>
+          </a:stretch>
+        </p:blipFill>
+        <p:spPr>
+          <a:xfrm>
+            <a:off x="292189" y="1478331"/>
+            <a:ext cx="7099282" cy="5414272"/>
+          </a:xfrm>
+          <a:prstGeom prst="rect">
+            <a:avLst/>
+          </a:prstGeom>
+        </p:spPr>
+      </p:pic>
+      <p:pic>
+        <p:nvPicPr>
+          <p:cNvPr id="7" name="Imagen 6">
+            <a:extLst>
+              <a:ext uri="{FF2B5EF4-FFF2-40B4-BE49-F238E27FC236}">
+                <a16:creationId xmlns:a16="http://schemas.microsoft.com/office/drawing/2014/main" id="{046F1369-43C1-439F-A34A-DEAF9D6A61DD}"/>
+              </a:ext>
+            </a:extLst>
+          </p:cNvPr>
+          <p:cNvPicPr>
+            <a:picLocks noChangeAspect="1"/>
+          </p:cNvPicPr>
+          <p:nvPr/>
+        </p:nvPicPr>
+        <p:blipFill>
+          <a:blip r:embed="rId3"/>
+          <a:stretch>
+            <a:fillRect/>
+          </a:stretch>
+        </p:blipFill>
+        <p:spPr>
+          <a:xfrm>
+            <a:off x="292189" y="108297"/>
+            <a:ext cx="4096931" cy="1370034"/>
+          </a:xfrm>
+          <a:prstGeom prst="rect">
+            <a:avLst/>
+          </a:prstGeom>
+        </p:spPr>
+      </p:pic>
+    </p:spTree>
+    <p:extLst>
+      <p:ext uri="{BB962C8B-B14F-4D97-AF65-F5344CB8AC3E}">
+        <p14:creationId xmlns:p14="http://schemas.microsoft.com/office/powerpoint/2010/main" val="395548261"/>
       </p:ext>
     </p:extLst>
   </p:cSld>
@@ -31312,10 +31971,9 @@
           <a:lstStyle/>
           <a:p>
             <a:r>
-              <a:rPr lang="es-ES" dirty="0" smtClean="0"/>
+              <a:rPr lang="es-ES" dirty="0"/>
               <a:t>INSTALACIÓN Y PRIMEROS PASOS</a:t>
             </a:r>
-            <a:endParaRPr lang="es-ES" dirty="0"/>
           </a:p>
         </p:txBody>
       </p:sp>
@@ -31365,10 +32023,9 @@
           <a:lstStyle/>
           <a:p>
             <a:r>
-              <a:rPr lang="es-ES" dirty="0" smtClean="0"/>
+              <a:rPr lang="es-ES" dirty="0"/>
               <a:t>RECURSOS ENCONTRADOS EN LA WEB</a:t>
             </a:r>
-            <a:endParaRPr lang="es-ES" dirty="0"/>
           </a:p>
         </p:txBody>
       </p:sp>
@@ -31397,7 +32054,7 @@
           </a:bodyPr>
           <a:lstStyle/>
           <a:p>
-            <a:endParaRPr lang="es-ES" dirty="0" smtClean="0"/>
+            <a:endParaRPr lang="es-ES" dirty="0"/>
           </a:p>
           <a:p>
             <a:endParaRPr lang="es-ES" dirty="0"/>

</xml_diff>